<commit_message>
M419-014 Update slides for ERTS
</commit_message>
<xml_diff>
--- a/slides/ERTS_20140205/SPARK_2014_Case_Studies.pptx
+++ b/slides/ERTS_20140205/SPARK_2014_Case_Studies.pptx
@@ -285,7 +285,7 @@
             <a:fld id="{28C7CF07-8AE4-48B4-9716-7DADFEA16C26}" type="datetime1">
               <a:rPr lang="en-US"/>
               <a:pPr/>
-              <a:t>20/01/2014</a:t>
+              <a:t>21/01/2014</a:t>
             </a:fld>
             <a:endParaRPr lang="en-US"/>
           </a:p>
@@ -7988,11 +7988,7 @@
             </a:r>
             <a:r>
               <a:rPr lang="en-US" dirty="0" smtClean="0"/>
-              <a:t>February 5</a:t>
-            </a:r>
-            <a:r>
-              <a:rPr lang="en-US" dirty="0" smtClean="0"/>
-              <a:t>th</a:t>
+              <a:t>February 5th</a:t>
             </a:r>
             <a:r>
               <a:rPr lang="en-US" dirty="0"/>
@@ -8626,7 +8622,6 @@
               <a:rPr lang="en-US" sz="2800" i="0" dirty="0" smtClean="0"/>
               <a:t>?</a:t>
             </a:r>
-            <a:endParaRPr lang="en-US" sz="2800" i="0" dirty="0" smtClean="0"/>
           </a:p>
         </p:txBody>
       </p:sp>
@@ -8723,14 +8718,6 @@
           <a:lstStyle/>
           <a:p>
             <a:pPr algn="ctr"/>
-            <a:r>
-              <a:rPr lang="en-US" sz="1800" dirty="0" smtClean="0">
-                <a:solidFill>
-                  <a:srgbClr val="FFFFFF"/>
-                </a:solidFill>
-              </a:rPr>
-              <a:t/>
-            </a:r>
             <a:endParaRPr lang="en-US" sz="1800" dirty="0">
               <a:solidFill>
                 <a:srgbClr val="FFFFFF"/>
@@ -8978,7 +8965,6 @@
               <a:rPr lang="en-US" sz="2400" i="0" dirty="0" smtClean="0"/>
               <a:t>?</a:t>
             </a:r>
-            <a:endParaRPr lang="en-US" sz="2400" i="0" dirty="0" smtClean="0"/>
           </a:p>
         </p:txBody>
       </p:sp>
@@ -9075,14 +9061,6 @@
           <a:lstStyle/>
           <a:p>
             <a:pPr algn="ctr"/>
-            <a:r>
-              <a:rPr lang="en-US" sz="1800" dirty="0" smtClean="0">
-                <a:solidFill>
-                  <a:srgbClr val="FFFFFF"/>
-                </a:solidFill>
-              </a:rPr>
-              <a:t/>
-            </a:r>
             <a:endParaRPr lang="en-US" sz="1800" dirty="0">
               <a:solidFill>
                 <a:srgbClr val="FFFFFF"/>
@@ -9285,14 +9263,6 @@
           <a:lstStyle/>
           <a:p>
             <a:pPr algn="ctr"/>
-            <a:r>
-              <a:rPr lang="en-US" sz="1800" dirty="0" smtClean="0">
-                <a:solidFill>
-                  <a:srgbClr val="FFFFFF"/>
-                </a:solidFill>
-              </a:rPr>
-              <a:t/>
-            </a:r>
             <a:endParaRPr lang="en-US" sz="1800" dirty="0">
               <a:solidFill>
                 <a:srgbClr val="FFFFFF"/>
@@ -9526,7 +9496,6 @@
               <a:rPr lang="en-US" sz="2400" i="0" dirty="0" smtClean="0"/>
               <a:t>?</a:t>
             </a:r>
-            <a:endParaRPr lang="en-US" sz="2400" i="0" dirty="0" smtClean="0"/>
           </a:p>
         </p:txBody>
       </p:sp>
@@ -9966,25 +9935,7 @@
                 </a:solidFill>
                 <a:cs typeface="Courier New"/>
               </a:rPr>
-              <a:t>SPARK 2014 is </a:t>
-            </a:r>
-            <a:r>
-              <a:rPr lang="en-US" dirty="0" smtClean="0">
-                <a:solidFill>
-                  <a:schemeClr val="tx1"/>
-                </a:solidFill>
-                <a:cs typeface="Courier New"/>
-              </a:rPr>
-              <a:t>not good </a:t>
-            </a:r>
-            <a:r>
-              <a:rPr lang="en-US" dirty="0" smtClean="0">
-                <a:solidFill>
-                  <a:schemeClr val="tx1"/>
-                </a:solidFill>
-                <a:cs typeface="Courier New"/>
-              </a:rPr>
-              <a:t>for:</a:t>
+              <a:t>SPARK 2014 is not good for:</a:t>
             </a:r>
           </a:p>
           <a:p>
@@ -10069,12 +10020,6 @@
               </a:rPr>
               <a:t>Workflow to make efficient use of developers’ time (in progress)</a:t>
             </a:r>
-            <a:endParaRPr lang="en-US" b="0" dirty="0" smtClean="0">
-              <a:solidFill>
-                <a:schemeClr val="tx1"/>
-              </a:solidFill>
-              <a:cs typeface="Courier New"/>
-            </a:endParaRPr>
           </a:p>
         </p:txBody>
       </p:sp>
@@ -11021,15 +10966,7 @@
           <a:p>
             <a:r>
               <a:rPr lang="en-US" dirty="0" smtClean="0"/>
-              <a:t>Formalization of the Correctness of </a:t>
-            </a:r>
-            <a:r>
-              <a:rPr lang="en-US" dirty="0" smtClean="0"/>
-              <a:t>1505 </a:t>
-            </a:r>
-            <a:r>
-              <a:rPr lang="en-US" dirty="0" smtClean="0"/>
-              <a:t>Functions</a:t>
+              <a:t>Formalization of the Correctness of 1505 Functions</a:t>
             </a:r>
             <a:endParaRPr lang="en-US" dirty="0"/>
           </a:p>
@@ -14304,8 +14241,10 @@
                 </a:solidFill>
                 <a:cs typeface="Courier New"/>
               </a:rPr>
-              <a:t>Support of tagged types (in </a:t>
-            </a:r>
+              <a:t>Support of tagged types (in 2014 roadmap)</a:t>
+            </a:r>
+          </a:p>
+          <a:p>
             <a:r>
               <a:rPr lang="en-US" b="0" dirty="0" smtClean="0">
                 <a:solidFill>
@@ -14313,51 +14252,7 @@
                 </a:solidFill>
                 <a:cs typeface="Courier New"/>
               </a:rPr>
-              <a:t>2014 </a:t>
-            </a:r>
-            <a:r>
-              <a:rPr lang="en-US" b="0" dirty="0" smtClean="0">
-                <a:solidFill>
-                  <a:schemeClr val="tx1"/>
-                </a:solidFill>
-                <a:cs typeface="Courier New"/>
-              </a:rPr>
-              <a:t>roadmap)</a:t>
-            </a:r>
-            <a:endParaRPr lang="en-US" b="0" dirty="0" smtClean="0">
-              <a:solidFill>
-                <a:schemeClr val="tx1"/>
-              </a:solidFill>
-              <a:cs typeface="Courier New"/>
-            </a:endParaRPr>
-          </a:p>
-          <a:p>
-            <a:r>
-              <a:rPr lang="en-US" b="0" dirty="0" smtClean="0">
-                <a:solidFill>
-                  <a:schemeClr val="tx1"/>
-                </a:solidFill>
-                <a:cs typeface="Courier New"/>
-              </a:rPr>
-              <a:t>Helping user with unproved checks </a:t>
-            </a:r>
-            <a:r>
-              <a:rPr lang="en-US" b="0" dirty="0" smtClean="0">
-                <a:solidFill>
-                  <a:schemeClr val="tx1"/>
-                </a:solidFill>
-                <a:cs typeface="Courier New"/>
-              </a:rPr>
-              <a:t>(in 2014 roadmap</a:t>
-            </a:r>
-            <a:r>
-              <a:rPr lang="en-US" b="0" dirty="0" smtClean="0">
-                <a:solidFill>
-                  <a:schemeClr val="tx1"/>
-                </a:solidFill>
-                <a:cs typeface="Courier New"/>
-              </a:rPr>
-              <a:t>)</a:t>
+              <a:t>Helping user with unproved checks (in 2014 roadmap)</a:t>
             </a:r>
           </a:p>
           <a:p>
@@ -15522,7 +15417,6 @@
               <a:rPr lang="en-US" sz="2800" i="0" dirty="0" smtClean="0"/>
               <a:t>Dataflow</a:t>
             </a:r>
-            <a:endParaRPr lang="en-US" sz="2800" i="0" dirty="0" smtClean="0"/>
           </a:p>
         </p:txBody>
       </p:sp>
@@ -15848,7 +15742,6 @@
               <a:rPr lang="en-US" sz="2800" i="0" dirty="0" smtClean="0"/>
               <a:t>Information flow</a:t>
             </a:r>
-            <a:endParaRPr lang="en-US" sz="2800" i="0" dirty="0" smtClean="0"/>
           </a:p>
         </p:txBody>
       </p:sp>
@@ -16275,7 +16168,6 @@
               <a:rPr lang="en-US" sz="2800" i="0" dirty="0" smtClean="0"/>
               <a:t>Refinement</a:t>
             </a:r>
-            <a:endParaRPr lang="en-US" sz="2800" i="0" dirty="0" smtClean="0"/>
           </a:p>
         </p:txBody>
       </p:sp>
@@ -16700,7 +16592,11 @@
             </a:pPr>
             <a:r>
               <a:rPr lang="en-US" sz="2800" i="0" dirty="0" smtClean="0"/>
-              <a:t>Functional contract</a:t>
+              <a:t>Functional </a:t>
+            </a:r>
+            <a:r>
+              <a:rPr lang="en-US" sz="2800" i="0" dirty="0" smtClean="0"/>
+              <a:t>contracts</a:t>
             </a:r>
             <a:endParaRPr lang="en-US" sz="2800" i="0" dirty="0" smtClean="0"/>
           </a:p>
@@ -16953,7 +16849,7 @@
             <a:prstTxWarp prst="textNoShape">
               <a:avLst/>
             </a:prstTxWarp>
-            <a:normAutofit fontScale="92500"/>
+            <a:normAutofit/>
           </a:bodyPr>
           <a:lstStyle>
             <a:lvl1pPr marL="342900" indent="-342900" algn="l" rtl="0" eaLnBrk="1" fontAlgn="base" hangingPunct="1">
@@ -17129,7 +17025,6 @@
               <a:rPr lang="en-US" sz="2800" i="0" dirty="0" smtClean="0"/>
               <a:t>User guidance</a:t>
             </a:r>
-            <a:endParaRPr lang="en-US" sz="2800" i="0" dirty="0" smtClean="0"/>
           </a:p>
         </p:txBody>
       </p:sp>
@@ -17354,7 +17249,6 @@
               <a:rPr lang="en-US" sz="2800" i="0" dirty="0" smtClean="0"/>
               <a:t>Assumptions</a:t>
             </a:r>
-            <a:endParaRPr lang="en-US" sz="2800" i="0" dirty="0" smtClean="0"/>
           </a:p>
         </p:txBody>
       </p:sp>
@@ -17960,16 +17854,7 @@
                 </a:solidFill>
                 <a:cs typeface="Courier New"/>
               </a:rPr>
-              <a:t>Automating proofs with fewer user </a:t>
-            </a:r>
-            <a:r>
-              <a:rPr lang="en-US" b="0" dirty="0" smtClean="0">
-                <a:solidFill>
-                  <a:schemeClr val="tx1"/>
-                </a:solidFill>
-                <a:cs typeface="Courier New"/>
-              </a:rPr>
-              <a:t>efforts</a:t>
+              <a:t>Automating proofs with fewer user efforts</a:t>
             </a:r>
           </a:p>
           <a:p>
@@ -18006,6 +17891,9 @@
             </a:r>
           </a:p>
           <a:p>
+            <a:pPr marL="0" indent="0">
+              <a:buNone/>
+            </a:pPr>
             <a:endParaRPr lang="en-US" dirty="0">
               <a:solidFill>
                 <a:schemeClr val="tx1"/>
@@ -18024,39 +17912,6 @@
                 </a:solidFill>
                 <a:cs typeface="Courier New"/>
               </a:rPr>
-              <a:t>SPARK 2014 is good for:</a:t>
-            </a:r>
-          </a:p>
-          <a:p>
-            <a:r>
-              <a:rPr lang="en-US" b="0" dirty="0" smtClean="0">
-                <a:solidFill>
-                  <a:schemeClr val="tx1"/>
-                </a:solidFill>
-                <a:cs typeface="Courier New"/>
-              </a:rPr>
-              <a:t>Proof of functional properties</a:t>
-            </a:r>
-          </a:p>
-          <a:p>
-            <a:endParaRPr lang="en-US" dirty="0">
-              <a:solidFill>
-                <a:schemeClr val="tx1"/>
-              </a:solidFill>
-              <a:cs typeface="Courier New"/>
-            </a:endParaRPr>
-          </a:p>
-          <a:p>
-            <a:pPr marL="0" indent="0">
-              <a:buNone/>
-            </a:pPr>
-            <a:r>
-              <a:rPr lang="en-US" dirty="0" smtClean="0">
-                <a:solidFill>
-                  <a:schemeClr val="tx1"/>
-                </a:solidFill>
-                <a:cs typeface="Courier New"/>
-              </a:rPr>
               <a:t>Areas requiring improvements:</a:t>
             </a:r>
           </a:p>
@@ -18070,12 +17925,6 @@
               </a:rPr>
               <a:t>Summary of proof results (done)</a:t>
             </a:r>
-            <a:endParaRPr lang="en-US" b="0" dirty="0" smtClean="0">
-              <a:solidFill>
-                <a:schemeClr val="tx1"/>
-              </a:solidFill>
-              <a:cs typeface="Courier New"/>
-            </a:endParaRPr>
           </a:p>
           <a:p>
             <a:endParaRPr lang="en-US" dirty="0" smtClean="0">
@@ -19054,12 +18903,6 @@
               </a:rPr>
               <a:t>language</a:t>
             </a:r>
-            <a:endParaRPr lang="en-US" sz="2800" i="0" dirty="0" smtClean="0">
-              <a:solidFill>
-                <a:schemeClr val="tx1"/>
-              </a:solidFill>
-              <a:cs typeface="Courier New"/>
-            </a:endParaRPr>
           </a:p>
         </p:txBody>
       </p:sp>
@@ -19076,9 +18919,172 @@
   <p:timing>
     <p:tnLst>
       <p:par>
-        <p:cTn xmlns:p14="http://schemas.microsoft.com/office/powerpoint/2010/main" id="1" dur="indefinite" restart="never" nodeType="tmRoot"/>
+        <p:cTn xmlns:p14="http://schemas.microsoft.com/office/powerpoint/2010/main" id="1" dur="indefinite" restart="never" nodeType="tmRoot">
+          <p:childTnLst>
+            <p:seq concurrent="1" nextAc="seek">
+              <p:cTn id="2" dur="indefinite" nodeType="mainSeq">
+                <p:childTnLst>
+                  <p:par>
+                    <p:cTn id="3" fill="hold">
+                      <p:stCondLst>
+                        <p:cond delay="indefinite"/>
+                      </p:stCondLst>
+                      <p:childTnLst>
+                        <p:par>
+                          <p:cTn id="4" fill="hold">
+                            <p:stCondLst>
+                              <p:cond delay="0"/>
+                            </p:stCondLst>
+                            <p:childTnLst>
+                              <p:par>
+                                <p:cTn id="5" presetID="1" presetClass="entr" presetSubtype="0" fill="hold" grpId="0" nodeType="clickEffect">
+                                  <p:stCondLst>
+                                    <p:cond delay="0"/>
+                                  </p:stCondLst>
+                                  <p:childTnLst>
+                                    <p:set>
+                                      <p:cBhvr>
+                                        <p:cTn id="6" dur="1" fill="hold">
+                                          <p:stCondLst>
+                                            <p:cond delay="0"/>
+                                          </p:stCondLst>
+                                        </p:cTn>
+                                        <p:tgtEl>
+                                          <p:spTgt spid="8"/>
+                                        </p:tgtEl>
+                                        <p:attrNameLst>
+                                          <p:attrName>style.visibility</p:attrName>
+                                        </p:attrNameLst>
+                                      </p:cBhvr>
+                                      <p:to>
+                                        <p:strVal val="visible"/>
+                                      </p:to>
+                                    </p:set>
+                                  </p:childTnLst>
+                                </p:cTn>
+                              </p:par>
+                            </p:childTnLst>
+                          </p:cTn>
+                        </p:par>
+                      </p:childTnLst>
+                    </p:cTn>
+                  </p:par>
+                  <p:par>
+                    <p:cTn id="7" fill="hold">
+                      <p:stCondLst>
+                        <p:cond delay="indefinite"/>
+                      </p:stCondLst>
+                      <p:childTnLst>
+                        <p:par>
+                          <p:cTn id="8" fill="hold">
+                            <p:stCondLst>
+                              <p:cond delay="0"/>
+                            </p:stCondLst>
+                            <p:childTnLst>
+                              <p:par>
+                                <p:cTn id="9" presetID="1" presetClass="entr" presetSubtype="0" fill="hold" grpId="0" nodeType="clickEffect">
+                                  <p:stCondLst>
+                                    <p:cond delay="0"/>
+                                  </p:stCondLst>
+                                  <p:childTnLst>
+                                    <p:set>
+                                      <p:cBhvr>
+                                        <p:cTn id="10" dur="1" fill="hold">
+                                          <p:stCondLst>
+                                            <p:cond delay="0"/>
+                                          </p:stCondLst>
+                                        </p:cTn>
+                                        <p:tgtEl>
+                                          <p:spTgt spid="7"/>
+                                        </p:tgtEl>
+                                        <p:attrNameLst>
+                                          <p:attrName>style.visibility</p:attrName>
+                                        </p:attrNameLst>
+                                      </p:cBhvr>
+                                      <p:to>
+                                        <p:strVal val="visible"/>
+                                      </p:to>
+                                    </p:set>
+                                  </p:childTnLst>
+                                </p:cTn>
+                              </p:par>
+                            </p:childTnLst>
+                          </p:cTn>
+                        </p:par>
+                      </p:childTnLst>
+                    </p:cTn>
+                  </p:par>
+                  <p:par>
+                    <p:cTn id="11" fill="hold">
+                      <p:stCondLst>
+                        <p:cond delay="indefinite"/>
+                      </p:stCondLst>
+                      <p:childTnLst>
+                        <p:par>
+                          <p:cTn id="12" fill="hold">
+                            <p:stCondLst>
+                              <p:cond delay="0"/>
+                            </p:stCondLst>
+                            <p:childTnLst>
+                              <p:par>
+                                <p:cTn id="13" presetID="1" presetClass="entr" presetSubtype="0" fill="hold" grpId="0" nodeType="clickEffect">
+                                  <p:stCondLst>
+                                    <p:cond delay="0"/>
+                                  </p:stCondLst>
+                                  <p:childTnLst>
+                                    <p:set>
+                                      <p:cBhvr>
+                                        <p:cTn id="14" dur="1" fill="hold">
+                                          <p:stCondLst>
+                                            <p:cond delay="0"/>
+                                          </p:stCondLst>
+                                        </p:cTn>
+                                        <p:tgtEl>
+                                          <p:spTgt spid="10"/>
+                                        </p:tgtEl>
+                                        <p:attrNameLst>
+                                          <p:attrName>style.visibility</p:attrName>
+                                        </p:attrNameLst>
+                                      </p:cBhvr>
+                                      <p:to>
+                                        <p:strVal val="visible"/>
+                                      </p:to>
+                                    </p:set>
+                                  </p:childTnLst>
+                                </p:cTn>
+                              </p:par>
+                            </p:childTnLst>
+                          </p:cTn>
+                        </p:par>
+                      </p:childTnLst>
+                    </p:cTn>
+                  </p:par>
+                </p:childTnLst>
+              </p:cTn>
+              <p:prevCondLst>
+                <p:cond evt="onPrev" delay="0">
+                  <p:tgtEl>
+                    <p:sldTgt/>
+                  </p:tgtEl>
+                </p:cond>
+              </p:prevCondLst>
+              <p:nextCondLst>
+                <p:cond evt="onNext" delay="0">
+                  <p:tgtEl>
+                    <p:sldTgt/>
+                  </p:tgtEl>
+                </p:cond>
+              </p:nextCondLst>
+            </p:seq>
+          </p:childTnLst>
+        </p:cTn>
       </p:par>
     </p:tnLst>
+    <p:bldLst>
+      <p:bldP spid="7" grpId="0"/>
+      <p:bldP spid="8" grpId="0"/>
+      <p:bldP spid="10" grpId="0"/>
+    </p:bldLst>
   </p:timing>
 </p:sld>
 </file>
@@ -19163,8 +19169,8 @@
         </p:nvSpPr>
         <p:spPr bwMode="auto">
           <a:xfrm>
-            <a:off x="971600" y="3645024"/>
-            <a:ext cx="2736304" cy="1215752"/>
+            <a:off x="971600" y="2996952"/>
+            <a:ext cx="2736304" cy="1863824"/>
           </a:xfrm>
           <a:prstGeom prst="rect">
             <a:avLst/>
@@ -19370,13 +19376,13 @@
               <a:buNone/>
             </a:pPr>
             <a:r>
-              <a:rPr lang="en-US" sz="2800" i="0" dirty="0" err="1" smtClean="0">
+              <a:rPr lang="en-US" sz="2800" i="0" dirty="0">
                 <a:solidFill>
                   <a:schemeClr val="tx1"/>
                 </a:solidFill>
                 <a:cs typeface="Courier New"/>
               </a:rPr>
-              <a:t>debuggable</a:t>
+              <a:t>s</a:t>
             </a:r>
             <a:r>
               <a:rPr lang="en-US" sz="2800" i="0" dirty="0" smtClean="0">
@@ -19385,22 +19391,43 @@
                 </a:solidFill>
                 <a:cs typeface="Courier New"/>
               </a:rPr>
-              <a:t> </a:t>
-            </a:r>
+              <a:t>tatic debugging </a:t>
+            </a:r>
+            <a:endParaRPr lang="en-US" sz="2800" i="0" dirty="0" smtClean="0">
+              <a:solidFill>
+                <a:schemeClr val="tx1"/>
+              </a:solidFill>
+              <a:cs typeface="Courier New"/>
+            </a:endParaRPr>
           </a:p>
           <a:p>
             <a:pPr marL="0" indent="0" algn="ctr">
               <a:buNone/>
             </a:pPr>
             <a:r>
-              <a:rPr lang="en-US" sz="2800" i="0" dirty="0" smtClean="0">
+              <a:rPr lang="en-US" sz="2800" i="0" dirty="0">
                 <a:solidFill>
                   <a:schemeClr val="tx1"/>
                 </a:solidFill>
                 <a:cs typeface="Courier New"/>
               </a:rPr>
-              <a:t>contracts</a:t>
-            </a:r>
+              <a:t>o</a:t>
+            </a:r>
+            <a:r>
+              <a:rPr lang="en-US" sz="2800" i="0" dirty="0" smtClean="0">
+                <a:solidFill>
+                  <a:schemeClr val="tx1"/>
+                </a:solidFill>
+                <a:cs typeface="Courier New"/>
+              </a:rPr>
+              <a:t>f contracts</a:t>
+            </a:r>
+            <a:endParaRPr lang="en-US" sz="2800" i="0" dirty="0" smtClean="0">
+              <a:solidFill>
+                <a:schemeClr val="tx1"/>
+              </a:solidFill>
+              <a:cs typeface="Courier New"/>
+            </a:endParaRPr>
           </a:p>
           <a:p>
             <a:endParaRPr lang="en-US" dirty="0" smtClean="0">
@@ -19912,12 +19939,6 @@
               </a:rPr>
               <a:t>code and specifications must be adapted</a:t>
             </a:r>
-            <a:endParaRPr lang="en-US" sz="2800" i="0" dirty="0" smtClean="0">
-              <a:solidFill>
-                <a:schemeClr val="tx1"/>
-              </a:solidFill>
-              <a:cs typeface="Courier New"/>
-            </a:endParaRPr>
           </a:p>
         </p:txBody>
       </p:sp>
@@ -19934,9 +19955,172 @@
   <p:timing>
     <p:tnLst>
       <p:par>
-        <p:cTn xmlns:p14="http://schemas.microsoft.com/office/powerpoint/2010/main" id="1" dur="indefinite" restart="never" nodeType="tmRoot"/>
+        <p:cTn xmlns:p14="http://schemas.microsoft.com/office/powerpoint/2010/main" id="1" dur="indefinite" restart="never" nodeType="tmRoot">
+          <p:childTnLst>
+            <p:seq concurrent="1" nextAc="seek">
+              <p:cTn id="2" dur="indefinite" nodeType="mainSeq">
+                <p:childTnLst>
+                  <p:par>
+                    <p:cTn id="3" fill="hold">
+                      <p:stCondLst>
+                        <p:cond delay="indefinite"/>
+                      </p:stCondLst>
+                      <p:childTnLst>
+                        <p:par>
+                          <p:cTn id="4" fill="hold">
+                            <p:stCondLst>
+                              <p:cond delay="0"/>
+                            </p:stCondLst>
+                            <p:childTnLst>
+                              <p:par>
+                                <p:cTn id="5" presetID="1" presetClass="entr" presetSubtype="0" fill="hold" grpId="0" nodeType="clickEffect">
+                                  <p:stCondLst>
+                                    <p:cond delay="0"/>
+                                  </p:stCondLst>
+                                  <p:childTnLst>
+                                    <p:set>
+                                      <p:cBhvr>
+                                        <p:cTn id="6" dur="1" fill="hold">
+                                          <p:stCondLst>
+                                            <p:cond delay="0"/>
+                                          </p:stCondLst>
+                                        </p:cTn>
+                                        <p:tgtEl>
+                                          <p:spTgt spid="8"/>
+                                        </p:tgtEl>
+                                        <p:attrNameLst>
+                                          <p:attrName>style.visibility</p:attrName>
+                                        </p:attrNameLst>
+                                      </p:cBhvr>
+                                      <p:to>
+                                        <p:strVal val="visible"/>
+                                      </p:to>
+                                    </p:set>
+                                  </p:childTnLst>
+                                </p:cTn>
+                              </p:par>
+                            </p:childTnLst>
+                          </p:cTn>
+                        </p:par>
+                      </p:childTnLst>
+                    </p:cTn>
+                  </p:par>
+                  <p:par>
+                    <p:cTn id="7" fill="hold">
+                      <p:stCondLst>
+                        <p:cond delay="indefinite"/>
+                      </p:stCondLst>
+                      <p:childTnLst>
+                        <p:par>
+                          <p:cTn id="8" fill="hold">
+                            <p:stCondLst>
+                              <p:cond delay="0"/>
+                            </p:stCondLst>
+                            <p:childTnLst>
+                              <p:par>
+                                <p:cTn id="9" presetID="1" presetClass="entr" presetSubtype="0" fill="hold" grpId="0" nodeType="clickEffect">
+                                  <p:stCondLst>
+                                    <p:cond delay="0"/>
+                                  </p:stCondLst>
+                                  <p:childTnLst>
+                                    <p:set>
+                                      <p:cBhvr>
+                                        <p:cTn id="10" dur="1" fill="hold">
+                                          <p:stCondLst>
+                                            <p:cond delay="0"/>
+                                          </p:stCondLst>
+                                        </p:cTn>
+                                        <p:tgtEl>
+                                          <p:spTgt spid="7"/>
+                                        </p:tgtEl>
+                                        <p:attrNameLst>
+                                          <p:attrName>style.visibility</p:attrName>
+                                        </p:attrNameLst>
+                                      </p:cBhvr>
+                                      <p:to>
+                                        <p:strVal val="visible"/>
+                                      </p:to>
+                                    </p:set>
+                                  </p:childTnLst>
+                                </p:cTn>
+                              </p:par>
+                            </p:childTnLst>
+                          </p:cTn>
+                        </p:par>
+                      </p:childTnLst>
+                    </p:cTn>
+                  </p:par>
+                  <p:par>
+                    <p:cTn id="11" fill="hold">
+                      <p:stCondLst>
+                        <p:cond delay="indefinite"/>
+                      </p:stCondLst>
+                      <p:childTnLst>
+                        <p:par>
+                          <p:cTn id="12" fill="hold">
+                            <p:stCondLst>
+                              <p:cond delay="0"/>
+                            </p:stCondLst>
+                            <p:childTnLst>
+                              <p:par>
+                                <p:cTn id="13" presetID="1" presetClass="entr" presetSubtype="0" fill="hold" grpId="0" nodeType="clickEffect">
+                                  <p:stCondLst>
+                                    <p:cond delay="0"/>
+                                  </p:stCondLst>
+                                  <p:childTnLst>
+                                    <p:set>
+                                      <p:cBhvr>
+                                        <p:cTn id="14" dur="1" fill="hold">
+                                          <p:stCondLst>
+                                            <p:cond delay="0"/>
+                                          </p:stCondLst>
+                                        </p:cTn>
+                                        <p:tgtEl>
+                                          <p:spTgt spid="9"/>
+                                        </p:tgtEl>
+                                        <p:attrNameLst>
+                                          <p:attrName>style.visibility</p:attrName>
+                                        </p:attrNameLst>
+                                      </p:cBhvr>
+                                      <p:to>
+                                        <p:strVal val="visible"/>
+                                      </p:to>
+                                    </p:set>
+                                  </p:childTnLst>
+                                </p:cTn>
+                              </p:par>
+                            </p:childTnLst>
+                          </p:cTn>
+                        </p:par>
+                      </p:childTnLst>
+                    </p:cTn>
+                  </p:par>
+                </p:childTnLst>
+              </p:cTn>
+              <p:prevCondLst>
+                <p:cond evt="onPrev" delay="0">
+                  <p:tgtEl>
+                    <p:sldTgt/>
+                  </p:tgtEl>
+                </p:cond>
+              </p:prevCondLst>
+              <p:nextCondLst>
+                <p:cond evt="onNext" delay="0">
+                  <p:tgtEl>
+                    <p:sldTgt/>
+                  </p:tgtEl>
+                </p:cond>
+              </p:nextCondLst>
+            </p:seq>
+          </p:childTnLst>
+        </p:cTn>
       </p:par>
     </p:tnLst>
+    <p:bldLst>
+      <p:bldP spid="7" grpId="0"/>
+      <p:bldP spid="8" grpId="0"/>
+      <p:bldP spid="9" grpId="0"/>
+    </p:bldLst>
   </p:timing>
 </p:sld>
 </file>
@@ -20066,25 +20250,7 @@
                 </a:solidFill>
                 <a:cs typeface="Courier New"/>
               </a:rPr>
-              <a:t>Now </a:t>
-            </a:r>
-            <a:r>
-              <a:rPr lang="en-US" sz="2800" dirty="0" smtClean="0">
-                <a:solidFill>
-                  <a:schemeClr val="tx1"/>
-                </a:solidFill>
-                <a:cs typeface="Courier New"/>
-              </a:rPr>
-              <a:t>available as </a:t>
-            </a:r>
-            <a:r>
-              <a:rPr lang="en-US" sz="2800" dirty="0" smtClean="0">
-                <a:solidFill>
-                  <a:schemeClr val="tx1"/>
-                </a:solidFill>
-                <a:cs typeface="Courier New"/>
-              </a:rPr>
-              <a:t>beta</a:t>
+              <a:t>Now available as beta</a:t>
             </a:r>
           </a:p>
           <a:p>
@@ -20142,7 +20308,6 @@
               <a:rPr lang="en-US" sz="2800" b="1" dirty="0"/>
               <a:t> </a:t>
             </a:r>
-            <a:endParaRPr lang="en-US" sz="2800" b="1" dirty="0"/>
           </a:p>
           <a:p>
             <a:pPr marL="0" lvl="1" indent="0">
@@ -20309,17 +20474,8 @@
             </a:pPr>
             <a:r>
               <a:rPr lang="en-US" sz="2800" dirty="0" smtClean="0"/>
-              <a:t>programming </a:t>
-            </a:r>
-            <a:r>
-              <a:rPr lang="en-US" sz="2800" dirty="0" smtClean="0"/>
-              <a:t>language for long-lived embedded critical </a:t>
-            </a:r>
-            <a:r>
-              <a:rPr lang="en-US" sz="2800" dirty="0" smtClean="0"/>
-              <a:t>software</a:t>
-            </a:r>
-            <a:endParaRPr lang="en-US" sz="2800" dirty="0" smtClean="0"/>
+              <a:t>programming language for long-lived embedded critical software</a:t>
+            </a:r>
           </a:p>
         </p:txBody>
       </p:sp>
@@ -20651,7 +20807,6 @@
               <a:rPr lang="en-US" sz="2800" i="0" dirty="0" smtClean="0"/>
               <a:t>Ada subset for formal verification</a:t>
             </a:r>
-            <a:endParaRPr lang="en-US" sz="2800" i="0" dirty="0" smtClean="0"/>
           </a:p>
         </p:txBody>
       </p:sp>
@@ -20880,7 +21035,6 @@
               <a:rPr lang="en-US" sz="2800" i="0" dirty="0" smtClean="0"/>
               <a:t>rogramming by contract </a:t>
             </a:r>
-            <a:endParaRPr lang="en-US" sz="2800" i="0" dirty="0" smtClean="0"/>
           </a:p>
         </p:txBody>
       </p:sp>
@@ -21139,7 +21293,6 @@
               <a:rPr lang="en-US" sz="2800" i="0" dirty="0" smtClean="0"/>
               <a:t>ractical formal verification</a:t>
             </a:r>
-            <a:endParaRPr lang="en-US" sz="2800" i="0" dirty="0" smtClean="0"/>
           </a:p>
         </p:txBody>
       </p:sp>
@@ -22900,23 +23053,7 @@
                   <a:schemeClr val="accent1"/>
                 </a:solidFill>
               </a:rPr>
-              <a:t>s</a:t>
-            </a:r>
-            <a:r>
-              <a:rPr lang="en-US" sz="1800" b="1" i="0" dirty="0" smtClean="0">
-                <a:solidFill>
-                  <a:schemeClr val="accent1"/>
-                </a:solidFill>
-              </a:rPr>
-              <a:t> </a:t>
-            </a:r>
-            <a:r>
-              <a:rPr lang="en-US" sz="1800" b="1" i="0" dirty="0" smtClean="0">
-                <a:solidFill>
-                  <a:schemeClr val="accent1"/>
-                </a:solidFill>
-              </a:rPr>
-              <a:t>consistent</a:t>
+              <a:t>s consistent</a:t>
             </a:r>
             <a:endParaRPr lang="en-US" sz="1800" b="1" i="0" kern="1200" dirty="0" smtClean="0">
               <a:solidFill>
@@ -23524,23 +23661,7 @@
             </a:pPr>
             <a:r>
               <a:rPr lang="en-US" sz="2800" dirty="0" smtClean="0"/>
-              <a:t>Contract =</a:t>
-            </a:r>
-            <a:r>
-              <a:rPr lang="en-US" sz="2800" dirty="0" smtClean="0"/>
-              <a:t> </a:t>
-            </a:r>
-            <a:r>
-              <a:rPr lang="en-US" sz="2800" dirty="0" smtClean="0"/>
-              <a:t>agreement </a:t>
-            </a:r>
-            <a:r>
-              <a:rPr lang="en-US" sz="2800" dirty="0" smtClean="0"/>
-              <a:t>between </a:t>
-            </a:r>
-            <a:r>
-              <a:rPr lang="en-US" sz="2800" dirty="0" smtClean="0"/>
-              <a:t>client &amp; supplier </a:t>
+              <a:t>Contract = agreement between client &amp; supplier </a:t>
             </a:r>
           </a:p>
           <a:p>
@@ -23795,7 +23916,6 @@
               <a:rPr lang="en-US" sz="2800" i="0" dirty="0" smtClean="0"/>
               <a:t>Program</a:t>
             </a:r>
-            <a:endParaRPr lang="en-US" sz="2800" i="0" dirty="0" smtClean="0"/>
           </a:p>
         </p:txBody>
       </p:sp>
@@ -24568,7 +24688,6 @@
               <a:rPr lang="en-US" sz="4000" i="0" dirty="0" smtClean="0"/>
               <a:t>Dynamic Verification</a:t>
             </a:r>
-            <a:endParaRPr lang="en-US" sz="4000" i="0" dirty="0" smtClean="0"/>
           </a:p>
         </p:txBody>
       </p:sp>
@@ -24793,7 +24912,6 @@
               <a:rPr lang="en-US" sz="4000" i="0" dirty="0" smtClean="0"/>
               <a:t>Formal Verification</a:t>
             </a:r>
-            <a:endParaRPr lang="en-US" sz="4000" i="0" dirty="0" smtClean="0"/>
           </a:p>
         </p:txBody>
       </p:sp>

</xml_diff>

<commit_message>
M419-014 Take into account David M's comments
</commit_message>
<xml_diff>
--- a/slides/ERTS_20140205/SPARK_2014_Case_Studies.pptx
+++ b/slides/ERTS_20140205/SPARK_2014_Case_Studies.pptx
@@ -20,11 +20,11 @@
     <p:sldId id="1325" r:id="rId8"/>
     <p:sldId id="1300" r:id="rId9"/>
     <p:sldId id="1294" r:id="rId10"/>
-    <p:sldId id="1326" r:id="rId11"/>
-    <p:sldId id="1327" r:id="rId12"/>
-    <p:sldId id="1328" r:id="rId13"/>
+    <p:sldId id="1339" r:id="rId11"/>
+    <p:sldId id="1340" r:id="rId12"/>
+    <p:sldId id="1341" r:id="rId13"/>
     <p:sldId id="1298" r:id="rId14"/>
-    <p:sldId id="1329" r:id="rId15"/>
+    <p:sldId id="1342" r:id="rId15"/>
     <p:sldId id="1332" r:id="rId16"/>
     <p:sldId id="1313" r:id="rId17"/>
     <p:sldId id="1331" r:id="rId18"/>
@@ -8170,28 +8170,22 @@
       </p:pic>
       <p:pic>
         <p:nvPicPr>
-          <p:cNvPr id="14" name="Image 13" descr="Mitsubishi_Electric_logo.svg.png"/>
+          <p:cNvPr id="8" name="Image 7" descr="Mitsubishi Electric Color Logo.jpg"/>
           <p:cNvPicPr>
             <a:picLocks noChangeAspect="1"/>
           </p:cNvPicPr>
           <p:nvPr/>
         </p:nvPicPr>
         <p:blipFill>
-          <a:blip r:embed="rId4">
-            <a:extLst>
-              <a:ext uri="{28A0092B-C50C-407E-A947-70E740481C1C}">
-                <a14:useLocalDpi xmlns:a14="http://schemas.microsoft.com/office/drawing/2010/main" val="0"/>
-              </a:ext>
-            </a:extLst>
-          </a:blip>
+          <a:blip r:embed="rId4" cstate="print"/>
           <a:stretch>
             <a:fillRect/>
           </a:stretch>
         </p:blipFill>
         <p:spPr>
           <a:xfrm>
-            <a:off x="6876256" y="1052736"/>
-            <a:ext cx="2051719" cy="625335"/>
+            <a:off x="7041542" y="1066289"/>
+            <a:ext cx="1778930" cy="778535"/>
           </a:xfrm>
           <a:prstGeom prst="rect">
             <a:avLst/>
@@ -8275,7 +8269,7 @@
           <p:nvPr/>
         </p:nvPicPr>
         <p:blipFill>
-          <a:blip r:embed="rId2">
+          <a:blip r:embed="rId2" cstate="print">
             <a:extLst>
               <a:ext uri="{28A0092B-C50C-407E-A947-70E740481C1C}">
                 <a14:useLocalDpi xmlns:a14="http://schemas.microsoft.com/office/drawing/2010/main" val="0"/>
@@ -8970,6 +8964,796 @@
       </p:sp>
       <p:sp>
         <p:nvSpPr>
+          <p:cNvPr id="14" name="Freeform 23"/>
+          <p:cNvSpPr/>
+          <p:nvPr/>
+        </p:nvSpPr>
+        <p:spPr>
+          <a:xfrm rot="11662850" flipH="1" flipV="1">
+            <a:off x="1357646" y="3714419"/>
+            <a:ext cx="713910" cy="1229362"/>
+          </a:xfrm>
+          <a:custGeom>
+            <a:avLst/>
+            <a:gdLst>
+              <a:gd name="connsiteX0" fmla="*/ 831273 w 831273"/>
+              <a:gd name="connsiteY0" fmla="*/ 1149927 h 1149927"/>
+              <a:gd name="connsiteX1" fmla="*/ 207818 w 831273"/>
+              <a:gd name="connsiteY1" fmla="*/ 775854 h 1149927"/>
+              <a:gd name="connsiteX2" fmla="*/ 0 w 831273"/>
+              <a:gd name="connsiteY2" fmla="*/ 0 h 1149927"/>
+              <a:gd name="connsiteX0" fmla="*/ 840798 w 840798"/>
+              <a:gd name="connsiteY0" fmla="*/ 911802 h 911802"/>
+              <a:gd name="connsiteX1" fmla="*/ 207818 w 840798"/>
+              <a:gd name="connsiteY1" fmla="*/ 775854 h 911802"/>
+              <a:gd name="connsiteX2" fmla="*/ 0 w 840798"/>
+              <a:gd name="connsiteY2" fmla="*/ 0 h 911802"/>
+              <a:gd name="connsiteX0" fmla="*/ 840798 w 840798"/>
+              <a:gd name="connsiteY0" fmla="*/ 911802 h 911802"/>
+              <a:gd name="connsiteX1" fmla="*/ 198293 w 840798"/>
+              <a:gd name="connsiteY1" fmla="*/ 547254 h 911802"/>
+              <a:gd name="connsiteX2" fmla="*/ 0 w 840798"/>
+              <a:gd name="connsiteY2" fmla="*/ 0 h 911802"/>
+            </a:gdLst>
+            <a:ahLst/>
+            <a:cxnLst>
+              <a:cxn ang="0">
+                <a:pos x="connsiteX0" y="connsiteY0"/>
+              </a:cxn>
+              <a:cxn ang="0">
+                <a:pos x="connsiteX1" y="connsiteY1"/>
+              </a:cxn>
+              <a:cxn ang="0">
+                <a:pos x="connsiteX2" y="connsiteY2"/>
+              </a:cxn>
+            </a:cxnLst>
+            <a:rect l="l" t="t" r="r" b="b"/>
+            <a:pathLst>
+              <a:path w="840798" h="911802">
+                <a:moveTo>
+                  <a:pt x="840798" y="911802"/>
+                </a:moveTo>
+                <a:cubicBezTo>
+                  <a:pt x="598343" y="820592"/>
+                  <a:pt x="336838" y="738908"/>
+                  <a:pt x="198293" y="547254"/>
+                </a:cubicBezTo>
+                <a:cubicBezTo>
+                  <a:pt x="59748" y="355600"/>
+                  <a:pt x="34636" y="292100"/>
+                  <a:pt x="0" y="0"/>
+                </a:cubicBezTo>
+              </a:path>
+            </a:pathLst>
+          </a:custGeom>
+          <a:noFill/>
+          <a:ln w="38100" cmpd="sng">
+            <a:solidFill>
+              <a:srgbClr val="7030A0"/>
+            </a:solidFill>
+            <a:tailEnd type="triangle"/>
+          </a:ln>
+        </p:spPr>
+        <p:style>
+          <a:lnRef idx="2">
+            <a:schemeClr val="accent1">
+              <a:shade val="50000"/>
+            </a:schemeClr>
+          </a:lnRef>
+          <a:fillRef idx="1">
+            <a:schemeClr val="accent1"/>
+          </a:fillRef>
+          <a:effectRef idx="0">
+            <a:schemeClr val="accent1"/>
+          </a:effectRef>
+          <a:fontRef idx="minor">
+            <a:schemeClr val="lt1"/>
+          </a:fontRef>
+        </p:style>
+        <p:txBody>
+          <a:bodyPr rtlCol="0" anchor="ctr"/>
+          <a:lstStyle/>
+          <a:p>
+            <a:pPr algn="ctr"/>
+            <a:endParaRPr lang="en-US" sz="1800" dirty="0">
+              <a:solidFill>
+                <a:srgbClr val="FFFFFF"/>
+              </a:solidFill>
+            </a:endParaRPr>
+          </a:p>
+        </p:txBody>
+      </p:sp>
+      <p:sp>
+        <p:nvSpPr>
+          <p:cNvPr id="15" name="Text Placeholder 1"/>
+          <p:cNvSpPr txBox="1">
+            <a:spLocks/>
+          </p:cNvSpPr>
+          <p:nvPr/>
+        </p:nvSpPr>
+        <p:spPr bwMode="auto">
+          <a:xfrm>
+            <a:off x="755576" y="4941168"/>
+            <a:ext cx="3312368" cy="864096"/>
+          </a:xfrm>
+          <a:prstGeom prst="rect">
+            <a:avLst/>
+          </a:prstGeom>
+          <a:noFill/>
+          <a:ln>
+            <a:noFill/>
+          </a:ln>
+          <a:extLst>
+            <a:ext uri="{909E8E84-426E-40dd-AFC4-6F175D3DCCD1}">
+              <a14:hiddenFill xmlns:a14="http://schemas.microsoft.com/office/drawing/2010/main">
+                <a:solidFill>
+                  <a:srgbClr val="FFFFFF"/>
+                </a:solidFill>
+              </a14:hiddenFill>
+            </a:ext>
+            <a:ext uri="{91240B29-F687-4f45-9708-019B960494DF}">
+              <a14:hiddenLine xmlns:a14="http://schemas.microsoft.com/office/drawing/2010/main" w="9525">
+                <a:solidFill>
+                  <a:srgbClr val="000000"/>
+                </a:solidFill>
+                <a:miter lim="800000"/>
+                <a:headEnd/>
+                <a:tailEnd/>
+              </a14:hiddenLine>
+            </a:ext>
+          </a:extLst>
+        </p:spPr>
+        <p:txBody>
+          <a:bodyPr vert="horz" wrap="square" lIns="91440" tIns="45720" rIns="91440" bIns="45720" numCol="1" anchor="t" anchorCtr="0" compatLnSpc="1">
+            <a:prstTxWarp prst="textNoShape">
+              <a:avLst/>
+            </a:prstTxWarp>
+            <a:normAutofit/>
+          </a:bodyPr>
+          <a:lstStyle>
+            <a:lvl1pPr marL="342900" indent="-342900" algn="l" rtl="0" eaLnBrk="1" fontAlgn="base" hangingPunct="1">
+              <a:lnSpc>
+                <a:spcPct val="120000"/>
+              </a:lnSpc>
+              <a:spcBef>
+                <a:spcPct val="20000"/>
+              </a:spcBef>
+              <a:spcAft>
+                <a:spcPct val="0"/>
+              </a:spcAft>
+              <a:buClr>
+                <a:srgbClr val="404040"/>
+              </a:buClr>
+              <a:buChar char="•"/>
+              <a:defRPr sz="1600" b="1">
+                <a:solidFill>
+                  <a:srgbClr val="404040"/>
+                </a:solidFill>
+                <a:latin typeface="+mn-lt"/>
+                <a:ea typeface="ＭＳ Ｐゴシック" charset="-128"/>
+                <a:cs typeface="ＭＳ Ｐゴシック" charset="-128"/>
+              </a:defRPr>
+            </a:lvl1pPr>
+            <a:lvl2pPr marL="742950" indent="-285750" algn="l" rtl="0" eaLnBrk="1" fontAlgn="base" hangingPunct="1">
+              <a:lnSpc>
+                <a:spcPct val="120000"/>
+              </a:lnSpc>
+              <a:spcBef>
+                <a:spcPct val="20000"/>
+              </a:spcBef>
+              <a:spcAft>
+                <a:spcPct val="0"/>
+              </a:spcAft>
+              <a:buChar char="–"/>
+              <a:defRPr sz="1400">
+                <a:solidFill>
+                  <a:schemeClr val="tx1"/>
+                </a:solidFill>
+                <a:latin typeface="+mn-lt"/>
+                <a:ea typeface="ヒラギノ角ゴ ProN W3"/>
+                <a:cs typeface="ヒラギノ角ゴ ProN W3"/>
+              </a:defRPr>
+            </a:lvl2pPr>
+            <a:lvl3pPr marL="1143000" indent="-228600" algn="l" rtl="0" eaLnBrk="1" fontAlgn="base" hangingPunct="1">
+              <a:lnSpc>
+                <a:spcPct val="120000"/>
+              </a:lnSpc>
+              <a:spcBef>
+                <a:spcPct val="20000"/>
+              </a:spcBef>
+              <a:spcAft>
+                <a:spcPct val="0"/>
+              </a:spcAft>
+              <a:buChar char="–"/>
+              <a:defRPr sz="1200">
+                <a:solidFill>
+                  <a:schemeClr val="tx1"/>
+                </a:solidFill>
+                <a:latin typeface="+mn-lt"/>
+                <a:ea typeface="ヒラギノ角ゴ ProN W3"/>
+                <a:cs typeface="ヒラギノ角ゴ ProN W3"/>
+              </a:defRPr>
+            </a:lvl3pPr>
+            <a:lvl4pPr marL="1600200" indent="-228600" algn="l" rtl="0" eaLnBrk="1" fontAlgn="base" hangingPunct="1">
+              <a:spcBef>
+                <a:spcPct val="20000"/>
+              </a:spcBef>
+              <a:spcAft>
+                <a:spcPct val="0"/>
+              </a:spcAft>
+              <a:buFont typeface="Times" charset="0"/>
+              <a:buChar char="•"/>
+              <a:defRPr sz="1200">
+                <a:solidFill>
+                  <a:schemeClr val="tx1"/>
+                </a:solidFill>
+                <a:latin typeface="+mn-lt"/>
+                <a:ea typeface="ヒラギノ角ゴ ProN W3"/>
+                <a:cs typeface="ヒラギノ角ゴ ProN W3"/>
+              </a:defRPr>
+            </a:lvl4pPr>
+            <a:lvl5pPr marL="2057400" indent="-228600" algn="l" rtl="0" eaLnBrk="1" fontAlgn="base" hangingPunct="1">
+              <a:spcBef>
+                <a:spcPct val="20000"/>
+              </a:spcBef>
+              <a:spcAft>
+                <a:spcPct val="0"/>
+              </a:spcAft>
+              <a:buFont typeface="Times" charset="0"/>
+              <a:buChar char="•"/>
+              <a:defRPr sz="1200">
+                <a:solidFill>
+                  <a:schemeClr val="tx1"/>
+                </a:solidFill>
+                <a:latin typeface="+mn-lt"/>
+                <a:ea typeface="ヒラギノ角ゴ ProN W3"/>
+                <a:cs typeface="ヒラギノ角ゴ ProN W3"/>
+              </a:defRPr>
+            </a:lvl5pPr>
+            <a:lvl6pPr marL="2514600" indent="-228600" algn="l" rtl="0" eaLnBrk="1" fontAlgn="base" hangingPunct="1">
+              <a:spcBef>
+                <a:spcPct val="20000"/>
+              </a:spcBef>
+              <a:spcAft>
+                <a:spcPct val="0"/>
+              </a:spcAft>
+              <a:buFont typeface="Times" pitchFamily="18" charset="0"/>
+              <a:buChar char="•"/>
+              <a:defRPr sz="1200">
+                <a:solidFill>
+                  <a:schemeClr val="tx1"/>
+                </a:solidFill>
+                <a:latin typeface="+mn-lt"/>
+              </a:defRPr>
+            </a:lvl6pPr>
+            <a:lvl7pPr marL="2971800" indent="-228600" algn="l" rtl="0" eaLnBrk="1" fontAlgn="base" hangingPunct="1">
+              <a:spcBef>
+                <a:spcPct val="20000"/>
+              </a:spcBef>
+              <a:spcAft>
+                <a:spcPct val="0"/>
+              </a:spcAft>
+              <a:buFont typeface="Times" pitchFamily="18" charset="0"/>
+              <a:buChar char="•"/>
+              <a:defRPr sz="1200">
+                <a:solidFill>
+                  <a:schemeClr val="tx1"/>
+                </a:solidFill>
+                <a:latin typeface="+mn-lt"/>
+              </a:defRPr>
+            </a:lvl7pPr>
+            <a:lvl8pPr marL="3429000" indent="-228600" algn="l" rtl="0" eaLnBrk="1" fontAlgn="base" hangingPunct="1">
+              <a:spcBef>
+                <a:spcPct val="20000"/>
+              </a:spcBef>
+              <a:spcAft>
+                <a:spcPct val="0"/>
+              </a:spcAft>
+              <a:buFont typeface="Times" pitchFamily="18" charset="0"/>
+              <a:buChar char="•"/>
+              <a:defRPr sz="1200">
+                <a:solidFill>
+                  <a:schemeClr val="tx1"/>
+                </a:solidFill>
+                <a:latin typeface="+mn-lt"/>
+              </a:defRPr>
+            </a:lvl8pPr>
+            <a:lvl9pPr marL="3886200" indent="-228600" algn="l" rtl="0" eaLnBrk="1" fontAlgn="base" hangingPunct="1">
+              <a:spcBef>
+                <a:spcPct val="20000"/>
+              </a:spcBef>
+              <a:spcAft>
+                <a:spcPct val="0"/>
+              </a:spcAft>
+              <a:buFont typeface="Times" pitchFamily="18" charset="0"/>
+              <a:buChar char="•"/>
+              <a:defRPr sz="1200">
+                <a:solidFill>
+                  <a:schemeClr val="tx1"/>
+                </a:solidFill>
+                <a:latin typeface="+mn-lt"/>
+              </a:defRPr>
+            </a:lvl9pPr>
+          </a:lstStyle>
+          <a:p>
+            <a:pPr marL="0" indent="0">
+              <a:buFontTx/>
+              <a:buNone/>
+            </a:pPr>
+            <a:r>
+              <a:rPr lang="en-US" sz="2400" i="0" dirty="0" err="1" smtClean="0"/>
+              <a:t>Restrictive_Merge</a:t>
+            </a:r>
+            <a:r>
+              <a:rPr lang="en-US" sz="2400" i="0" dirty="0" smtClean="0"/>
+              <a:t>?</a:t>
+            </a:r>
+          </a:p>
+        </p:txBody>
+      </p:sp>
+      <p:cxnSp>
+        <p:nvCxnSpPr>
+          <p:cNvPr id="18" name="Connecteur droit 17"/>
+          <p:cNvCxnSpPr/>
+          <p:nvPr/>
+        </p:nvCxnSpPr>
+        <p:spPr bwMode="auto">
+          <a:xfrm>
+            <a:off x="1259632" y="3573016"/>
+            <a:ext cx="432048" cy="0"/>
+          </a:xfrm>
+          <a:prstGeom prst="line">
+            <a:avLst/>
+          </a:prstGeom>
+          <a:ln>
+            <a:solidFill>
+              <a:srgbClr val="FF0000"/>
+            </a:solidFill>
+            <a:headEnd type="none" w="med" len="med"/>
+            <a:tailEnd type="none" w="med" len="med"/>
+          </a:ln>
+        </p:spPr>
+        <p:style>
+          <a:lnRef idx="3">
+            <a:schemeClr val="accent4"/>
+          </a:lnRef>
+          <a:fillRef idx="0">
+            <a:schemeClr val="accent4"/>
+          </a:fillRef>
+          <a:effectRef idx="2">
+            <a:schemeClr val="accent4"/>
+          </a:effectRef>
+          <a:fontRef idx="minor">
+            <a:schemeClr val="tx1"/>
+          </a:fontRef>
+        </p:style>
+      </p:cxnSp>
+      <p:cxnSp>
+        <p:nvCxnSpPr>
+          <p:cNvPr id="24" name="Connecteur droit 23"/>
+          <p:cNvCxnSpPr/>
+          <p:nvPr/>
+        </p:nvCxnSpPr>
+        <p:spPr bwMode="auto">
+          <a:xfrm>
+            <a:off x="1619672" y="3356992"/>
+            <a:ext cx="288032" cy="0"/>
+          </a:xfrm>
+          <a:prstGeom prst="line">
+            <a:avLst/>
+          </a:prstGeom>
+          <a:ln>
+            <a:solidFill>
+              <a:srgbClr val="FF0000"/>
+            </a:solidFill>
+            <a:headEnd type="none" w="med" len="med"/>
+            <a:tailEnd type="none" w="med" len="med"/>
+          </a:ln>
+        </p:spPr>
+        <p:style>
+          <a:lnRef idx="3">
+            <a:schemeClr val="accent4"/>
+          </a:lnRef>
+          <a:fillRef idx="0">
+            <a:schemeClr val="accent4"/>
+          </a:fillRef>
+          <a:effectRef idx="2">
+            <a:schemeClr val="accent4"/>
+          </a:effectRef>
+          <a:fontRef idx="minor">
+            <a:schemeClr val="tx1"/>
+          </a:fontRef>
+        </p:style>
+      </p:cxnSp>
+      <p:cxnSp>
+        <p:nvCxnSpPr>
+          <p:cNvPr id="26" name="Connecteur droit 25"/>
+          <p:cNvCxnSpPr/>
+          <p:nvPr/>
+        </p:nvCxnSpPr>
+        <p:spPr bwMode="auto">
+          <a:xfrm>
+            <a:off x="1907704" y="3933056"/>
+            <a:ext cx="720080" cy="0"/>
+          </a:xfrm>
+          <a:prstGeom prst="line">
+            <a:avLst/>
+          </a:prstGeom>
+          <a:ln>
+            <a:solidFill>
+              <a:srgbClr val="FF0000"/>
+            </a:solidFill>
+            <a:headEnd type="none" w="med" len="med"/>
+            <a:tailEnd type="none" w="med" len="med"/>
+          </a:ln>
+        </p:spPr>
+        <p:style>
+          <a:lnRef idx="3">
+            <a:schemeClr val="accent4"/>
+          </a:lnRef>
+          <a:fillRef idx="0">
+            <a:schemeClr val="accent4"/>
+          </a:fillRef>
+          <a:effectRef idx="2">
+            <a:schemeClr val="accent4"/>
+          </a:effectRef>
+          <a:fontRef idx="minor">
+            <a:schemeClr val="tx1"/>
+          </a:fontRef>
+        </p:style>
+      </p:cxnSp>
+      <p:cxnSp>
+        <p:nvCxnSpPr>
+          <p:cNvPr id="28" name="Connecteur droit 27"/>
+          <p:cNvCxnSpPr/>
+          <p:nvPr/>
+        </p:nvCxnSpPr>
+        <p:spPr bwMode="auto">
+          <a:xfrm>
+            <a:off x="2627784" y="3501008"/>
+            <a:ext cx="504056" cy="0"/>
+          </a:xfrm>
+          <a:prstGeom prst="line">
+            <a:avLst/>
+          </a:prstGeom>
+          <a:ln>
+            <a:solidFill>
+              <a:srgbClr val="FF0000"/>
+            </a:solidFill>
+            <a:headEnd type="none" w="med" len="med"/>
+            <a:tailEnd type="none" w="med" len="med"/>
+          </a:ln>
+        </p:spPr>
+        <p:style>
+          <a:lnRef idx="3">
+            <a:schemeClr val="accent4"/>
+          </a:lnRef>
+          <a:fillRef idx="0">
+            <a:schemeClr val="accent4"/>
+          </a:fillRef>
+          <a:effectRef idx="2">
+            <a:schemeClr val="accent4"/>
+          </a:effectRef>
+          <a:fontRef idx="minor">
+            <a:schemeClr val="tx1"/>
+          </a:fontRef>
+        </p:style>
+      </p:cxnSp>
+      <p:cxnSp>
+        <p:nvCxnSpPr>
+          <p:cNvPr id="30" name="Connecteur droit 29"/>
+          <p:cNvCxnSpPr/>
+          <p:nvPr/>
+        </p:nvCxnSpPr>
+        <p:spPr bwMode="auto">
+          <a:xfrm>
+            <a:off x="3131840" y="2492896"/>
+            <a:ext cx="144016" cy="0"/>
+          </a:xfrm>
+          <a:prstGeom prst="line">
+            <a:avLst/>
+          </a:prstGeom>
+          <a:ln>
+            <a:solidFill>
+              <a:srgbClr val="FF0000"/>
+            </a:solidFill>
+            <a:headEnd type="none" w="med" len="med"/>
+            <a:tailEnd type="none" w="med" len="med"/>
+          </a:ln>
+        </p:spPr>
+        <p:style>
+          <a:lnRef idx="3">
+            <a:schemeClr val="accent4"/>
+          </a:lnRef>
+          <a:fillRef idx="0">
+            <a:schemeClr val="accent4"/>
+          </a:fillRef>
+          <a:effectRef idx="2">
+            <a:schemeClr val="accent4"/>
+          </a:effectRef>
+          <a:fontRef idx="minor">
+            <a:schemeClr val="tx1"/>
+          </a:fontRef>
+        </p:style>
+      </p:cxnSp>
+      <p:cxnSp>
+        <p:nvCxnSpPr>
+          <p:cNvPr id="32" name="Connecteur droit 31"/>
+          <p:cNvCxnSpPr/>
+          <p:nvPr/>
+        </p:nvCxnSpPr>
+        <p:spPr bwMode="auto">
+          <a:xfrm>
+            <a:off x="3275856" y="2420888"/>
+            <a:ext cx="72008" cy="0"/>
+          </a:xfrm>
+          <a:prstGeom prst="line">
+            <a:avLst/>
+          </a:prstGeom>
+          <a:ln>
+            <a:solidFill>
+              <a:srgbClr val="FF0000"/>
+            </a:solidFill>
+            <a:headEnd type="none" w="med" len="med"/>
+            <a:tailEnd type="none" w="med" len="med"/>
+          </a:ln>
+        </p:spPr>
+        <p:style>
+          <a:lnRef idx="3">
+            <a:schemeClr val="accent4"/>
+          </a:lnRef>
+          <a:fillRef idx="0">
+            <a:schemeClr val="accent4"/>
+          </a:fillRef>
+          <a:effectRef idx="2">
+            <a:schemeClr val="accent4"/>
+          </a:effectRef>
+          <a:fontRef idx="minor">
+            <a:schemeClr val="tx1"/>
+          </a:fontRef>
+        </p:style>
+      </p:cxnSp>
+      <p:cxnSp>
+        <p:nvCxnSpPr>
+          <p:cNvPr id="34" name="Connecteur droit 33"/>
+          <p:cNvCxnSpPr/>
+          <p:nvPr/>
+        </p:nvCxnSpPr>
+        <p:spPr bwMode="auto">
+          <a:xfrm flipH="1">
+            <a:off x="3347864" y="3284984"/>
+            <a:ext cx="288032" cy="0"/>
+          </a:xfrm>
+          <a:prstGeom prst="line">
+            <a:avLst/>
+          </a:prstGeom>
+          <a:ln>
+            <a:solidFill>
+              <a:srgbClr val="FF0000"/>
+            </a:solidFill>
+            <a:headEnd type="none" w="med" len="med"/>
+            <a:tailEnd type="none" w="med" len="med"/>
+          </a:ln>
+        </p:spPr>
+        <p:style>
+          <a:lnRef idx="3">
+            <a:schemeClr val="accent4"/>
+          </a:lnRef>
+          <a:fillRef idx="0">
+            <a:schemeClr val="accent4"/>
+          </a:fillRef>
+          <a:effectRef idx="2">
+            <a:schemeClr val="accent4"/>
+          </a:effectRef>
+          <a:fontRef idx="minor">
+            <a:schemeClr val="tx1"/>
+          </a:fontRef>
+        </p:style>
+      </p:cxnSp>
+      <p:cxnSp>
+        <p:nvCxnSpPr>
+          <p:cNvPr id="39" name="Connecteur droit 38"/>
+          <p:cNvCxnSpPr/>
+          <p:nvPr/>
+        </p:nvCxnSpPr>
+        <p:spPr bwMode="auto">
+          <a:xfrm flipH="1">
+            <a:off x="3635896" y="3356992"/>
+            <a:ext cx="144016" cy="0"/>
+          </a:xfrm>
+          <a:prstGeom prst="line">
+            <a:avLst/>
+          </a:prstGeom>
+          <a:ln>
+            <a:solidFill>
+              <a:srgbClr val="FF0000"/>
+            </a:solidFill>
+            <a:headEnd type="none" w="med" len="med"/>
+            <a:tailEnd type="none" w="med" len="med"/>
+          </a:ln>
+        </p:spPr>
+        <p:style>
+          <a:lnRef idx="3">
+            <a:schemeClr val="accent4"/>
+          </a:lnRef>
+          <a:fillRef idx="0">
+            <a:schemeClr val="accent4"/>
+          </a:fillRef>
+          <a:effectRef idx="2">
+            <a:schemeClr val="accent4"/>
+          </a:effectRef>
+          <a:fontRef idx="minor">
+            <a:schemeClr val="tx1"/>
+          </a:fontRef>
+        </p:style>
+      </p:cxnSp>
+      <p:cxnSp>
+        <p:nvCxnSpPr>
+          <p:cNvPr id="41" name="Connecteur droit 40"/>
+          <p:cNvCxnSpPr/>
+          <p:nvPr/>
+        </p:nvCxnSpPr>
+        <p:spPr bwMode="auto">
+          <a:xfrm flipH="1">
+            <a:off x="3779912" y="3645024"/>
+            <a:ext cx="504056" cy="0"/>
+          </a:xfrm>
+          <a:prstGeom prst="line">
+            <a:avLst/>
+          </a:prstGeom>
+          <a:ln>
+            <a:solidFill>
+              <a:srgbClr val="FF0000"/>
+            </a:solidFill>
+            <a:headEnd type="none" w="med" len="med"/>
+            <a:tailEnd type="none" w="med" len="med"/>
+          </a:ln>
+        </p:spPr>
+        <p:style>
+          <a:lnRef idx="3">
+            <a:schemeClr val="accent4"/>
+          </a:lnRef>
+          <a:fillRef idx="0">
+            <a:schemeClr val="accent4"/>
+          </a:fillRef>
+          <a:effectRef idx="2">
+            <a:schemeClr val="accent4"/>
+          </a:effectRef>
+          <a:fontRef idx="minor">
+            <a:schemeClr val="tx1"/>
+          </a:fontRef>
+        </p:style>
+      </p:cxnSp>
+      <p:cxnSp>
+        <p:nvCxnSpPr>
+          <p:cNvPr id="44" name="Connecteur droit 43"/>
+          <p:cNvCxnSpPr/>
+          <p:nvPr/>
+        </p:nvCxnSpPr>
+        <p:spPr bwMode="auto">
+          <a:xfrm flipH="1">
+            <a:off x="4283968" y="4077072"/>
+            <a:ext cx="360040" cy="0"/>
+          </a:xfrm>
+          <a:prstGeom prst="line">
+            <a:avLst/>
+          </a:prstGeom>
+          <a:ln>
+            <a:solidFill>
+              <a:srgbClr val="FF0000"/>
+            </a:solidFill>
+            <a:headEnd type="none" w="med" len="med"/>
+            <a:tailEnd type="none" w="med" len="med"/>
+          </a:ln>
+        </p:spPr>
+        <p:style>
+          <a:lnRef idx="3">
+            <a:schemeClr val="accent4"/>
+          </a:lnRef>
+          <a:fillRef idx="0">
+            <a:schemeClr val="accent4"/>
+          </a:fillRef>
+          <a:effectRef idx="2">
+            <a:schemeClr val="accent4"/>
+          </a:effectRef>
+          <a:fontRef idx="minor">
+            <a:schemeClr val="tx1"/>
+          </a:fontRef>
+        </p:style>
+      </p:cxnSp>
+      <p:cxnSp>
+        <p:nvCxnSpPr>
+          <p:cNvPr id="49" name="Connecteur droit 48"/>
+          <p:cNvCxnSpPr/>
+          <p:nvPr/>
+        </p:nvCxnSpPr>
+        <p:spPr bwMode="auto">
+          <a:xfrm>
+            <a:off x="3923928" y="1268760"/>
+            <a:ext cx="72008" cy="3744416"/>
+          </a:xfrm>
+          <a:prstGeom prst="line">
+            <a:avLst/>
+          </a:prstGeom>
+          <a:solidFill>
+            <a:schemeClr val="accent1"/>
+          </a:solidFill>
+          <a:ln w="9525" cap="flat" cmpd="sng" algn="ctr">
+            <a:solidFill>
+              <a:schemeClr val="tx1"/>
+            </a:solidFill>
+            <a:prstDash val="solid"/>
+            <a:round/>
+            <a:headEnd type="none" w="med" len="med"/>
+            <a:tailEnd type="none" w="med" len="med"/>
+          </a:ln>
+          <a:effectLst/>
+        </p:spPr>
+      </p:cxnSp>
+      <p:sp>
+        <p:nvSpPr>
+          <p:cNvPr id="50" name="Plus 49"/>
+          <p:cNvSpPr/>
+          <p:nvPr/>
+        </p:nvSpPr>
+        <p:spPr bwMode="auto">
+          <a:xfrm>
+            <a:off x="3851920" y="3573016"/>
+            <a:ext cx="216024" cy="216024"/>
+          </a:xfrm>
+          <a:prstGeom prst="mathPlus">
+            <a:avLst/>
+          </a:prstGeom>
+          <a:solidFill>
+            <a:schemeClr val="accent1"/>
+          </a:solidFill>
+          <a:ln w="9525" cap="flat" cmpd="sng" algn="ctr">
+            <a:solidFill>
+              <a:schemeClr val="tx1"/>
+            </a:solidFill>
+            <a:prstDash val="solid"/>
+            <a:round/>
+            <a:headEnd type="none" w="med" len="med"/>
+            <a:tailEnd type="none" w="med" len="med"/>
+          </a:ln>
+          <a:effectLst/>
+        </p:spPr>
+        <p:txBody>
+          <a:bodyPr vert="horz" wrap="square" lIns="91440" tIns="45720" rIns="91440" bIns="45720" numCol="1" rtlCol="0" anchor="t" anchorCtr="0" compatLnSpc="1">
+            <a:prstTxWarp prst="textNoShape">
+              <a:avLst/>
+            </a:prstTxWarp>
+          </a:bodyPr>
+          <a:lstStyle/>
+          <a:p>
+            <a:pPr marL="0" marR="0" indent="0" algn="l" defTabSz="914400" rtl="0" eaLnBrk="1" fontAlgn="base" latinLnBrk="0" hangingPunct="1">
+              <a:lnSpc>
+                <a:spcPct val="100000"/>
+              </a:lnSpc>
+              <a:spcBef>
+                <a:spcPct val="0"/>
+              </a:spcBef>
+              <a:spcAft>
+                <a:spcPct val="0"/>
+              </a:spcAft>
+              <a:buClrTx/>
+              <a:buSzTx/>
+              <a:buFontTx/>
+              <a:buNone/>
+              <a:tabLst/>
+            </a:pPr>
+            <a:endParaRPr kumimoji="0" lang="en-US" sz="1800" b="0" i="1" u="none" strike="noStrike" cap="none" normalizeH="0" baseline="0" smtClean="0">
+              <a:solidFill>
+                <a:schemeClr val="tx1"/>
+              </a:solidFill>
+              <a:effectLst/>
+              <a:latin typeface="Arial" charset="0"/>
+            </a:endParaRPr>
+          </a:p>
+        </p:txBody>
+      </p:sp>
+      <p:sp>
+        <p:nvSpPr>
           <p:cNvPr id="12" name="Freeform 23"/>
           <p:cNvSpPr/>
           <p:nvPr/>
@@ -9170,339 +9954,10 @@
           </a:p>
         </p:txBody>
       </p:sp>
-      <p:sp>
-        <p:nvSpPr>
-          <p:cNvPr id="14" name="Freeform 23"/>
-          <p:cNvSpPr/>
-          <p:nvPr/>
-        </p:nvSpPr>
-        <p:spPr>
-          <a:xfrm rot="11662850" flipH="1" flipV="1">
-            <a:off x="1357646" y="3714419"/>
-            <a:ext cx="713910" cy="1229362"/>
-          </a:xfrm>
-          <a:custGeom>
-            <a:avLst/>
-            <a:gdLst>
-              <a:gd name="connsiteX0" fmla="*/ 831273 w 831273"/>
-              <a:gd name="connsiteY0" fmla="*/ 1149927 h 1149927"/>
-              <a:gd name="connsiteX1" fmla="*/ 207818 w 831273"/>
-              <a:gd name="connsiteY1" fmla="*/ 775854 h 1149927"/>
-              <a:gd name="connsiteX2" fmla="*/ 0 w 831273"/>
-              <a:gd name="connsiteY2" fmla="*/ 0 h 1149927"/>
-              <a:gd name="connsiteX0" fmla="*/ 840798 w 840798"/>
-              <a:gd name="connsiteY0" fmla="*/ 911802 h 911802"/>
-              <a:gd name="connsiteX1" fmla="*/ 207818 w 840798"/>
-              <a:gd name="connsiteY1" fmla="*/ 775854 h 911802"/>
-              <a:gd name="connsiteX2" fmla="*/ 0 w 840798"/>
-              <a:gd name="connsiteY2" fmla="*/ 0 h 911802"/>
-              <a:gd name="connsiteX0" fmla="*/ 840798 w 840798"/>
-              <a:gd name="connsiteY0" fmla="*/ 911802 h 911802"/>
-              <a:gd name="connsiteX1" fmla="*/ 198293 w 840798"/>
-              <a:gd name="connsiteY1" fmla="*/ 547254 h 911802"/>
-              <a:gd name="connsiteX2" fmla="*/ 0 w 840798"/>
-              <a:gd name="connsiteY2" fmla="*/ 0 h 911802"/>
-            </a:gdLst>
-            <a:ahLst/>
-            <a:cxnLst>
-              <a:cxn ang="0">
-                <a:pos x="connsiteX0" y="connsiteY0"/>
-              </a:cxn>
-              <a:cxn ang="0">
-                <a:pos x="connsiteX1" y="connsiteY1"/>
-              </a:cxn>
-              <a:cxn ang="0">
-                <a:pos x="connsiteX2" y="connsiteY2"/>
-              </a:cxn>
-            </a:cxnLst>
-            <a:rect l="l" t="t" r="r" b="b"/>
-            <a:pathLst>
-              <a:path w="840798" h="911802">
-                <a:moveTo>
-                  <a:pt x="840798" y="911802"/>
-                </a:moveTo>
-                <a:cubicBezTo>
-                  <a:pt x="598343" y="820592"/>
-                  <a:pt x="336838" y="738908"/>
-                  <a:pt x="198293" y="547254"/>
-                </a:cubicBezTo>
-                <a:cubicBezTo>
-                  <a:pt x="59748" y="355600"/>
-                  <a:pt x="34636" y="292100"/>
-                  <a:pt x="0" y="0"/>
-                </a:cubicBezTo>
-              </a:path>
-            </a:pathLst>
-          </a:custGeom>
-          <a:noFill/>
-          <a:ln w="38100" cmpd="sng">
-            <a:solidFill>
-              <a:srgbClr val="7030A0"/>
-            </a:solidFill>
-            <a:tailEnd type="triangle"/>
-          </a:ln>
-        </p:spPr>
-        <p:style>
-          <a:lnRef idx="2">
-            <a:schemeClr val="accent1">
-              <a:shade val="50000"/>
-            </a:schemeClr>
-          </a:lnRef>
-          <a:fillRef idx="1">
-            <a:schemeClr val="accent1"/>
-          </a:fillRef>
-          <a:effectRef idx="0">
-            <a:schemeClr val="accent1"/>
-          </a:effectRef>
-          <a:fontRef idx="minor">
-            <a:schemeClr val="lt1"/>
-          </a:fontRef>
-        </p:style>
-        <p:txBody>
-          <a:bodyPr rtlCol="0" anchor="ctr"/>
-          <a:lstStyle/>
-          <a:p>
-            <a:pPr algn="ctr"/>
-            <a:endParaRPr lang="en-US" sz="1800" dirty="0">
-              <a:solidFill>
-                <a:srgbClr val="FFFFFF"/>
-              </a:solidFill>
-            </a:endParaRPr>
-          </a:p>
-        </p:txBody>
-      </p:sp>
-      <p:sp>
-        <p:nvSpPr>
-          <p:cNvPr id="15" name="Text Placeholder 1"/>
-          <p:cNvSpPr txBox="1">
-            <a:spLocks/>
-          </p:cNvSpPr>
-          <p:nvPr/>
-        </p:nvSpPr>
-        <p:spPr bwMode="auto">
-          <a:xfrm>
-            <a:off x="755576" y="4941168"/>
-            <a:ext cx="3312368" cy="864096"/>
-          </a:xfrm>
-          <a:prstGeom prst="rect">
-            <a:avLst/>
-          </a:prstGeom>
-          <a:noFill/>
-          <a:ln>
-            <a:noFill/>
-          </a:ln>
-          <a:extLst>
-            <a:ext uri="{909E8E84-426E-40dd-AFC4-6F175D3DCCD1}">
-              <a14:hiddenFill xmlns:a14="http://schemas.microsoft.com/office/drawing/2010/main">
-                <a:solidFill>
-                  <a:srgbClr val="FFFFFF"/>
-                </a:solidFill>
-              </a14:hiddenFill>
-            </a:ext>
-            <a:ext uri="{91240B29-F687-4f45-9708-019B960494DF}">
-              <a14:hiddenLine xmlns:a14="http://schemas.microsoft.com/office/drawing/2010/main" w="9525">
-                <a:solidFill>
-                  <a:srgbClr val="000000"/>
-                </a:solidFill>
-                <a:miter lim="800000"/>
-                <a:headEnd/>
-                <a:tailEnd/>
-              </a14:hiddenLine>
-            </a:ext>
-          </a:extLst>
-        </p:spPr>
-        <p:txBody>
-          <a:bodyPr vert="horz" wrap="square" lIns="91440" tIns="45720" rIns="91440" bIns="45720" numCol="1" anchor="t" anchorCtr="0" compatLnSpc="1">
-            <a:prstTxWarp prst="textNoShape">
-              <a:avLst/>
-            </a:prstTxWarp>
-            <a:normAutofit/>
-          </a:bodyPr>
-          <a:lstStyle>
-            <a:lvl1pPr marL="342900" indent="-342900" algn="l" rtl="0" eaLnBrk="1" fontAlgn="base" hangingPunct="1">
-              <a:lnSpc>
-                <a:spcPct val="120000"/>
-              </a:lnSpc>
-              <a:spcBef>
-                <a:spcPct val="20000"/>
-              </a:spcBef>
-              <a:spcAft>
-                <a:spcPct val="0"/>
-              </a:spcAft>
-              <a:buClr>
-                <a:srgbClr val="404040"/>
-              </a:buClr>
-              <a:buChar char="•"/>
-              <a:defRPr sz="1600" b="1">
-                <a:solidFill>
-                  <a:srgbClr val="404040"/>
-                </a:solidFill>
-                <a:latin typeface="+mn-lt"/>
-                <a:ea typeface="ＭＳ Ｐゴシック" charset="-128"/>
-                <a:cs typeface="ＭＳ Ｐゴシック" charset="-128"/>
-              </a:defRPr>
-            </a:lvl1pPr>
-            <a:lvl2pPr marL="742950" indent="-285750" algn="l" rtl="0" eaLnBrk="1" fontAlgn="base" hangingPunct="1">
-              <a:lnSpc>
-                <a:spcPct val="120000"/>
-              </a:lnSpc>
-              <a:spcBef>
-                <a:spcPct val="20000"/>
-              </a:spcBef>
-              <a:spcAft>
-                <a:spcPct val="0"/>
-              </a:spcAft>
-              <a:buChar char="–"/>
-              <a:defRPr sz="1400">
-                <a:solidFill>
-                  <a:schemeClr val="tx1"/>
-                </a:solidFill>
-                <a:latin typeface="+mn-lt"/>
-                <a:ea typeface="ヒラギノ角ゴ ProN W3"/>
-                <a:cs typeface="ヒラギノ角ゴ ProN W3"/>
-              </a:defRPr>
-            </a:lvl2pPr>
-            <a:lvl3pPr marL="1143000" indent="-228600" algn="l" rtl="0" eaLnBrk="1" fontAlgn="base" hangingPunct="1">
-              <a:lnSpc>
-                <a:spcPct val="120000"/>
-              </a:lnSpc>
-              <a:spcBef>
-                <a:spcPct val="20000"/>
-              </a:spcBef>
-              <a:spcAft>
-                <a:spcPct val="0"/>
-              </a:spcAft>
-              <a:buChar char="–"/>
-              <a:defRPr sz="1200">
-                <a:solidFill>
-                  <a:schemeClr val="tx1"/>
-                </a:solidFill>
-                <a:latin typeface="+mn-lt"/>
-                <a:ea typeface="ヒラギノ角ゴ ProN W3"/>
-                <a:cs typeface="ヒラギノ角ゴ ProN W3"/>
-              </a:defRPr>
-            </a:lvl3pPr>
-            <a:lvl4pPr marL="1600200" indent="-228600" algn="l" rtl="0" eaLnBrk="1" fontAlgn="base" hangingPunct="1">
-              <a:spcBef>
-                <a:spcPct val="20000"/>
-              </a:spcBef>
-              <a:spcAft>
-                <a:spcPct val="0"/>
-              </a:spcAft>
-              <a:buFont typeface="Times" charset="0"/>
-              <a:buChar char="•"/>
-              <a:defRPr sz="1200">
-                <a:solidFill>
-                  <a:schemeClr val="tx1"/>
-                </a:solidFill>
-                <a:latin typeface="+mn-lt"/>
-                <a:ea typeface="ヒラギノ角ゴ ProN W3"/>
-                <a:cs typeface="ヒラギノ角ゴ ProN W3"/>
-              </a:defRPr>
-            </a:lvl4pPr>
-            <a:lvl5pPr marL="2057400" indent="-228600" algn="l" rtl="0" eaLnBrk="1" fontAlgn="base" hangingPunct="1">
-              <a:spcBef>
-                <a:spcPct val="20000"/>
-              </a:spcBef>
-              <a:spcAft>
-                <a:spcPct val="0"/>
-              </a:spcAft>
-              <a:buFont typeface="Times" charset="0"/>
-              <a:buChar char="•"/>
-              <a:defRPr sz="1200">
-                <a:solidFill>
-                  <a:schemeClr val="tx1"/>
-                </a:solidFill>
-                <a:latin typeface="+mn-lt"/>
-                <a:ea typeface="ヒラギノ角ゴ ProN W3"/>
-                <a:cs typeface="ヒラギノ角ゴ ProN W3"/>
-              </a:defRPr>
-            </a:lvl5pPr>
-            <a:lvl6pPr marL="2514600" indent="-228600" algn="l" rtl="0" eaLnBrk="1" fontAlgn="base" hangingPunct="1">
-              <a:spcBef>
-                <a:spcPct val="20000"/>
-              </a:spcBef>
-              <a:spcAft>
-                <a:spcPct val="0"/>
-              </a:spcAft>
-              <a:buFont typeface="Times" pitchFamily="18" charset="0"/>
-              <a:buChar char="•"/>
-              <a:defRPr sz="1200">
-                <a:solidFill>
-                  <a:schemeClr val="tx1"/>
-                </a:solidFill>
-                <a:latin typeface="+mn-lt"/>
-              </a:defRPr>
-            </a:lvl6pPr>
-            <a:lvl7pPr marL="2971800" indent="-228600" algn="l" rtl="0" eaLnBrk="1" fontAlgn="base" hangingPunct="1">
-              <a:spcBef>
-                <a:spcPct val="20000"/>
-              </a:spcBef>
-              <a:spcAft>
-                <a:spcPct val="0"/>
-              </a:spcAft>
-              <a:buFont typeface="Times" pitchFamily="18" charset="0"/>
-              <a:buChar char="•"/>
-              <a:defRPr sz="1200">
-                <a:solidFill>
-                  <a:schemeClr val="tx1"/>
-                </a:solidFill>
-                <a:latin typeface="+mn-lt"/>
-              </a:defRPr>
-            </a:lvl7pPr>
-            <a:lvl8pPr marL="3429000" indent="-228600" algn="l" rtl="0" eaLnBrk="1" fontAlgn="base" hangingPunct="1">
-              <a:spcBef>
-                <a:spcPct val="20000"/>
-              </a:spcBef>
-              <a:spcAft>
-                <a:spcPct val="0"/>
-              </a:spcAft>
-              <a:buFont typeface="Times" pitchFamily="18" charset="0"/>
-              <a:buChar char="•"/>
-              <a:defRPr sz="1200">
-                <a:solidFill>
-                  <a:schemeClr val="tx1"/>
-                </a:solidFill>
-                <a:latin typeface="+mn-lt"/>
-              </a:defRPr>
-            </a:lvl8pPr>
-            <a:lvl9pPr marL="3886200" indent="-228600" algn="l" rtl="0" eaLnBrk="1" fontAlgn="base" hangingPunct="1">
-              <a:spcBef>
-                <a:spcPct val="20000"/>
-              </a:spcBef>
-              <a:spcAft>
-                <a:spcPct val="0"/>
-              </a:spcAft>
-              <a:buFont typeface="Times" pitchFamily="18" charset="0"/>
-              <a:buChar char="•"/>
-              <a:defRPr sz="1200">
-                <a:solidFill>
-                  <a:schemeClr val="tx1"/>
-                </a:solidFill>
-                <a:latin typeface="+mn-lt"/>
-              </a:defRPr>
-            </a:lvl9pPr>
-          </a:lstStyle>
-          <a:p>
-            <a:pPr marL="0" indent="0">
-              <a:buFontTx/>
-              <a:buNone/>
-            </a:pPr>
-            <a:r>
-              <a:rPr lang="en-US" sz="2400" i="0" dirty="0" err="1" smtClean="0"/>
-              <a:t>Restrictive_Merge</a:t>
-            </a:r>
-            <a:r>
-              <a:rPr lang="en-US" sz="2400" i="0" dirty="0" smtClean="0"/>
-              <a:t>?</a:t>
-            </a:r>
-          </a:p>
-        </p:txBody>
-      </p:sp>
     </p:spTree>
     <p:extLst>
       <p:ext uri="{BB962C8B-B14F-4D97-AF65-F5344CB8AC3E}">
-        <p14:creationId xmlns:p14="http://schemas.microsoft.com/office/powerpoint/2010/main" val="1356667397"/>
+        <p14:creationId xmlns:p14="http://schemas.microsoft.com/office/powerpoint/2010/main" val="1342082977"/>
       </p:ext>
     </p:extLst>
   </p:cSld>
@@ -9777,10 +10232,10 @@
       <p:bldP spid="9" grpId="0"/>
       <p:bldP spid="10" grpId="0" animBg="1"/>
       <p:bldP spid="11" grpId="0"/>
+      <p:bldP spid="14" grpId="0" animBg="1"/>
+      <p:bldP spid="15" grpId="0"/>
       <p:bldP spid="12" grpId="0" animBg="1"/>
       <p:bldP spid="13" grpId="0" animBg="1"/>
-      <p:bldP spid="14" grpId="0" animBg="1"/>
-      <p:bldP spid="15" grpId="0"/>
     </p:bldLst>
   </p:timing>
 </p:sld>
@@ -9844,7 +10299,7 @@
         </p:spPr>
         <p:txBody>
           <a:bodyPr>
-            <a:normAutofit/>
+            <a:normAutofit lnSpcReduction="10000"/>
           </a:bodyPr>
           <a:lstStyle/>
           <a:p>
@@ -9858,43 +10313,37 @@
                 </a:solidFill>
                 <a:cs typeface="Courier New"/>
               </a:rPr>
-              <a:t>SPARK 2014 very good for:</a:t>
-            </a:r>
-          </a:p>
-          <a:p>
-            <a:r>
-              <a:rPr lang="en-US" b="0" dirty="0" smtClean="0">
-                <a:solidFill>
-                  <a:schemeClr val="tx1"/>
+              <a:t>SPARK 2014 </a:t>
+            </a:r>
+            <a:r>
+              <a:rPr lang="en-US" dirty="0" smtClean="0">
+                <a:solidFill>
+                  <a:schemeClr val="accent1"/>
                 </a:solidFill>
                 <a:cs typeface="Courier New"/>
               </a:rPr>
-              <a:t>Expressing objects of the requirements</a:t>
-            </a:r>
-          </a:p>
-          <a:p>
-            <a:r>
-              <a:rPr lang="en-US" b="0" dirty="0" smtClean="0">
+              <a:t>very good </a:t>
+            </a:r>
+            <a:r>
+              <a:rPr lang="en-US" dirty="0" smtClean="0">
                 <a:solidFill>
                   <a:schemeClr val="tx1"/>
                 </a:solidFill>
                 <a:cs typeface="Courier New"/>
               </a:rPr>
-              <a:t>Readability of the specifications</a:t>
-            </a:r>
-          </a:p>
-          <a:p>
-            <a:r>
-              <a:rPr lang="en-US" b="0" dirty="0" smtClean="0">
-                <a:solidFill>
-                  <a:schemeClr val="tx1"/>
+              <a:t>for:</a:t>
+            </a:r>
+          </a:p>
+          <a:p>
+            <a:r>
+              <a:rPr lang="en-US" dirty="0" smtClean="0">
+                <a:solidFill>
+                  <a:schemeClr val="accent1"/>
                 </a:solidFill>
                 <a:cs typeface="Courier New"/>
               </a:rPr>
-              <a:t>Automatic proof of absence of run-time errors</a:t>
-            </a:r>
-          </a:p>
-          <a:p>
+              <a:t>Expressing</a:t>
+            </a:r>
             <a:r>
               <a:rPr lang="en-US" b="0" dirty="0" smtClean="0">
                 <a:solidFill>
@@ -9902,18 +10351,96 @@
                 </a:solidFill>
                 <a:cs typeface="Courier New"/>
               </a:rPr>
-              <a:t>Automatic proof of simple functional contracts</a:t>
-            </a:r>
-          </a:p>
-          <a:p>
-            <a:r>
-              <a:rPr lang="en-US" b="0" dirty="0" smtClean="0">
-                <a:solidFill>
-                  <a:schemeClr val="tx1"/>
+              <a:t> objects of the requirements</a:t>
+            </a:r>
+          </a:p>
+          <a:p>
+            <a:r>
+              <a:rPr lang="en-US" dirty="0" smtClean="0">
+                <a:solidFill>
+                  <a:schemeClr val="accent1"/>
                 </a:solidFill>
                 <a:cs typeface="Courier New"/>
               </a:rPr>
-              <a:t>Dynamic verification of contracts and assertions</a:t>
+              <a:t>Readability</a:t>
+            </a:r>
+            <a:r>
+              <a:rPr lang="en-US" b="0" dirty="0" smtClean="0">
+                <a:solidFill>
+                  <a:schemeClr val="tx1"/>
+                </a:solidFill>
+                <a:cs typeface="Courier New"/>
+              </a:rPr>
+              <a:t> of the specifications</a:t>
+            </a:r>
+          </a:p>
+          <a:p>
+            <a:r>
+              <a:rPr lang="en-US" b="0" dirty="0" smtClean="0">
+                <a:solidFill>
+                  <a:schemeClr val="tx1"/>
+                </a:solidFill>
+                <a:cs typeface="Courier New"/>
+              </a:rPr>
+              <a:t>Automatic proof of </a:t>
+            </a:r>
+            <a:r>
+              <a:rPr lang="en-US" dirty="0" smtClean="0">
+                <a:solidFill>
+                  <a:schemeClr val="accent1"/>
+                </a:solidFill>
+                <a:cs typeface="Courier New"/>
+              </a:rPr>
+              <a:t>absence of run-time errors</a:t>
+            </a:r>
+          </a:p>
+          <a:p>
+            <a:r>
+              <a:rPr lang="en-US" b="0" dirty="0" smtClean="0">
+                <a:solidFill>
+                  <a:schemeClr val="tx1"/>
+                </a:solidFill>
+                <a:cs typeface="Courier New"/>
+              </a:rPr>
+              <a:t>Automatic proof of </a:t>
+            </a:r>
+            <a:r>
+              <a:rPr lang="en-US" dirty="0" smtClean="0">
+                <a:solidFill>
+                  <a:schemeClr val="accent1"/>
+                </a:solidFill>
+                <a:cs typeface="Courier New"/>
+              </a:rPr>
+              <a:t>simple functional </a:t>
+            </a:r>
+            <a:r>
+              <a:rPr lang="en-US" b="0" dirty="0" smtClean="0">
+                <a:solidFill>
+                  <a:schemeClr val="tx1"/>
+                </a:solidFill>
+                <a:cs typeface="Courier New"/>
+              </a:rPr>
+              <a:t>contracts</a:t>
+            </a:r>
+          </a:p>
+          <a:p>
+            <a:r>
+              <a:rPr lang="en-US" dirty="0" smtClean="0">
+                <a:solidFill>
+                  <a:schemeClr val="accent1"/>
+                </a:solidFill>
+                <a:cs typeface="Courier New"/>
+              </a:rPr>
+              <a:t>Dynamic verification </a:t>
+            </a:r>
+            <a:r>
+              <a:rPr lang="en-US" b="0" dirty="0" smtClean="0">
+                <a:solidFill>
+                  <a:schemeClr val="tx1"/>
+                </a:solidFill>
+                <a:cs typeface="Courier New"/>
+              </a:rPr>
+              <a:t>of contracts and assertions</a:t>
             </a:r>
           </a:p>
           <a:p>
@@ -9935,18 +10462,71 @@
                 </a:solidFill>
                 <a:cs typeface="Courier New"/>
               </a:rPr>
-              <a:t>SPARK 2014 is not good for:</a:t>
-            </a:r>
-          </a:p>
-          <a:p>
-            <a:r>
-              <a:rPr lang="en-US" b="0" dirty="0" smtClean="0">
-                <a:solidFill>
-                  <a:schemeClr val="tx1"/>
+              <a:t>SPARK 2014 is </a:t>
+            </a:r>
+            <a:r>
+              <a:rPr lang="en-US" dirty="0" smtClean="0">
+                <a:solidFill>
+                  <a:schemeClr val="accent1"/>
                 </a:solidFill>
                 <a:cs typeface="Courier New"/>
               </a:rPr>
-              <a:t>Proving existing code without any modifications</a:t>
+              <a:t>not good </a:t>
+            </a:r>
+            <a:r>
+              <a:rPr lang="en-US" dirty="0" smtClean="0">
+                <a:solidFill>
+                  <a:schemeClr val="tx1"/>
+                </a:solidFill>
+                <a:cs typeface="Courier New"/>
+              </a:rPr>
+              <a:t>for:</a:t>
+            </a:r>
+          </a:p>
+          <a:p>
+            <a:r>
+              <a:rPr lang="en-US" b="0" dirty="0" smtClean="0">
+                <a:solidFill>
+                  <a:schemeClr val="tx1"/>
+                </a:solidFill>
+                <a:cs typeface="Courier New"/>
+              </a:rPr>
+              <a:t>Proving existing code </a:t>
+            </a:r>
+            <a:r>
+              <a:rPr lang="en-US" dirty="0" smtClean="0">
+                <a:solidFill>
+                  <a:schemeClr val="accent1"/>
+                </a:solidFill>
+                <a:cs typeface="Courier New"/>
+              </a:rPr>
+              <a:t>without any modifications</a:t>
+            </a:r>
+          </a:p>
+          <a:p>
+            <a:r>
+              <a:rPr lang="en-US" b="0" dirty="0" smtClean="0">
+                <a:solidFill>
+                  <a:schemeClr val="tx1"/>
+                </a:solidFill>
+              </a:rPr>
+              <a:t>Proving automatically </a:t>
+            </a:r>
+            <a:r>
+              <a:rPr lang="en-US" dirty="0" smtClean="0">
+                <a:solidFill>
+                  <a:schemeClr val="accent1"/>
+                </a:solidFill>
+              </a:rPr>
+              <a:t>complex functional</a:t>
+            </a:r>
+            <a:r>
+              <a:rPr lang="en-US" b="0" dirty="0" smtClean="0">
+                <a:solidFill>
+                  <a:schemeClr val="tx1"/>
+                </a:solidFill>
+              </a:rPr>
+              <a:t> contracts</a:t>
             </a:r>
           </a:p>
           <a:p>
@@ -9968,29 +10548,83 @@
                 </a:solidFill>
                 <a:cs typeface="Courier New"/>
               </a:rPr>
-              <a:t>Areas requiring improvements:</a:t>
-            </a:r>
-          </a:p>
-          <a:p>
-            <a:r>
-              <a:rPr lang="en-US" b="0" dirty="0" smtClean="0">
-                <a:solidFill>
-                  <a:schemeClr val="tx1"/>
+              <a:t>Areas requiring </a:t>
+            </a:r>
+            <a:r>
+              <a:rPr lang="en-US" dirty="0" smtClean="0">
+                <a:solidFill>
+                  <a:schemeClr val="accent1"/>
                 </a:solidFill>
                 <a:cs typeface="Courier New"/>
               </a:rPr>
-              <a:t>Possibility to prove some properties interactively (in 2014 roadmap)</a:t>
-            </a:r>
-          </a:p>
-          <a:p>
-            <a:r>
-              <a:rPr lang="en-US" b="0" dirty="0" smtClean="0">
+              <a:t>improvements</a:t>
+            </a:r>
+            <a:r>
+              <a:rPr lang="en-US" dirty="0" smtClean="0">
                 <a:solidFill>
                   <a:schemeClr val="tx1"/>
                 </a:solidFill>
                 <a:cs typeface="Courier New"/>
               </a:rPr>
-              <a:t>Better diagnostic for incomplete loop invariants (in 2014 roadmap)</a:t>
+              <a:t>:</a:t>
+            </a:r>
+          </a:p>
+          <a:p>
+            <a:r>
+              <a:rPr lang="en-US" b="0" dirty="0" smtClean="0">
+                <a:solidFill>
+                  <a:schemeClr val="tx1"/>
+                </a:solidFill>
+                <a:cs typeface="Courier New"/>
+              </a:rPr>
+              <a:t>Possibility to prove some properties </a:t>
+            </a:r>
+            <a:r>
+              <a:rPr lang="en-US" dirty="0" smtClean="0">
+                <a:solidFill>
+                  <a:schemeClr val="accent1"/>
+                </a:solidFill>
+                <a:cs typeface="Courier New"/>
+              </a:rPr>
+              <a:t>interactively</a:t>
+            </a:r>
+            <a:r>
+              <a:rPr lang="en-US" b="0" dirty="0" smtClean="0">
+                <a:solidFill>
+                  <a:schemeClr val="tx1"/>
+                </a:solidFill>
+                <a:cs typeface="Courier New"/>
+              </a:rPr>
+              <a:t> (in 2014 roadmap)</a:t>
+            </a:r>
+          </a:p>
+          <a:p>
+            <a:r>
+              <a:rPr lang="en-US" b="0" dirty="0" smtClean="0">
+                <a:solidFill>
+                  <a:schemeClr val="tx1"/>
+                </a:solidFill>
+                <a:cs typeface="Courier New"/>
+              </a:rPr>
+              <a:t>Better </a:t>
+            </a:r>
+            <a:r>
+              <a:rPr lang="en-US" dirty="0" smtClean="0">
+                <a:solidFill>
+                  <a:schemeClr val="accent1"/>
+                </a:solidFill>
+                <a:cs typeface="Courier New"/>
+              </a:rPr>
+              <a:t>diagnostic</a:t>
+            </a:r>
+            <a:r>
+              <a:rPr lang="en-US" b="0" dirty="0" smtClean="0">
+                <a:solidFill>
+                  <a:schemeClr val="tx1"/>
+                </a:solidFill>
+                <a:cs typeface="Courier New"/>
+              </a:rPr>
+              <a:t> for incomplete loop invariants (in 2014 roadmap)</a:t>
             </a:r>
             <a:endParaRPr lang="en-US" dirty="0">
               <a:solidFill>
@@ -10001,16 +10635,14 @@
           </a:p>
           <a:p>
             <a:r>
-              <a:rPr lang="en-US" b="0" dirty="0" smtClean="0">
-                <a:solidFill>
-                  <a:schemeClr val="tx1"/>
+              <a:rPr lang="en-US" dirty="0" smtClean="0">
+                <a:solidFill>
+                  <a:schemeClr val="accent1"/>
                 </a:solidFill>
                 <a:cs typeface="Courier New"/>
               </a:rPr>
-              <a:t>Training for developers to use proof tools (available in SPARK Pro subscription)</a:t>
-            </a:r>
-          </a:p>
-          <a:p>
+              <a:t>Training</a:t>
+            </a:r>
             <a:r>
               <a:rPr lang="en-US" b="0" dirty="0" smtClean="0">
                 <a:solidFill>
@@ -10018,7 +10650,27 @@
                 </a:solidFill>
                 <a:cs typeface="Courier New"/>
               </a:rPr>
-              <a:t>Workflow to make efficient use of developers’ time (in progress)</a:t>
+              <a:t> for developers to use proof tools (available in SPARK Pro subscription)</a:t>
+            </a:r>
+          </a:p>
+          <a:p>
+            <a:r>
+              <a:rPr lang="en-US" dirty="0" smtClean="0">
+                <a:solidFill>
+                  <a:schemeClr val="accent1"/>
+                </a:solidFill>
+                <a:cs typeface="Courier New"/>
+              </a:rPr>
+              <a:t>Workflow</a:t>
+            </a:r>
+            <a:r>
+              <a:rPr lang="en-US" b="0" dirty="0" smtClean="0">
+                <a:solidFill>
+                  <a:schemeClr val="tx1"/>
+                </a:solidFill>
+                <a:cs typeface="Courier New"/>
+              </a:rPr>
+              <a:t> to make efficient use of developers’ time (in progress)</a:t>
             </a:r>
           </a:p>
         </p:txBody>
@@ -10026,7 +10678,7 @@
     </p:spTree>
     <p:extLst>
       <p:ext uri="{BB962C8B-B14F-4D97-AF65-F5344CB8AC3E}">
-        <p14:creationId xmlns:p14="http://schemas.microsoft.com/office/powerpoint/2010/main" val="428750428"/>
+        <p14:creationId xmlns:p14="http://schemas.microsoft.com/office/powerpoint/2010/main" val="242289900"/>
       </p:ext>
     </p:extLst>
   </p:cSld>
@@ -10506,8 +11158,8 @@
         </p:nvSpPr>
         <p:spPr bwMode="auto">
           <a:xfrm>
-            <a:off x="107504" y="4364583"/>
-            <a:ext cx="8893175" cy="936625"/>
+            <a:off x="107504" y="4437112"/>
+            <a:ext cx="8893175" cy="792088"/>
           </a:xfrm>
           <a:prstGeom prst="roundRect">
             <a:avLst>
@@ -10688,7 +11340,7 @@
           <p:nvPr/>
         </p:nvPicPr>
         <p:blipFill>
-          <a:blip r:embed="rId2">
+          <a:blip r:embed="rId2" cstate="print">
             <a:extLst>
               <a:ext uri="{28A0092B-C50C-407E-A947-70E740481C1C}">
                 <a14:useLocalDpi xmlns:a14="http://schemas.microsoft.com/office/drawing/2010/main" val="0"/>
@@ -10742,7 +11394,7 @@
           <p:nvPr/>
         </p:nvPicPr>
         <p:blipFill>
-          <a:blip r:embed="rId3">
+          <a:blip r:embed="rId3" cstate="print">
             <a:extLst>
               <a:ext uri="{28A0092B-C50C-407E-A947-70E740481C1C}">
                 <a14:useLocalDpi xmlns:a14="http://schemas.microsoft.com/office/drawing/2010/main" val="0"/>
@@ -10796,7 +11448,7 @@
           <p:nvPr/>
         </p:nvPicPr>
         <p:blipFill>
-          <a:blip r:embed="rId4">
+          <a:blip r:embed="rId4" cstate="print">
             <a:extLst>
               <a:ext uri="{28A0092B-C50C-407E-A947-70E740481C1C}">
                 <a14:useLocalDpi xmlns:a14="http://schemas.microsoft.com/office/drawing/2010/main" val="0"/>
@@ -10844,7 +11496,7 @@
     </p:spTree>
     <p:extLst>
       <p:ext uri="{BB962C8B-B14F-4D97-AF65-F5344CB8AC3E}">
-        <p14:creationId xmlns:p14="http://schemas.microsoft.com/office/powerpoint/2010/main" val="1068562421"/>
+        <p14:creationId xmlns:p14="http://schemas.microsoft.com/office/powerpoint/2010/main" val="2666872492"/>
       </p:ext>
     </p:extLst>
   </p:cSld>
@@ -14029,6 +14681,70 @@
           </a:graphicData>
         </a:graphic>
       </p:graphicFrame>
+      <p:sp>
+        <p:nvSpPr>
+          <p:cNvPr id="6" name="Rectangle 5"/>
+          <p:cNvSpPr/>
+          <p:nvPr/>
+        </p:nvSpPr>
+        <p:spPr bwMode="auto">
+          <a:xfrm>
+            <a:off x="6300192" y="3356992"/>
+            <a:ext cx="1872208" cy="1512168"/>
+          </a:xfrm>
+          <a:prstGeom prst="rect">
+            <a:avLst/>
+          </a:prstGeom>
+          <a:solidFill>
+            <a:srgbClr val="FF0000">
+              <a:alpha val="30000"/>
+            </a:srgbClr>
+          </a:solidFill>
+          <a:ln w="76200" cap="flat" cmpd="sng" algn="ctr">
+            <a:solidFill>
+              <a:srgbClr val="FF0000"/>
+            </a:solidFill>
+            <a:prstDash val="solid"/>
+            <a:round/>
+            <a:headEnd type="none" w="med" len="med"/>
+            <a:tailEnd type="none" w="med" len="med"/>
+          </a:ln>
+          <a:effectLst/>
+        </p:spPr>
+        <p:txBody>
+          <a:bodyPr vert="horz" wrap="square" lIns="91440" tIns="45720" rIns="91440" bIns="45720" numCol="1" rtlCol="0" anchor="t" anchorCtr="0" compatLnSpc="1">
+            <a:prstTxWarp prst="textNoShape">
+              <a:avLst/>
+            </a:prstTxWarp>
+          </a:bodyPr>
+          <a:lstStyle/>
+          <a:p>
+            <a:pPr marL="0" marR="0" indent="0" algn="l" defTabSz="914400" rtl="0" eaLnBrk="1" fontAlgn="base" latinLnBrk="0" hangingPunct="1">
+              <a:lnSpc>
+                <a:spcPct val="100000"/>
+              </a:lnSpc>
+              <a:spcBef>
+                <a:spcPct val="0"/>
+              </a:spcBef>
+              <a:spcAft>
+                <a:spcPct val="0"/>
+              </a:spcAft>
+              <a:buClrTx/>
+              <a:buSzTx/>
+              <a:buFontTx/>
+              <a:buNone/>
+              <a:tabLst/>
+            </a:pPr>
+            <a:endParaRPr kumimoji="0" lang="fr-FR" sz="1800" b="0" i="1" u="none" strike="noStrike" cap="none" normalizeH="0" baseline="0" smtClean="0">
+              <a:solidFill>
+                <a:schemeClr val="tx1"/>
+              </a:solidFill>
+              <a:effectLst/>
+              <a:latin typeface="Arial" charset="0"/>
+            </a:endParaRPr>
+          </a:p>
+        </p:txBody>
+      </p:sp>
     </p:spTree>
     <p:extLst>
       <p:ext uri="{BB962C8B-B14F-4D97-AF65-F5344CB8AC3E}">
@@ -14042,9 +14758,80 @@
   <p:timing>
     <p:tnLst>
       <p:par>
-        <p:cTn xmlns:p14="http://schemas.microsoft.com/office/powerpoint/2010/main" id="1" dur="indefinite" restart="never" nodeType="tmRoot"/>
+        <p:cTn xmlns:p14="http://schemas.microsoft.com/office/powerpoint/2010/main" id="1" dur="indefinite" restart="never" nodeType="tmRoot">
+          <p:childTnLst>
+            <p:seq concurrent="1" nextAc="seek">
+              <p:cTn id="2" dur="indefinite" nodeType="mainSeq">
+                <p:childTnLst>
+                  <p:par>
+                    <p:cTn id="3" fill="hold">
+                      <p:stCondLst>
+                        <p:cond delay="indefinite"/>
+                      </p:stCondLst>
+                      <p:childTnLst>
+                        <p:par>
+                          <p:cTn id="4" fill="hold">
+                            <p:stCondLst>
+                              <p:cond delay="0"/>
+                            </p:stCondLst>
+                            <p:childTnLst>
+                              <p:par>
+                                <p:cTn id="5" presetID="1" presetClass="entr" presetSubtype="0" fill="hold" grpId="0" nodeType="clickEffect">
+                                  <p:stCondLst>
+                                    <p:cond delay="0"/>
+                                  </p:stCondLst>
+                                  <p:childTnLst>
+                                    <p:set>
+                                      <p:cBhvr>
+                                        <p:cTn id="6" dur="1" fill="hold">
+                                          <p:stCondLst>
+                                            <p:cond delay="0"/>
+                                          </p:stCondLst>
+                                        </p:cTn>
+                                        <p:tgtEl>
+                                          <p:spTgt spid="6"/>
+                                        </p:tgtEl>
+                                        <p:attrNameLst>
+                                          <p:attrName>style.visibility</p:attrName>
+                                        </p:attrNameLst>
+                                      </p:cBhvr>
+                                      <p:to>
+                                        <p:strVal val="visible"/>
+                                      </p:to>
+                                    </p:set>
+                                  </p:childTnLst>
+                                </p:cTn>
+                              </p:par>
+                            </p:childTnLst>
+                          </p:cTn>
+                        </p:par>
+                      </p:childTnLst>
+                    </p:cTn>
+                  </p:par>
+                </p:childTnLst>
+              </p:cTn>
+              <p:prevCondLst>
+                <p:cond evt="onPrev" delay="0">
+                  <p:tgtEl>
+                    <p:sldTgt/>
+                  </p:tgtEl>
+                </p:cond>
+              </p:prevCondLst>
+              <p:nextCondLst>
+                <p:cond evt="onNext" delay="0">
+                  <p:tgtEl>
+                    <p:sldTgt/>
+                  </p:tgtEl>
+                </p:cond>
+              </p:nextCondLst>
+            </p:seq>
+          </p:childTnLst>
+        </p:cTn>
       </p:par>
     </p:tnLst>
+    <p:bldLst>
+      <p:bldP spid="6" grpId="0" animBg="1"/>
+    </p:bldLst>
   </p:timing>
 </p:sld>
 </file>
@@ -16592,13 +17379,8 @@
             </a:pPr>
             <a:r>
               <a:rPr lang="en-US" sz="2800" i="0" dirty="0" smtClean="0"/>
-              <a:t>Functional </a:t>
-            </a:r>
-            <a:r>
-              <a:rPr lang="en-US" sz="2800" i="0" dirty="0" smtClean="0"/>
-              <a:t>contracts</a:t>
-            </a:r>
-            <a:endParaRPr lang="en-US" sz="2800" i="0" dirty="0" smtClean="0"/>
+              <a:t>Functional contracts</a:t>
+            </a:r>
           </a:p>
         </p:txBody>
       </p:sp>
@@ -19108,14 +19890,14 @@
       </p:grpSpPr>
       <p:pic>
         <p:nvPicPr>
-          <p:cNvPr id="5" name="Image 4" descr="FreeGreatPicture.com-30974-podium.jpg"/>
+          <p:cNvPr id="2" name="Image 1" descr="three-mountain-peaks-green-hi.png"/>
           <p:cNvPicPr>
             <a:picLocks noChangeAspect="1"/>
           </p:cNvPicPr>
           <p:nvPr/>
         </p:nvPicPr>
         <p:blipFill>
-          <a:blip r:embed="rId2" cstate="print">
+          <a:blip r:embed="rId2">
             <a:extLst>
               <a:ext uri="{28A0092B-C50C-407E-A947-70E740481C1C}">
                 <a14:useLocalDpi xmlns:a14="http://schemas.microsoft.com/office/drawing/2010/main" val="0"/>
@@ -19128,8 +19910,8 @@
         </p:blipFill>
         <p:spPr>
           <a:xfrm>
-            <a:off x="1331640" y="1412776"/>
-            <a:ext cx="6696744" cy="6696744"/>
+            <a:off x="0" y="317500"/>
+            <a:ext cx="9144000" cy="6202680"/>
           </a:xfrm>
           <a:prstGeom prst="rect">
             <a:avLst/>
@@ -19169,7 +19951,7 @@
         </p:nvSpPr>
         <p:spPr bwMode="auto">
           <a:xfrm>
-            <a:off x="971600" y="2996952"/>
+            <a:off x="2987824" y="1844824"/>
             <a:ext cx="2736304" cy="1863824"/>
           </a:xfrm>
           <a:prstGeom prst="rect">
@@ -19393,12 +20175,6 @@
               </a:rPr>
               <a:t>tatic debugging </a:t>
             </a:r>
-            <a:endParaRPr lang="en-US" sz="2800" i="0" dirty="0" smtClean="0">
-              <a:solidFill>
-                <a:schemeClr val="tx1"/>
-              </a:solidFill>
-              <a:cs typeface="Courier New"/>
-            </a:endParaRPr>
           </a:p>
           <a:p>
             <a:pPr marL="0" indent="0" algn="ctr">
@@ -19422,12 +20198,6 @@
               </a:rPr>
               <a:t>f contracts</a:t>
             </a:r>
-            <a:endParaRPr lang="en-US" sz="2800" i="0" dirty="0" smtClean="0">
-              <a:solidFill>
-                <a:schemeClr val="tx1"/>
-              </a:solidFill>
-              <a:cs typeface="Courier New"/>
-            </a:endParaRPr>
           </a:p>
           <a:p>
             <a:endParaRPr lang="en-US" dirty="0" smtClean="0">
@@ -19449,7 +20219,7 @@
         </p:nvSpPr>
         <p:spPr bwMode="auto">
           <a:xfrm>
-            <a:off x="5580112" y="3429000"/>
+            <a:off x="467544" y="2420888"/>
             <a:ext cx="2592288" cy="2088232"/>
           </a:xfrm>
           <a:prstGeom prst="rect">
@@ -19723,7 +20493,7 @@
         </p:nvSpPr>
         <p:spPr bwMode="auto">
           <a:xfrm>
-            <a:off x="3419872" y="1772816"/>
+            <a:off x="5868144" y="620688"/>
             <a:ext cx="2590056" cy="2160240"/>
           </a:xfrm>
           <a:prstGeom prst="rect">
@@ -21564,7 +22334,7 @@
         <p:spPr>
           <a:xfrm>
             <a:off x="827584" y="3049215"/>
-            <a:ext cx="2497949" cy="369332"/>
+            <a:ext cx="2574819" cy="369332"/>
           </a:xfrm>
           <a:prstGeom prst="rect">
             <a:avLst/>
@@ -21578,12 +22348,12 @@
           <a:lstStyle/>
           <a:p>
             <a:r>
-              <a:rPr lang="en-US" sz="1800" b="1" i="0" kern="1200" dirty="0" err="1" smtClean="0">
+              <a:rPr lang="en-US" sz="1800" b="1" i="0" kern="1200" dirty="0" smtClean="0">
                 <a:solidFill>
                   <a:schemeClr val="accent1"/>
                 </a:solidFill>
               </a:rPr>
-              <a:t>Sofware</a:t>
+              <a:t>Software </a:t>
             </a:r>
             <a:r>
               <a:rPr lang="en-US" sz="1800" b="1" i="0" kern="1200" dirty="0" smtClean="0">
@@ -21591,7 +22361,7 @@
                   <a:schemeClr val="accent1"/>
                 </a:solidFill>
               </a:rPr>
-              <a:t> Architecture</a:t>
+              <a:t>Architecture</a:t>
             </a:r>
             <a:endParaRPr lang="fr-FR" sz="1800" b="1" i="0" kern="1200" dirty="0" smtClean="0">
               <a:solidFill>
@@ -21624,12 +22394,12 @@
           <a:lstStyle/>
           <a:p>
             <a:r>
-              <a:rPr lang="en-US" sz="1800" b="1" i="0" kern="1200" dirty="0" err="1" smtClean="0">
+              <a:rPr lang="en-US" sz="1800" b="1" i="0" kern="1200" dirty="0" smtClean="0">
                 <a:solidFill>
                   <a:schemeClr val="accent1"/>
                 </a:solidFill>
               </a:rPr>
-              <a:t>Sofware</a:t>
+              <a:t>Software </a:t>
             </a:r>
             <a:r>
               <a:rPr lang="en-US" sz="1800" b="1" i="0" kern="1200" dirty="0" smtClean="0">
@@ -21637,7 +22407,7 @@
                   <a:schemeClr val="accent1"/>
                 </a:solidFill>
               </a:rPr>
-              <a:t> Architecture Verification</a:t>
+              <a:t>Architecture Verification</a:t>
             </a:r>
             <a:endParaRPr lang="fr-FR" sz="1800" b="1" i="0" kern="1200" dirty="0" smtClean="0">
               <a:solidFill>
@@ -25923,39 +26693,6 @@
           </a:p>
         </p:txBody>
       </p:sp>
-      <p:pic>
-        <p:nvPicPr>
-          <p:cNvPr id="3" name="Image 2" descr="Mitsubishi_Electric_logo.svg.png"/>
-          <p:cNvPicPr>
-            <a:picLocks noChangeAspect="1"/>
-          </p:cNvPicPr>
-          <p:nvPr/>
-        </p:nvPicPr>
-        <p:blipFill>
-          <a:blip r:embed="rId2">
-            <a:extLst>
-              <a:ext uri="{28A0092B-C50C-407E-A947-70E740481C1C}">
-                <a14:useLocalDpi xmlns:a14="http://schemas.microsoft.com/office/drawing/2010/main" val="0"/>
-              </a:ext>
-            </a:extLst>
-          </a:blip>
-          <a:stretch>
-            <a:fillRect/>
-          </a:stretch>
-        </p:blipFill>
-        <p:spPr>
-          <a:xfrm>
-            <a:off x="6876256" y="188640"/>
-            <a:ext cx="2051719" cy="625335"/>
-          </a:xfrm>
-          <a:prstGeom prst="rect">
-            <a:avLst/>
-          </a:prstGeom>
-          <a:solidFill>
-            <a:schemeClr val="bg1"/>
-          </a:solidFill>
-        </p:spPr>
-      </p:pic>
       <p:sp>
         <p:nvSpPr>
           <p:cNvPr id="4" name="Text Placeholder 3"/>
@@ -26177,7 +26914,7 @@
           <p:nvPr/>
         </p:nvPicPr>
         <p:blipFill>
-          <a:blip r:embed="rId3">
+          <a:blip r:embed="rId2">
             <a:extLst>
               <a:ext uri="{28A0092B-C50C-407E-A947-70E740481C1C}">
                 <a14:useLocalDpi xmlns:a14="http://schemas.microsoft.com/office/drawing/2010/main" val="0"/>
@@ -26192,6 +26929,30 @@
           <a:xfrm>
             <a:off x="1005408" y="3717032"/>
             <a:ext cx="7239000" cy="2590800"/>
+          </a:xfrm>
+          <a:prstGeom prst="rect">
+            <a:avLst/>
+          </a:prstGeom>
+        </p:spPr>
+      </p:pic>
+      <p:pic>
+        <p:nvPicPr>
+          <p:cNvPr id="7" name="Image 6" descr="Mitsubishi Electric Color Logo.jpg"/>
+          <p:cNvPicPr>
+            <a:picLocks noChangeAspect="1"/>
+          </p:cNvPicPr>
+          <p:nvPr/>
+        </p:nvPicPr>
+        <p:blipFill>
+          <a:blip r:embed="rId3" cstate="print"/>
+          <a:stretch>
+            <a:fillRect/>
+          </a:stretch>
+        </p:blipFill>
+        <p:spPr>
+          <a:xfrm>
+            <a:off x="6732240" y="260648"/>
+            <a:ext cx="2138970" cy="936104"/>
           </a:xfrm>
           <a:prstGeom prst="rect">
             <a:avLst/>
@@ -26251,13 +27012,45 @@
           <a:lstStyle/>
           <a:p>
             <a:r>
-              <a:rPr lang="en-US" dirty="0" err="1" smtClean="0"/>
-              <a:t>OpenETCS</a:t>
+              <a:rPr lang="en-US" dirty="0" smtClean="0"/>
+              <a:t>openETCS</a:t>
             </a:r>
             <a:endParaRPr lang="en-US" dirty="0"/>
           </a:p>
         </p:txBody>
       </p:sp>
+      <p:pic>
+        <p:nvPicPr>
+          <p:cNvPr id="1026" name="Picture 2"/>
+          <p:cNvPicPr>
+            <a:picLocks noChangeAspect="1" noChangeArrowheads="1"/>
+          </p:cNvPicPr>
+          <p:nvPr/>
+        </p:nvPicPr>
+        <p:blipFill>
+          <a:blip r:embed="rId2" cstate="print"/>
+          <a:srcRect/>
+          <a:stretch>
+            <a:fillRect/>
+          </a:stretch>
+        </p:blipFill>
+        <p:spPr bwMode="auto">
+          <a:xfrm>
+            <a:off x="1088404" y="908720"/>
+            <a:ext cx="8092108" cy="5593396"/>
+          </a:xfrm>
+          <a:prstGeom prst="rect">
+            <a:avLst/>
+          </a:prstGeom>
+          <a:noFill/>
+          <a:ln w="9525">
+            <a:noFill/>
+            <a:miter lim="800000"/>
+            <a:headEnd/>
+            <a:tailEnd/>
+          </a:ln>
+        </p:spPr>
+      </p:pic>
       <p:sp>
         <p:nvSpPr>
           <p:cNvPr id="4" name="Espace réservé du texte 3"/>
@@ -26268,19 +27061,98 @@
             <p:ph type="body" idx="1"/>
           </p:nvPr>
         </p:nvSpPr>
-        <p:spPr/>
+        <p:spPr>
+          <a:xfrm>
+            <a:off x="0" y="2276872"/>
+            <a:ext cx="2267744" cy="4320480"/>
+          </a:xfrm>
+        </p:spPr>
         <p:txBody>
           <a:bodyPr/>
           <a:lstStyle/>
           <a:p>
-            <a:endParaRPr lang="fr-FR"/>
+            <a:r>
+              <a:rPr lang="en-US" dirty="0" smtClean="0">
+                <a:solidFill>
+                  <a:schemeClr val="accent1"/>
+                </a:solidFill>
+              </a:rPr>
+              <a:t>Open Source </a:t>
+            </a:r>
+            <a:r>
+              <a:rPr lang="en-US" dirty="0" smtClean="0">
+                <a:sym typeface="Wingdings" pitchFamily="2" charset="2"/>
+              </a:rPr>
+              <a:t> no vendor lock-in</a:t>
+            </a:r>
+            <a:endParaRPr lang="en-US" dirty="0" smtClean="0"/>
+          </a:p>
+          <a:p>
+            <a:r>
+              <a:rPr lang="en-US" dirty="0" smtClean="0">
+                <a:solidFill>
+                  <a:schemeClr val="accent1"/>
+                </a:solidFill>
+              </a:rPr>
+              <a:t>Model </a:t>
+            </a:r>
+            <a:r>
+              <a:rPr lang="en-US" dirty="0" smtClean="0"/>
+              <a:t>based (SysML)</a:t>
+            </a:r>
+          </a:p>
+          <a:p>
+            <a:r>
+              <a:rPr lang="en-US" dirty="0" smtClean="0">
+                <a:solidFill>
+                  <a:schemeClr val="accent1"/>
+                </a:solidFill>
+              </a:rPr>
+              <a:t>Formal</a:t>
+            </a:r>
+            <a:r>
+              <a:rPr lang="en-US" dirty="0" smtClean="0"/>
+              <a:t> methods </a:t>
+            </a:r>
+            <a:r>
+              <a:rPr lang="en-US" dirty="0" smtClean="0">
+                <a:sym typeface="Wingdings" pitchFamily="2" charset="2"/>
+              </a:rPr>
+              <a:t> Strong guaranties of correctness</a:t>
+            </a:r>
+            <a:endParaRPr lang="en-US" dirty="0" smtClean="0"/>
+          </a:p>
+          <a:p>
+            <a:r>
+              <a:rPr lang="en-US" dirty="0" smtClean="0"/>
+              <a:t>“</a:t>
+            </a:r>
+            <a:r>
+              <a:rPr lang="en-US" dirty="0" smtClean="0">
+                <a:solidFill>
+                  <a:schemeClr val="accent1"/>
+                </a:solidFill>
+              </a:rPr>
+              <a:t>Open Proofs</a:t>
+            </a:r>
+            <a:r>
+              <a:rPr lang="en-US" dirty="0" smtClean="0"/>
+              <a:t>” </a:t>
+            </a:r>
+            <a:r>
+              <a:rPr lang="en-US" dirty="0" smtClean="0">
+                <a:sym typeface="Wingdings" pitchFamily="2" charset="2"/>
+              </a:rPr>
+              <a:t> Everybody can re-check</a:t>
+            </a:r>
+            <a:endParaRPr lang="en-US" dirty="0" smtClean="0"/>
           </a:p>
         </p:txBody>
       </p:sp>
     </p:spTree>
     <p:extLst>
       <p:ext uri="{BB962C8B-B14F-4D97-AF65-F5344CB8AC3E}">
-        <p14:creationId xmlns:p14="http://schemas.microsoft.com/office/powerpoint/2010/main" val="1640357046"/>
+        <p14:creationId xmlns:p14="http://schemas.microsoft.com/office/powerpoint/2010/main" val="1871805503"/>
       </p:ext>
     </p:extLst>
   </p:cSld>

</xml_diff>

<commit_message>
M419-014 Update slides with David L comments for ERTS
</commit_message>
<xml_diff>
--- a/slides/ERTS_20140205/SPARK_2014_Case_Studies.pptx
+++ b/slides/ERTS_20140205/SPARK_2014_Case_Studies.pptx
@@ -30,7 +30,7 @@
     <p:sldId id="1331" r:id="rId18"/>
     <p:sldId id="1299" r:id="rId19"/>
     <p:sldId id="1330" r:id="rId20"/>
-    <p:sldId id="1333" r:id="rId21"/>
+    <p:sldId id="1343" r:id="rId21"/>
     <p:sldId id="1334" r:id="rId22"/>
     <p:sldId id="1295" r:id="rId23"/>
     <p:sldId id="1291" r:id="rId24"/>
@@ -8116,60 +8116,6 @@
       </p:pic>
       <p:pic>
         <p:nvPicPr>
-          <p:cNvPr id="12" name="Picture 12" descr="ASTRIUM_3D_Blue_Strap"/>
-          <p:cNvPicPr>
-            <a:picLocks noChangeAspect="1" noChangeArrowheads="1"/>
-          </p:cNvPicPr>
-          <p:nvPr/>
-        </p:nvPicPr>
-        <p:blipFill>
-          <a:blip r:embed="rId3">
-            <a:extLst>
-              <a:ext uri="{28A0092B-C50C-407E-A947-70E740481C1C}">
-                <a14:useLocalDpi xmlns:a14="http://schemas.microsoft.com/office/drawing/2010/main" val="0"/>
-              </a:ext>
-            </a:extLst>
-          </a:blip>
-          <a:srcRect/>
-          <a:stretch>
-            <a:fillRect/>
-          </a:stretch>
-        </p:blipFill>
-        <p:spPr bwMode="auto">
-          <a:xfrm>
-            <a:off x="4716016" y="1340768"/>
-            <a:ext cx="2016125" cy="393700"/>
-          </a:xfrm>
-          <a:prstGeom prst="rect">
-            <a:avLst/>
-          </a:prstGeom>
-          <a:noFill/>
-          <a:ln>
-            <a:noFill/>
-          </a:ln>
-          <a:extLst>
-            <a:ext uri="{909E8E84-426E-40dd-AFC4-6F175D3DCCD1}">
-              <a14:hiddenFill xmlns:a14="http://schemas.microsoft.com/office/drawing/2010/main">
-                <a:solidFill>
-                  <a:srgbClr val="FFFFFF"/>
-                </a:solidFill>
-              </a14:hiddenFill>
-            </a:ext>
-            <a:ext uri="{91240B29-F687-4f45-9708-019B960494DF}">
-              <a14:hiddenLine xmlns:a14="http://schemas.microsoft.com/office/drawing/2010/main" w="9525">
-                <a:solidFill>
-                  <a:srgbClr val="000000"/>
-                </a:solidFill>
-                <a:miter lim="800000"/>
-                <a:headEnd/>
-                <a:tailEnd/>
-              </a14:hiddenLine>
-            </a:ext>
-          </a:extLst>
-        </p:spPr>
-      </p:pic>
-      <p:pic>
-        <p:nvPicPr>
           <p:cNvPr id="8" name="Image 7" descr="Mitsubishi Electric Color Logo.jpg"/>
           <p:cNvPicPr>
             <a:picLocks noChangeAspect="1"/>
@@ -8177,7 +8123,7 @@
           <p:nvPr/>
         </p:nvPicPr>
         <p:blipFill>
-          <a:blip r:embed="rId4" cstate="print"/>
+          <a:blip r:embed="rId3" cstate="print"/>
           <a:stretch>
             <a:fillRect/>
           </a:stretch>
@@ -8186,6 +8132,36 @@
           <a:xfrm>
             <a:off x="7041542" y="1066289"/>
             <a:ext cx="1778930" cy="778535"/>
+          </a:xfrm>
+          <a:prstGeom prst="rect">
+            <a:avLst/>
+          </a:prstGeom>
+        </p:spPr>
+      </p:pic>
+      <p:pic>
+        <p:nvPicPr>
+          <p:cNvPr id="2" name="Image 1" descr="AIRBUS_DS_3D_Silver_RGB.png"/>
+          <p:cNvPicPr>
+            <a:picLocks noChangeAspect="1"/>
+          </p:cNvPicPr>
+          <p:nvPr/>
+        </p:nvPicPr>
+        <p:blipFill>
+          <a:blip r:embed="rId4" cstate="print">
+            <a:extLst>
+              <a:ext uri="{28A0092B-C50C-407E-A947-70E740481C1C}">
+                <a14:useLocalDpi xmlns:a14="http://schemas.microsoft.com/office/drawing/2010/main" val="0"/>
+              </a:ext>
+            </a:extLst>
+          </a:blip>
+          <a:stretch>
+            <a:fillRect/>
+          </a:stretch>
+        </p:blipFill>
+        <p:spPr>
+          <a:xfrm>
+            <a:off x="4606597" y="1124744"/>
+            <a:ext cx="2485683" cy="864095"/>
           </a:xfrm>
           <a:prstGeom prst="rect">
             <a:avLst/>
@@ -10371,8 +10347,23 @@
                 </a:solidFill>
                 <a:cs typeface="Courier New"/>
               </a:rPr>
-              <a:t> of the specifications</a:t>
-            </a:r>
+              <a:t> of the </a:t>
+            </a:r>
+            <a:r>
+              <a:rPr lang="en-US" b="0" dirty="0" smtClean="0">
+                <a:solidFill>
+                  <a:schemeClr val="tx1"/>
+                </a:solidFill>
+                <a:cs typeface="Courier New"/>
+              </a:rPr>
+              <a:t>specifications (= contracts)</a:t>
+            </a:r>
+            <a:endParaRPr lang="en-US" b="0" dirty="0" smtClean="0">
+              <a:solidFill>
+                <a:schemeClr val="tx1"/>
+              </a:solidFill>
+              <a:cs typeface="Courier New"/>
+            </a:endParaRPr>
           </a:p>
           <a:p>
             <a:r>
@@ -10960,7 +10951,7 @@
       </p:sp>
       <p:pic>
         <p:nvPicPr>
-          <p:cNvPr id="5" name="Picture 12" descr="ASTRIUM_3D_Blue_Strap"/>
+          <p:cNvPr id="6" name="Picture 16" descr="ATV_02"/>
           <p:cNvPicPr>
             <a:picLocks noChangeAspect="1" noChangeArrowheads="1"/>
           </p:cNvPicPr>
@@ -10968,60 +10959,6 @@
         </p:nvPicPr>
         <p:blipFill>
           <a:blip r:embed="rId2">
-            <a:extLst>
-              <a:ext uri="{28A0092B-C50C-407E-A947-70E740481C1C}">
-                <a14:useLocalDpi xmlns:a14="http://schemas.microsoft.com/office/drawing/2010/main" val="0"/>
-              </a:ext>
-            </a:extLst>
-          </a:blip>
-          <a:srcRect/>
-          <a:stretch>
-            <a:fillRect/>
-          </a:stretch>
-        </p:blipFill>
-        <p:spPr bwMode="auto">
-          <a:xfrm>
-            <a:off x="6732240" y="260648"/>
-            <a:ext cx="2016125" cy="393700"/>
-          </a:xfrm>
-          <a:prstGeom prst="rect">
-            <a:avLst/>
-          </a:prstGeom>
-          <a:noFill/>
-          <a:ln>
-            <a:noFill/>
-          </a:ln>
-          <a:extLst>
-            <a:ext uri="{909E8E84-426E-40dd-AFC4-6F175D3DCCD1}">
-              <a14:hiddenFill xmlns:a14="http://schemas.microsoft.com/office/drawing/2010/main">
-                <a:solidFill>
-                  <a:srgbClr val="FFFFFF"/>
-                </a:solidFill>
-              </a14:hiddenFill>
-            </a:ext>
-            <a:ext uri="{91240B29-F687-4f45-9708-019B960494DF}">
-              <a14:hiddenLine xmlns:a14="http://schemas.microsoft.com/office/drawing/2010/main" w="9525">
-                <a:solidFill>
-                  <a:srgbClr val="000000"/>
-                </a:solidFill>
-                <a:miter lim="800000"/>
-                <a:headEnd/>
-                <a:tailEnd/>
-              </a14:hiddenLine>
-            </a:ext>
-          </a:extLst>
-        </p:spPr>
-      </p:pic>
-      <p:pic>
-        <p:nvPicPr>
-          <p:cNvPr id="6" name="Picture 16" descr="ATV_02"/>
-          <p:cNvPicPr>
-            <a:picLocks noChangeAspect="1" noChangeArrowheads="1"/>
-          </p:cNvPicPr>
-          <p:nvPr/>
-        </p:nvPicPr>
-        <p:blipFill>
-          <a:blip r:embed="rId3">
             <a:extLst>
               <a:ext uri="{28A0092B-C50C-407E-A947-70E740481C1C}">
                 <a14:useLocalDpi xmlns:a14="http://schemas.microsoft.com/office/drawing/2010/main" val="0"/>
@@ -11070,7 +11007,7 @@
           <p:nvPr/>
         </p:nvPicPr>
         <p:blipFill>
-          <a:blip r:embed="rId4">
+          <a:blip r:embed="rId3">
             <a:lum bright="18000"/>
             <a:extLst>
               <a:ext uri="{28A0092B-C50C-407E-A947-70E740481C1C}">
@@ -11109,6 +11046,36 @@
               </a14:hiddenFill>
             </a:ext>
           </a:extLst>
+        </p:spPr>
+      </p:pic>
+      <p:pic>
+        <p:nvPicPr>
+          <p:cNvPr id="8" name="Image 7" descr="AIRBUS_DS_3D_Silver_RGB.png"/>
+          <p:cNvPicPr>
+            <a:picLocks noChangeAspect="1"/>
+          </p:cNvPicPr>
+          <p:nvPr/>
+        </p:nvPicPr>
+        <p:blipFill>
+          <a:blip r:embed="rId4" cstate="print">
+            <a:extLst>
+              <a:ext uri="{28A0092B-C50C-407E-A947-70E740481C1C}">
+                <a14:useLocalDpi xmlns:a14="http://schemas.microsoft.com/office/drawing/2010/main" val="0"/>
+              </a:ext>
+            </a:extLst>
+          </a:blip>
+          <a:stretch>
+            <a:fillRect/>
+          </a:stretch>
+        </p:blipFill>
+        <p:spPr>
+          <a:xfrm>
+            <a:off x="6658317" y="-31895"/>
+            <a:ext cx="2485683" cy="864095"/>
+          </a:xfrm>
+          <a:prstGeom prst="rect">
+            <a:avLst/>
+          </a:prstGeom>
         </p:spPr>
       </p:pic>
     </p:spTree>
@@ -11624,404 +11591,6 @@
           </a:p>
         </p:txBody>
       </p:sp>
-      <p:grpSp>
-        <p:nvGrpSpPr>
-          <p:cNvPr id="16" name="Group 27"/>
-          <p:cNvGrpSpPr>
-            <a:grpSpLocks/>
-          </p:cNvGrpSpPr>
-          <p:nvPr/>
-        </p:nvGrpSpPr>
-        <p:grpSpPr bwMode="auto">
-          <a:xfrm>
-            <a:off x="2391767" y="5509220"/>
-            <a:ext cx="3908425" cy="800100"/>
-            <a:chOff x="515" y="3322"/>
-            <a:chExt cx="2462" cy="504"/>
-          </a:xfrm>
-          <a:solidFill>
-            <a:schemeClr val="bg2"/>
-          </a:solidFill>
-        </p:grpSpPr>
-        <p:sp>
-          <p:nvSpPr>
-            <p:cNvPr id="17" name="Rectangle 28"/>
-            <p:cNvSpPr>
-              <a:spLocks noChangeArrowheads="1"/>
-            </p:cNvSpPr>
-            <p:nvPr/>
-          </p:nvSpPr>
-          <p:spPr bwMode="auto">
-            <a:xfrm>
-              <a:off x="515" y="3322"/>
-              <a:ext cx="817" cy="170"/>
-            </a:xfrm>
-            <a:prstGeom prst="rect">
-              <a:avLst/>
-            </a:prstGeom>
-            <a:grpFill/>
-            <a:ln w="38100">
-              <a:solidFill>
-                <a:srgbClr val="FF0000"/>
-              </a:solidFill>
-              <a:miter lim="800000"/>
-              <a:headEnd/>
-              <a:tailEnd/>
-            </a:ln>
-            <a:effectLst/>
-            <a:extLst>
-              <a:ext uri="{AF507438-7753-43e0-B8FC-AC1667EBCBE1}">
-                <a14:hiddenEffects xmlns:a14="http://schemas.microsoft.com/office/drawing/2010/main">
-                  <a:effectLst>
-                    <a:outerShdw blurRad="63500" dist="38099" dir="2700000" algn="ctr" rotWithShape="0">
-                      <a:schemeClr val="bg2">
-                        <a:alpha val="74998"/>
-                      </a:schemeClr>
-                    </a:outerShdw>
-                  </a:effectLst>
-                </a14:hiddenEffects>
-              </a:ext>
-            </a:extLst>
-          </p:spPr>
-          <p:txBody>
-            <a:bodyPr lIns="0" tIns="0" rIns="0" bIns="0" anchor="ctr"/>
-            <a:lstStyle/>
-            <a:p>
-              <a:pPr eaLnBrk="1" hangingPunct="1">
-                <a:lnSpc>
-                  <a:spcPct val="95000"/>
-                </a:lnSpc>
-                <a:spcBef>
-                  <a:spcPct val="50000"/>
-                </a:spcBef>
-              </a:pPr>
-              <a:r>
-                <a:rPr lang="en-GB" sz="1800">
-                  <a:solidFill>
-                    <a:srgbClr val="33CC33"/>
-                  </a:solidFill>
-                </a:rPr>
-                <a:t>Event1</a:t>
-              </a:r>
-            </a:p>
-          </p:txBody>
-        </p:sp>
-        <p:sp>
-          <p:nvSpPr>
-            <p:cNvPr id="18" name="Rectangle 29"/>
-            <p:cNvSpPr>
-              <a:spLocks noChangeArrowheads="1"/>
-            </p:cNvSpPr>
-            <p:nvPr/>
-          </p:nvSpPr>
-          <p:spPr bwMode="auto">
-            <a:xfrm>
-              <a:off x="1338" y="3322"/>
-              <a:ext cx="817" cy="170"/>
-            </a:xfrm>
-            <a:prstGeom prst="rect">
-              <a:avLst/>
-            </a:prstGeom>
-            <a:grpFill/>
-            <a:ln w="9525">
-              <a:solidFill>
-                <a:schemeClr val="tx2"/>
-              </a:solidFill>
-              <a:miter lim="800000"/>
-              <a:headEnd/>
-              <a:tailEnd/>
-            </a:ln>
-            <a:effectLst/>
-            <a:extLst>
-              <a:ext uri="{AF507438-7753-43e0-B8FC-AC1667EBCBE1}">
-                <a14:hiddenEffects xmlns:a14="http://schemas.microsoft.com/office/drawing/2010/main">
-                  <a:effectLst>
-                    <a:outerShdw blurRad="63500" dist="38099" dir="2700000" algn="ctr" rotWithShape="0">
-                      <a:schemeClr val="bg2">
-                        <a:alpha val="74998"/>
-                      </a:schemeClr>
-                    </a:outerShdw>
-                  </a:effectLst>
-                </a14:hiddenEffects>
-              </a:ext>
-            </a:extLst>
-          </p:spPr>
-          <p:txBody>
-            <a:bodyPr lIns="0" tIns="0" rIns="0" bIns="0" anchor="ctr"/>
-            <a:lstStyle/>
-            <a:p>
-              <a:pPr eaLnBrk="1" hangingPunct="1">
-                <a:lnSpc>
-                  <a:spcPct val="95000"/>
-                </a:lnSpc>
-                <a:spcBef>
-                  <a:spcPct val="50000"/>
-                </a:spcBef>
-              </a:pPr>
-              <a:r>
-                <a:rPr lang="en-GB" sz="1800">
-                  <a:solidFill>
-                    <a:srgbClr val="FF0000"/>
-                  </a:solidFill>
-                </a:rPr>
-                <a:t>Event2</a:t>
-              </a:r>
-            </a:p>
-          </p:txBody>
-        </p:sp>
-        <p:sp>
-          <p:nvSpPr>
-            <p:cNvPr id="19" name="Rectangle 30"/>
-            <p:cNvSpPr>
-              <a:spLocks noChangeArrowheads="1"/>
-            </p:cNvSpPr>
-            <p:nvPr/>
-          </p:nvSpPr>
-          <p:spPr bwMode="auto">
-            <a:xfrm>
-              <a:off x="2160" y="3322"/>
-              <a:ext cx="817" cy="170"/>
-            </a:xfrm>
-            <a:prstGeom prst="rect">
-              <a:avLst/>
-            </a:prstGeom>
-            <a:grpFill/>
-            <a:ln w="38100">
-              <a:solidFill>
-                <a:srgbClr val="FF0000"/>
-              </a:solidFill>
-              <a:miter lim="800000"/>
-              <a:headEnd/>
-              <a:tailEnd/>
-            </a:ln>
-            <a:effectLst/>
-            <a:extLst>
-              <a:ext uri="{AF507438-7753-43e0-B8FC-AC1667EBCBE1}">
-                <a14:hiddenEffects xmlns:a14="http://schemas.microsoft.com/office/drawing/2010/main">
-                  <a:effectLst>
-                    <a:outerShdw blurRad="63500" dist="38099" dir="2700000" algn="ctr" rotWithShape="0">
-                      <a:schemeClr val="bg2">
-                        <a:alpha val="74998"/>
-                      </a:schemeClr>
-                    </a:outerShdw>
-                  </a:effectLst>
-                </a14:hiddenEffects>
-              </a:ext>
-            </a:extLst>
-          </p:spPr>
-          <p:txBody>
-            <a:bodyPr lIns="0" tIns="0" rIns="0" bIns="0" anchor="ctr"/>
-            <a:lstStyle/>
-            <a:p>
-              <a:pPr eaLnBrk="1" hangingPunct="1">
-                <a:lnSpc>
-                  <a:spcPct val="95000"/>
-                </a:lnSpc>
-                <a:spcBef>
-                  <a:spcPct val="50000"/>
-                </a:spcBef>
-              </a:pPr>
-              <a:r>
-                <a:rPr lang="en-GB" sz="1800">
-                  <a:solidFill>
-                    <a:srgbClr val="33CC33"/>
-                  </a:solidFill>
-                </a:rPr>
-                <a:t>Event3</a:t>
-              </a:r>
-            </a:p>
-          </p:txBody>
-        </p:sp>
-        <p:sp>
-          <p:nvSpPr>
-            <p:cNvPr id="20" name="Rectangle 31"/>
-            <p:cNvSpPr>
-              <a:spLocks noChangeArrowheads="1"/>
-            </p:cNvSpPr>
-            <p:nvPr/>
-          </p:nvSpPr>
-          <p:spPr bwMode="auto">
-            <a:xfrm>
-              <a:off x="515" y="3492"/>
-              <a:ext cx="817" cy="334"/>
-            </a:xfrm>
-            <a:prstGeom prst="rect">
-              <a:avLst/>
-            </a:prstGeom>
-            <a:grpFill/>
-            <a:ln w="38100">
-              <a:solidFill>
-                <a:srgbClr val="FF0000"/>
-              </a:solidFill>
-              <a:miter lim="800000"/>
-              <a:headEnd/>
-              <a:tailEnd/>
-            </a:ln>
-            <a:effectLst/>
-            <a:extLst>
-              <a:ext uri="{AF507438-7753-43e0-B8FC-AC1667EBCBE1}">
-                <a14:hiddenEffects xmlns:a14="http://schemas.microsoft.com/office/drawing/2010/main">
-                  <a:effectLst>
-                    <a:outerShdw blurRad="63500" dist="38099" dir="2700000" algn="ctr" rotWithShape="0">
-                      <a:schemeClr val="bg2">
-                        <a:alpha val="74998"/>
-                      </a:schemeClr>
-                    </a:outerShdw>
-                  </a:effectLst>
-                </a14:hiddenEffects>
-              </a:ext>
-            </a:extLst>
-          </p:spPr>
-          <p:txBody>
-            <a:bodyPr lIns="0" tIns="0" rIns="0" bIns="0" anchor="ctr"/>
-            <a:lstStyle/>
-            <a:p>
-              <a:pPr eaLnBrk="1" hangingPunct="1">
-                <a:lnSpc>
-                  <a:spcPct val="95000"/>
-                </a:lnSpc>
-                <a:spcBef>
-                  <a:spcPct val="50000"/>
-                </a:spcBef>
-              </a:pPr>
-              <a:r>
-                <a:rPr lang="en-GB" sz="1800">
-                  <a:solidFill>
-                    <a:srgbClr val="33CC33"/>
-                  </a:solidFill>
-                </a:rPr>
-                <a:t>Not detected</a:t>
-              </a:r>
-            </a:p>
-          </p:txBody>
-        </p:sp>
-        <p:sp>
-          <p:nvSpPr>
-            <p:cNvPr id="21" name="Rectangle 32"/>
-            <p:cNvSpPr>
-              <a:spLocks noChangeArrowheads="1"/>
-            </p:cNvSpPr>
-            <p:nvPr/>
-          </p:nvSpPr>
-          <p:spPr bwMode="auto">
-            <a:xfrm>
-              <a:off x="1338" y="3492"/>
-              <a:ext cx="817" cy="334"/>
-            </a:xfrm>
-            <a:prstGeom prst="rect">
-              <a:avLst/>
-            </a:prstGeom>
-            <a:grpFill/>
-            <a:ln w="9525">
-              <a:solidFill>
-                <a:schemeClr val="tx2"/>
-              </a:solidFill>
-              <a:miter lim="800000"/>
-              <a:headEnd/>
-              <a:tailEnd/>
-            </a:ln>
-            <a:effectLst/>
-            <a:extLst>
-              <a:ext uri="{AF507438-7753-43e0-B8FC-AC1667EBCBE1}">
-                <a14:hiddenEffects xmlns:a14="http://schemas.microsoft.com/office/drawing/2010/main">
-                  <a:effectLst>
-                    <a:outerShdw blurRad="63500" dist="38099" dir="2700000" algn="ctr" rotWithShape="0">
-                      <a:schemeClr val="bg2">
-                        <a:alpha val="74998"/>
-                      </a:schemeClr>
-                    </a:outerShdw>
-                  </a:effectLst>
-                </a14:hiddenEffects>
-              </a:ext>
-            </a:extLst>
-          </p:spPr>
-          <p:txBody>
-            <a:bodyPr lIns="0" tIns="0" rIns="0" bIns="0" anchor="ctr"/>
-            <a:lstStyle/>
-            <a:p>
-              <a:pPr eaLnBrk="1" hangingPunct="1">
-                <a:lnSpc>
-                  <a:spcPct val="95000"/>
-                </a:lnSpc>
-                <a:spcBef>
-                  <a:spcPct val="50000"/>
-                </a:spcBef>
-              </a:pPr>
-              <a:r>
-                <a:rPr lang="en-GB" sz="1800">
-                  <a:solidFill>
-                    <a:srgbClr val="FF0000"/>
-                  </a:solidFill>
-                </a:rPr>
-                <a:t>Not detected</a:t>
-              </a:r>
-            </a:p>
-          </p:txBody>
-        </p:sp>
-        <p:sp>
-          <p:nvSpPr>
-            <p:cNvPr id="22" name="Rectangle 33"/>
-            <p:cNvSpPr>
-              <a:spLocks noChangeArrowheads="1"/>
-            </p:cNvSpPr>
-            <p:nvPr/>
-          </p:nvSpPr>
-          <p:spPr bwMode="auto">
-            <a:xfrm>
-              <a:off x="2160" y="3492"/>
-              <a:ext cx="817" cy="334"/>
-            </a:xfrm>
-            <a:prstGeom prst="rect">
-              <a:avLst/>
-            </a:prstGeom>
-            <a:grpFill/>
-            <a:ln w="38100">
-              <a:solidFill>
-                <a:srgbClr val="FF0000"/>
-              </a:solidFill>
-              <a:miter lim="800000"/>
-              <a:headEnd/>
-              <a:tailEnd/>
-            </a:ln>
-            <a:effectLst/>
-            <a:extLst>
-              <a:ext uri="{AF507438-7753-43e0-B8FC-AC1667EBCBE1}">
-                <a14:hiddenEffects xmlns:a14="http://schemas.microsoft.com/office/drawing/2010/main">
-                  <a:effectLst>
-                    <a:outerShdw blurRad="63500" dist="38099" dir="2700000" algn="ctr" rotWithShape="0">
-                      <a:schemeClr val="bg2">
-                        <a:alpha val="74998"/>
-                      </a:schemeClr>
-                    </a:outerShdw>
-                  </a:effectLst>
-                </a14:hiddenEffects>
-              </a:ext>
-            </a:extLst>
-          </p:spPr>
-          <p:txBody>
-            <a:bodyPr lIns="0" tIns="0" rIns="0" bIns="0" anchor="ctr"/>
-            <a:lstStyle/>
-            <a:p>
-              <a:pPr eaLnBrk="1" hangingPunct="1">
-                <a:lnSpc>
-                  <a:spcPct val="95000"/>
-                </a:lnSpc>
-                <a:spcBef>
-                  <a:spcPct val="50000"/>
-                </a:spcBef>
-              </a:pPr>
-              <a:r>
-                <a:rPr lang="en-GB" sz="1800" dirty="0">
-                  <a:solidFill>
-                    <a:srgbClr val="33CC33"/>
-                  </a:solidFill>
-                </a:rPr>
-                <a:t>Detected</a:t>
-              </a:r>
-            </a:p>
-          </p:txBody>
-        </p:sp>
-      </p:grpSp>
       <p:sp>
         <p:nvSpPr>
           <p:cNvPr id="23" name="Rectangle 35"/>
@@ -13387,6 +12956,1550 @@
           </p:txBody>
         </p:sp>
       </p:grpSp>
+      <p:grpSp>
+        <p:nvGrpSpPr>
+          <p:cNvPr id="35" name="Group 6"/>
+          <p:cNvGrpSpPr>
+            <a:grpSpLocks/>
+          </p:cNvGrpSpPr>
+          <p:nvPr/>
+        </p:nvGrpSpPr>
+        <p:grpSpPr bwMode="auto">
+          <a:xfrm>
+            <a:off x="2319759" y="5437212"/>
+            <a:ext cx="3908425" cy="800100"/>
+            <a:chOff x="515" y="3322"/>
+            <a:chExt cx="2462" cy="504"/>
+          </a:xfrm>
+          <a:solidFill>
+            <a:schemeClr val="bg2"/>
+          </a:solidFill>
+        </p:grpSpPr>
+        <p:sp>
+          <p:nvSpPr>
+            <p:cNvPr id="36" name="Rectangle 7"/>
+            <p:cNvSpPr>
+              <a:spLocks noChangeArrowheads="1"/>
+            </p:cNvSpPr>
+            <p:nvPr/>
+          </p:nvSpPr>
+          <p:spPr bwMode="auto">
+            <a:xfrm>
+              <a:off x="515" y="3322"/>
+              <a:ext cx="817" cy="170"/>
+            </a:xfrm>
+            <a:prstGeom prst="rect">
+              <a:avLst/>
+            </a:prstGeom>
+            <a:grpFill/>
+            <a:ln w="9525">
+              <a:solidFill>
+                <a:schemeClr val="tx2"/>
+              </a:solidFill>
+              <a:miter lim="800000"/>
+              <a:headEnd/>
+              <a:tailEnd/>
+            </a:ln>
+            <a:effectLst/>
+            <a:extLst>
+              <a:ext uri="{AF507438-7753-43e0-B8FC-AC1667EBCBE1}">
+                <a14:hiddenEffects xmlns:a14="http://schemas.microsoft.com/office/drawing/2010/main">
+                  <a:effectLst>
+                    <a:outerShdw blurRad="63500" dist="38099" dir="2700000" algn="ctr" rotWithShape="0">
+                      <a:schemeClr val="bg2">
+                        <a:alpha val="74998"/>
+                      </a:schemeClr>
+                    </a:outerShdw>
+                  </a:effectLst>
+                </a14:hiddenEffects>
+              </a:ext>
+            </a:extLst>
+          </p:spPr>
+          <p:txBody>
+            <a:bodyPr lIns="0" tIns="0" rIns="0" bIns="0" anchor="ctr"/>
+            <a:lstStyle/>
+            <a:p>
+              <a:pPr eaLnBrk="1" hangingPunct="1">
+                <a:lnSpc>
+                  <a:spcPct val="95000"/>
+                </a:lnSpc>
+                <a:spcBef>
+                  <a:spcPct val="50000"/>
+                </a:spcBef>
+              </a:pPr>
+              <a:r>
+                <a:rPr lang="en-GB" sz="1800" dirty="0"/>
+                <a:t>Event1</a:t>
+              </a:r>
+            </a:p>
+          </p:txBody>
+        </p:sp>
+        <p:sp>
+          <p:nvSpPr>
+            <p:cNvPr id="37" name="Rectangle 8"/>
+            <p:cNvSpPr>
+              <a:spLocks noChangeArrowheads="1"/>
+            </p:cNvSpPr>
+            <p:nvPr/>
+          </p:nvSpPr>
+          <p:spPr bwMode="auto">
+            <a:xfrm>
+              <a:off x="1338" y="3322"/>
+              <a:ext cx="817" cy="170"/>
+            </a:xfrm>
+            <a:prstGeom prst="rect">
+              <a:avLst/>
+            </a:prstGeom>
+            <a:grpFill/>
+            <a:ln w="9525">
+              <a:solidFill>
+                <a:schemeClr val="tx2"/>
+              </a:solidFill>
+              <a:miter lim="800000"/>
+              <a:headEnd/>
+              <a:tailEnd/>
+            </a:ln>
+            <a:effectLst/>
+            <a:extLst>
+              <a:ext uri="{AF507438-7753-43e0-B8FC-AC1667EBCBE1}">
+                <a14:hiddenEffects xmlns:a14="http://schemas.microsoft.com/office/drawing/2010/main">
+                  <a:effectLst>
+                    <a:outerShdw blurRad="63500" dist="38099" dir="2700000" algn="ctr" rotWithShape="0">
+                      <a:schemeClr val="bg2">
+                        <a:alpha val="74998"/>
+                      </a:schemeClr>
+                    </a:outerShdw>
+                  </a:effectLst>
+                </a14:hiddenEffects>
+              </a:ext>
+            </a:extLst>
+          </p:spPr>
+          <p:txBody>
+            <a:bodyPr lIns="0" tIns="0" rIns="0" bIns="0" anchor="ctr"/>
+            <a:lstStyle/>
+            <a:p>
+              <a:pPr eaLnBrk="1" hangingPunct="1">
+                <a:lnSpc>
+                  <a:spcPct val="95000"/>
+                </a:lnSpc>
+                <a:spcBef>
+                  <a:spcPct val="50000"/>
+                </a:spcBef>
+              </a:pPr>
+              <a:r>
+                <a:rPr lang="en-GB" sz="1800"/>
+                <a:t>Event2</a:t>
+              </a:r>
+            </a:p>
+          </p:txBody>
+        </p:sp>
+        <p:sp>
+          <p:nvSpPr>
+            <p:cNvPr id="38" name="Rectangle 9"/>
+            <p:cNvSpPr>
+              <a:spLocks noChangeArrowheads="1"/>
+            </p:cNvSpPr>
+            <p:nvPr/>
+          </p:nvSpPr>
+          <p:spPr bwMode="auto">
+            <a:xfrm>
+              <a:off x="2160" y="3322"/>
+              <a:ext cx="817" cy="170"/>
+            </a:xfrm>
+            <a:prstGeom prst="rect">
+              <a:avLst/>
+            </a:prstGeom>
+            <a:grpFill/>
+            <a:ln w="9525">
+              <a:solidFill>
+                <a:schemeClr val="tx2"/>
+              </a:solidFill>
+              <a:miter lim="800000"/>
+              <a:headEnd/>
+              <a:tailEnd/>
+            </a:ln>
+            <a:effectLst/>
+            <a:extLst>
+              <a:ext uri="{AF507438-7753-43e0-B8FC-AC1667EBCBE1}">
+                <a14:hiddenEffects xmlns:a14="http://schemas.microsoft.com/office/drawing/2010/main">
+                  <a:effectLst>
+                    <a:outerShdw blurRad="63500" dist="38099" dir="2700000" algn="ctr" rotWithShape="0">
+                      <a:schemeClr val="bg2">
+                        <a:alpha val="74998"/>
+                      </a:schemeClr>
+                    </a:outerShdw>
+                  </a:effectLst>
+                </a14:hiddenEffects>
+              </a:ext>
+            </a:extLst>
+          </p:spPr>
+          <p:txBody>
+            <a:bodyPr lIns="0" tIns="0" rIns="0" bIns="0" anchor="ctr"/>
+            <a:lstStyle/>
+            <a:p>
+              <a:pPr eaLnBrk="1" hangingPunct="1">
+                <a:lnSpc>
+                  <a:spcPct val="95000"/>
+                </a:lnSpc>
+                <a:spcBef>
+                  <a:spcPct val="50000"/>
+                </a:spcBef>
+              </a:pPr>
+              <a:r>
+                <a:rPr lang="en-GB" sz="1800"/>
+                <a:t>Event3</a:t>
+              </a:r>
+            </a:p>
+          </p:txBody>
+        </p:sp>
+        <p:sp>
+          <p:nvSpPr>
+            <p:cNvPr id="39" name="Rectangle 10"/>
+            <p:cNvSpPr>
+              <a:spLocks noChangeArrowheads="1"/>
+            </p:cNvSpPr>
+            <p:nvPr/>
+          </p:nvSpPr>
+          <p:spPr bwMode="auto">
+            <a:xfrm>
+              <a:off x="515" y="3492"/>
+              <a:ext cx="817" cy="334"/>
+            </a:xfrm>
+            <a:prstGeom prst="rect">
+              <a:avLst/>
+            </a:prstGeom>
+            <a:grpFill/>
+            <a:ln w="9525">
+              <a:solidFill>
+                <a:schemeClr val="tx2"/>
+              </a:solidFill>
+              <a:miter lim="800000"/>
+              <a:headEnd/>
+              <a:tailEnd/>
+            </a:ln>
+            <a:effectLst/>
+            <a:extLst>
+              <a:ext uri="{AF507438-7753-43e0-B8FC-AC1667EBCBE1}">
+                <a14:hiddenEffects xmlns:a14="http://schemas.microsoft.com/office/drawing/2010/main">
+                  <a:effectLst>
+                    <a:outerShdw blurRad="63500" dist="38099" dir="2700000" algn="ctr" rotWithShape="0">
+                      <a:schemeClr val="bg2">
+                        <a:alpha val="74998"/>
+                      </a:schemeClr>
+                    </a:outerShdw>
+                  </a:effectLst>
+                </a14:hiddenEffects>
+              </a:ext>
+            </a:extLst>
+          </p:spPr>
+          <p:txBody>
+            <a:bodyPr lIns="0" tIns="0" rIns="0" bIns="0" anchor="ctr"/>
+            <a:lstStyle/>
+            <a:p>
+              <a:pPr eaLnBrk="1" hangingPunct="1">
+                <a:lnSpc>
+                  <a:spcPct val="95000"/>
+                </a:lnSpc>
+                <a:spcBef>
+                  <a:spcPct val="50000"/>
+                </a:spcBef>
+              </a:pPr>
+              <a:r>
+                <a:rPr lang="en-GB" sz="1800"/>
+                <a:t>Not detected</a:t>
+              </a:r>
+            </a:p>
+          </p:txBody>
+        </p:sp>
+        <p:sp>
+          <p:nvSpPr>
+            <p:cNvPr id="40" name="Rectangle 11"/>
+            <p:cNvSpPr>
+              <a:spLocks noChangeArrowheads="1"/>
+            </p:cNvSpPr>
+            <p:nvPr/>
+          </p:nvSpPr>
+          <p:spPr bwMode="auto">
+            <a:xfrm>
+              <a:off x="1338" y="3492"/>
+              <a:ext cx="817" cy="334"/>
+            </a:xfrm>
+            <a:prstGeom prst="rect">
+              <a:avLst/>
+            </a:prstGeom>
+            <a:grpFill/>
+            <a:ln w="9525">
+              <a:solidFill>
+                <a:schemeClr val="tx2"/>
+              </a:solidFill>
+              <a:miter lim="800000"/>
+              <a:headEnd/>
+              <a:tailEnd/>
+            </a:ln>
+            <a:effectLst/>
+            <a:extLst>
+              <a:ext uri="{AF507438-7753-43e0-B8FC-AC1667EBCBE1}">
+                <a14:hiddenEffects xmlns:a14="http://schemas.microsoft.com/office/drawing/2010/main">
+                  <a:effectLst>
+                    <a:outerShdw blurRad="63500" dist="38099" dir="2700000" algn="ctr" rotWithShape="0">
+                      <a:schemeClr val="bg2">
+                        <a:alpha val="74998"/>
+                      </a:schemeClr>
+                    </a:outerShdw>
+                  </a:effectLst>
+                </a14:hiddenEffects>
+              </a:ext>
+            </a:extLst>
+          </p:spPr>
+          <p:txBody>
+            <a:bodyPr lIns="0" tIns="0" rIns="0" bIns="0" anchor="ctr"/>
+            <a:lstStyle/>
+            <a:p>
+              <a:pPr eaLnBrk="1" hangingPunct="1">
+                <a:lnSpc>
+                  <a:spcPct val="95000"/>
+                </a:lnSpc>
+                <a:spcBef>
+                  <a:spcPct val="50000"/>
+                </a:spcBef>
+              </a:pPr>
+              <a:r>
+                <a:rPr lang="en-GB" sz="1800"/>
+                <a:t>Detected</a:t>
+              </a:r>
+            </a:p>
+          </p:txBody>
+        </p:sp>
+        <p:sp>
+          <p:nvSpPr>
+            <p:cNvPr id="41" name="Rectangle 12"/>
+            <p:cNvSpPr>
+              <a:spLocks noChangeArrowheads="1"/>
+            </p:cNvSpPr>
+            <p:nvPr/>
+          </p:nvSpPr>
+          <p:spPr bwMode="auto">
+            <a:xfrm>
+              <a:off x="2160" y="3492"/>
+              <a:ext cx="817" cy="334"/>
+            </a:xfrm>
+            <a:prstGeom prst="rect">
+              <a:avLst/>
+            </a:prstGeom>
+            <a:grpFill/>
+            <a:ln w="9525">
+              <a:solidFill>
+                <a:schemeClr val="tx2"/>
+              </a:solidFill>
+              <a:miter lim="800000"/>
+              <a:headEnd/>
+              <a:tailEnd/>
+            </a:ln>
+            <a:effectLst/>
+            <a:extLst>
+              <a:ext uri="{AF507438-7753-43e0-B8FC-AC1667EBCBE1}">
+                <a14:hiddenEffects xmlns:a14="http://schemas.microsoft.com/office/drawing/2010/main">
+                  <a:effectLst>
+                    <a:outerShdw blurRad="63500" dist="38099" dir="2700000" algn="ctr" rotWithShape="0">
+                      <a:schemeClr val="bg2">
+                        <a:alpha val="74998"/>
+                      </a:schemeClr>
+                    </a:outerShdw>
+                  </a:effectLst>
+                </a14:hiddenEffects>
+              </a:ext>
+            </a:extLst>
+          </p:spPr>
+          <p:txBody>
+            <a:bodyPr lIns="0" tIns="0" rIns="0" bIns="0" anchor="ctr"/>
+            <a:lstStyle/>
+            <a:p>
+              <a:pPr eaLnBrk="1" hangingPunct="1">
+                <a:lnSpc>
+                  <a:spcPct val="95000"/>
+                </a:lnSpc>
+                <a:spcBef>
+                  <a:spcPct val="50000"/>
+                </a:spcBef>
+              </a:pPr>
+              <a:r>
+                <a:rPr lang="en-GB" sz="1800"/>
+                <a:t>Detected</a:t>
+              </a:r>
+            </a:p>
+          </p:txBody>
+        </p:sp>
+      </p:grpSp>
+      <p:grpSp>
+        <p:nvGrpSpPr>
+          <p:cNvPr id="42" name="Group 13"/>
+          <p:cNvGrpSpPr>
+            <a:grpSpLocks/>
+          </p:cNvGrpSpPr>
+          <p:nvPr/>
+        </p:nvGrpSpPr>
+        <p:grpSpPr bwMode="auto">
+          <a:xfrm>
+            <a:off x="2319759" y="5437212"/>
+            <a:ext cx="3908425" cy="800100"/>
+            <a:chOff x="515" y="3322"/>
+            <a:chExt cx="2462" cy="504"/>
+          </a:xfrm>
+          <a:solidFill>
+            <a:schemeClr val="bg2"/>
+          </a:solidFill>
+        </p:grpSpPr>
+        <p:sp>
+          <p:nvSpPr>
+            <p:cNvPr id="43" name="Rectangle 14"/>
+            <p:cNvSpPr>
+              <a:spLocks noChangeArrowheads="1"/>
+            </p:cNvSpPr>
+            <p:nvPr/>
+          </p:nvSpPr>
+          <p:spPr bwMode="auto">
+            <a:xfrm>
+              <a:off x="515" y="3322"/>
+              <a:ext cx="817" cy="170"/>
+            </a:xfrm>
+            <a:prstGeom prst="rect">
+              <a:avLst/>
+            </a:prstGeom>
+            <a:grpFill/>
+            <a:ln w="9525">
+              <a:solidFill>
+                <a:schemeClr val="tx2"/>
+              </a:solidFill>
+              <a:miter lim="800000"/>
+              <a:headEnd/>
+              <a:tailEnd/>
+            </a:ln>
+            <a:effectLst/>
+            <a:extLst>
+              <a:ext uri="{AF507438-7753-43e0-B8FC-AC1667EBCBE1}">
+                <a14:hiddenEffects xmlns:a14="http://schemas.microsoft.com/office/drawing/2010/main">
+                  <a:effectLst>
+                    <a:outerShdw blurRad="63500" dist="38099" dir="2700000" algn="ctr" rotWithShape="0">
+                      <a:schemeClr val="bg2">
+                        <a:alpha val="74998"/>
+                      </a:schemeClr>
+                    </a:outerShdw>
+                  </a:effectLst>
+                </a14:hiddenEffects>
+              </a:ext>
+            </a:extLst>
+          </p:spPr>
+          <p:txBody>
+            <a:bodyPr lIns="0" tIns="0" rIns="0" bIns="0" anchor="ctr"/>
+            <a:lstStyle/>
+            <a:p>
+              <a:pPr eaLnBrk="1" hangingPunct="1">
+                <a:lnSpc>
+                  <a:spcPct val="95000"/>
+                </a:lnSpc>
+                <a:spcBef>
+                  <a:spcPct val="50000"/>
+                </a:spcBef>
+              </a:pPr>
+              <a:r>
+                <a:rPr lang="en-GB" sz="1800" dirty="0"/>
+                <a:t>Event1</a:t>
+              </a:r>
+            </a:p>
+          </p:txBody>
+        </p:sp>
+        <p:sp>
+          <p:nvSpPr>
+            <p:cNvPr id="44" name="Rectangle 15"/>
+            <p:cNvSpPr>
+              <a:spLocks noChangeArrowheads="1"/>
+            </p:cNvSpPr>
+            <p:nvPr/>
+          </p:nvSpPr>
+          <p:spPr bwMode="auto">
+            <a:xfrm>
+              <a:off x="1338" y="3322"/>
+              <a:ext cx="817" cy="170"/>
+            </a:xfrm>
+            <a:prstGeom prst="rect">
+              <a:avLst/>
+            </a:prstGeom>
+            <a:grpFill/>
+            <a:ln w="38100">
+              <a:solidFill>
+                <a:srgbClr val="FF0000"/>
+              </a:solidFill>
+              <a:miter lim="800000"/>
+              <a:headEnd/>
+              <a:tailEnd/>
+            </a:ln>
+            <a:effectLst/>
+            <a:extLst>
+              <a:ext uri="{AF507438-7753-43e0-B8FC-AC1667EBCBE1}">
+                <a14:hiddenEffects xmlns:a14="http://schemas.microsoft.com/office/drawing/2010/main">
+                  <a:effectLst>
+                    <a:outerShdw blurRad="63500" dist="38099" dir="2700000" algn="ctr" rotWithShape="0">
+                      <a:schemeClr val="bg2">
+                        <a:alpha val="74998"/>
+                      </a:schemeClr>
+                    </a:outerShdw>
+                  </a:effectLst>
+                </a14:hiddenEffects>
+              </a:ext>
+            </a:extLst>
+          </p:spPr>
+          <p:txBody>
+            <a:bodyPr lIns="0" tIns="0" rIns="0" bIns="0" anchor="ctr"/>
+            <a:lstStyle/>
+            <a:p>
+              <a:pPr eaLnBrk="1" hangingPunct="1">
+                <a:lnSpc>
+                  <a:spcPct val="95000"/>
+                </a:lnSpc>
+                <a:spcBef>
+                  <a:spcPct val="50000"/>
+                </a:spcBef>
+              </a:pPr>
+              <a:r>
+                <a:rPr lang="en-GB" sz="1800">
+                  <a:solidFill>
+                    <a:srgbClr val="FF0000"/>
+                  </a:solidFill>
+                </a:rPr>
+                <a:t>Event2</a:t>
+              </a:r>
+            </a:p>
+          </p:txBody>
+        </p:sp>
+        <p:sp>
+          <p:nvSpPr>
+            <p:cNvPr id="45" name="Rectangle 16"/>
+            <p:cNvSpPr>
+              <a:spLocks noChangeArrowheads="1"/>
+            </p:cNvSpPr>
+            <p:nvPr/>
+          </p:nvSpPr>
+          <p:spPr bwMode="auto">
+            <a:xfrm>
+              <a:off x="2160" y="3322"/>
+              <a:ext cx="817" cy="170"/>
+            </a:xfrm>
+            <a:prstGeom prst="rect">
+              <a:avLst/>
+            </a:prstGeom>
+            <a:grpFill/>
+            <a:ln w="9525">
+              <a:solidFill>
+                <a:schemeClr val="tx2"/>
+              </a:solidFill>
+              <a:miter lim="800000"/>
+              <a:headEnd/>
+              <a:tailEnd/>
+            </a:ln>
+            <a:effectLst/>
+            <a:extLst>
+              <a:ext uri="{AF507438-7753-43e0-B8FC-AC1667EBCBE1}">
+                <a14:hiddenEffects xmlns:a14="http://schemas.microsoft.com/office/drawing/2010/main">
+                  <a:effectLst>
+                    <a:outerShdw blurRad="63500" dist="38099" dir="2700000" algn="ctr" rotWithShape="0">
+                      <a:schemeClr val="bg2">
+                        <a:alpha val="74998"/>
+                      </a:schemeClr>
+                    </a:outerShdw>
+                  </a:effectLst>
+                </a14:hiddenEffects>
+              </a:ext>
+            </a:extLst>
+          </p:spPr>
+          <p:txBody>
+            <a:bodyPr lIns="0" tIns="0" rIns="0" bIns="0" anchor="ctr"/>
+            <a:lstStyle/>
+            <a:p>
+              <a:pPr eaLnBrk="1" hangingPunct="1">
+                <a:lnSpc>
+                  <a:spcPct val="95000"/>
+                </a:lnSpc>
+                <a:spcBef>
+                  <a:spcPct val="50000"/>
+                </a:spcBef>
+              </a:pPr>
+              <a:r>
+                <a:rPr lang="en-GB" sz="1800"/>
+                <a:t>Event3</a:t>
+              </a:r>
+            </a:p>
+          </p:txBody>
+        </p:sp>
+        <p:sp>
+          <p:nvSpPr>
+            <p:cNvPr id="46" name="Rectangle 17"/>
+            <p:cNvSpPr>
+              <a:spLocks noChangeArrowheads="1"/>
+            </p:cNvSpPr>
+            <p:nvPr/>
+          </p:nvSpPr>
+          <p:spPr bwMode="auto">
+            <a:xfrm>
+              <a:off x="515" y="3492"/>
+              <a:ext cx="817" cy="334"/>
+            </a:xfrm>
+            <a:prstGeom prst="rect">
+              <a:avLst/>
+            </a:prstGeom>
+            <a:grpFill/>
+            <a:ln w="9525">
+              <a:solidFill>
+                <a:schemeClr val="tx2"/>
+              </a:solidFill>
+              <a:miter lim="800000"/>
+              <a:headEnd/>
+              <a:tailEnd/>
+            </a:ln>
+            <a:effectLst/>
+            <a:extLst>
+              <a:ext uri="{AF507438-7753-43e0-B8FC-AC1667EBCBE1}">
+                <a14:hiddenEffects xmlns:a14="http://schemas.microsoft.com/office/drawing/2010/main">
+                  <a:effectLst>
+                    <a:outerShdw blurRad="63500" dist="38099" dir="2700000" algn="ctr" rotWithShape="0">
+                      <a:schemeClr val="bg2">
+                        <a:alpha val="74998"/>
+                      </a:schemeClr>
+                    </a:outerShdw>
+                  </a:effectLst>
+                </a14:hiddenEffects>
+              </a:ext>
+            </a:extLst>
+          </p:spPr>
+          <p:txBody>
+            <a:bodyPr lIns="0" tIns="0" rIns="0" bIns="0" anchor="ctr"/>
+            <a:lstStyle/>
+            <a:p>
+              <a:pPr eaLnBrk="1" hangingPunct="1">
+                <a:lnSpc>
+                  <a:spcPct val="95000"/>
+                </a:lnSpc>
+                <a:spcBef>
+                  <a:spcPct val="50000"/>
+                </a:spcBef>
+              </a:pPr>
+              <a:r>
+                <a:rPr lang="en-GB" sz="1800"/>
+                <a:t>Not detected</a:t>
+              </a:r>
+            </a:p>
+          </p:txBody>
+        </p:sp>
+        <p:sp>
+          <p:nvSpPr>
+            <p:cNvPr id="47" name="Rectangle 18"/>
+            <p:cNvSpPr>
+              <a:spLocks noChangeArrowheads="1"/>
+            </p:cNvSpPr>
+            <p:nvPr/>
+          </p:nvSpPr>
+          <p:spPr bwMode="auto">
+            <a:xfrm>
+              <a:off x="1338" y="3492"/>
+              <a:ext cx="817" cy="334"/>
+            </a:xfrm>
+            <a:prstGeom prst="rect">
+              <a:avLst/>
+            </a:prstGeom>
+            <a:grpFill/>
+            <a:ln w="38100">
+              <a:solidFill>
+                <a:srgbClr val="FF0000"/>
+              </a:solidFill>
+              <a:miter lim="800000"/>
+              <a:headEnd/>
+              <a:tailEnd/>
+            </a:ln>
+            <a:effectLst/>
+            <a:extLst>
+              <a:ext uri="{AF507438-7753-43e0-B8FC-AC1667EBCBE1}">
+                <a14:hiddenEffects xmlns:a14="http://schemas.microsoft.com/office/drawing/2010/main">
+                  <a:effectLst>
+                    <a:outerShdw blurRad="63500" dist="38099" dir="2700000" algn="ctr" rotWithShape="0">
+                      <a:schemeClr val="bg2">
+                        <a:alpha val="74998"/>
+                      </a:schemeClr>
+                    </a:outerShdw>
+                  </a:effectLst>
+                </a14:hiddenEffects>
+              </a:ext>
+            </a:extLst>
+          </p:spPr>
+          <p:txBody>
+            <a:bodyPr lIns="0" tIns="0" rIns="0" bIns="0" anchor="ctr"/>
+            <a:lstStyle/>
+            <a:p>
+              <a:pPr eaLnBrk="1" hangingPunct="1">
+                <a:lnSpc>
+                  <a:spcPct val="95000"/>
+                </a:lnSpc>
+                <a:spcBef>
+                  <a:spcPct val="50000"/>
+                </a:spcBef>
+              </a:pPr>
+              <a:r>
+                <a:rPr lang="en-GB" sz="1800">
+                  <a:solidFill>
+                    <a:srgbClr val="FF0000"/>
+                  </a:solidFill>
+                </a:rPr>
+                <a:t>Not detected</a:t>
+              </a:r>
+            </a:p>
+          </p:txBody>
+        </p:sp>
+        <p:sp>
+          <p:nvSpPr>
+            <p:cNvPr id="48" name="Rectangle 19"/>
+            <p:cNvSpPr>
+              <a:spLocks noChangeArrowheads="1"/>
+            </p:cNvSpPr>
+            <p:nvPr/>
+          </p:nvSpPr>
+          <p:spPr bwMode="auto">
+            <a:xfrm>
+              <a:off x="2160" y="3492"/>
+              <a:ext cx="817" cy="334"/>
+            </a:xfrm>
+            <a:prstGeom prst="rect">
+              <a:avLst/>
+            </a:prstGeom>
+            <a:grpFill/>
+            <a:ln w="9525">
+              <a:solidFill>
+                <a:schemeClr val="tx2"/>
+              </a:solidFill>
+              <a:miter lim="800000"/>
+              <a:headEnd/>
+              <a:tailEnd/>
+            </a:ln>
+            <a:effectLst/>
+            <a:extLst>
+              <a:ext uri="{AF507438-7753-43e0-B8FC-AC1667EBCBE1}">
+                <a14:hiddenEffects xmlns:a14="http://schemas.microsoft.com/office/drawing/2010/main">
+                  <a:effectLst>
+                    <a:outerShdw blurRad="63500" dist="38099" dir="2700000" algn="ctr" rotWithShape="0">
+                      <a:schemeClr val="bg2">
+                        <a:alpha val="74998"/>
+                      </a:schemeClr>
+                    </a:outerShdw>
+                  </a:effectLst>
+                </a14:hiddenEffects>
+              </a:ext>
+            </a:extLst>
+          </p:spPr>
+          <p:txBody>
+            <a:bodyPr lIns="0" tIns="0" rIns="0" bIns="0" anchor="ctr"/>
+            <a:lstStyle/>
+            <a:p>
+              <a:pPr eaLnBrk="1" hangingPunct="1">
+                <a:lnSpc>
+                  <a:spcPct val="95000"/>
+                </a:lnSpc>
+                <a:spcBef>
+                  <a:spcPct val="50000"/>
+                </a:spcBef>
+              </a:pPr>
+              <a:r>
+                <a:rPr lang="en-GB" sz="1800"/>
+                <a:t>Detected</a:t>
+              </a:r>
+            </a:p>
+          </p:txBody>
+        </p:sp>
+      </p:grpSp>
+      <p:grpSp>
+        <p:nvGrpSpPr>
+          <p:cNvPr id="49" name="Group 20"/>
+          <p:cNvGrpSpPr>
+            <a:grpSpLocks/>
+          </p:cNvGrpSpPr>
+          <p:nvPr/>
+        </p:nvGrpSpPr>
+        <p:grpSpPr bwMode="auto">
+          <a:xfrm>
+            <a:off x="2319759" y="5445224"/>
+            <a:ext cx="3908425" cy="800100"/>
+            <a:chOff x="515" y="3322"/>
+            <a:chExt cx="2462" cy="504"/>
+          </a:xfrm>
+          <a:solidFill>
+            <a:schemeClr val="bg2"/>
+          </a:solidFill>
+        </p:grpSpPr>
+        <p:sp>
+          <p:nvSpPr>
+            <p:cNvPr id="50" name="Rectangle 21"/>
+            <p:cNvSpPr>
+              <a:spLocks noChangeArrowheads="1"/>
+            </p:cNvSpPr>
+            <p:nvPr/>
+          </p:nvSpPr>
+          <p:spPr bwMode="auto">
+            <a:xfrm>
+              <a:off x="515" y="3322"/>
+              <a:ext cx="817" cy="170"/>
+            </a:xfrm>
+            <a:prstGeom prst="rect">
+              <a:avLst/>
+            </a:prstGeom>
+            <a:grpFill/>
+            <a:ln w="38100">
+              <a:solidFill>
+                <a:srgbClr val="FF0000"/>
+              </a:solidFill>
+              <a:miter lim="800000"/>
+              <a:headEnd/>
+              <a:tailEnd/>
+            </a:ln>
+            <a:effectLst/>
+            <a:extLst>
+              <a:ext uri="{AF507438-7753-43e0-B8FC-AC1667EBCBE1}">
+                <a14:hiddenEffects xmlns:a14="http://schemas.microsoft.com/office/drawing/2010/main">
+                  <a:effectLst>
+                    <a:outerShdw blurRad="63500" dist="38099" dir="2700000" algn="ctr" rotWithShape="0">
+                      <a:schemeClr val="bg2">
+                        <a:alpha val="74998"/>
+                      </a:schemeClr>
+                    </a:outerShdw>
+                  </a:effectLst>
+                </a14:hiddenEffects>
+              </a:ext>
+            </a:extLst>
+          </p:spPr>
+          <p:txBody>
+            <a:bodyPr lIns="0" tIns="0" rIns="0" bIns="0" anchor="ctr"/>
+            <a:lstStyle/>
+            <a:p>
+              <a:pPr eaLnBrk="1" hangingPunct="1">
+                <a:lnSpc>
+                  <a:spcPct val="95000"/>
+                </a:lnSpc>
+                <a:spcBef>
+                  <a:spcPct val="50000"/>
+                </a:spcBef>
+              </a:pPr>
+              <a:r>
+                <a:rPr lang="en-GB" sz="1800">
+                  <a:solidFill>
+                    <a:srgbClr val="33CC33"/>
+                  </a:solidFill>
+                </a:rPr>
+                <a:t>Event1</a:t>
+              </a:r>
+            </a:p>
+          </p:txBody>
+        </p:sp>
+        <p:sp>
+          <p:nvSpPr>
+            <p:cNvPr id="51" name="Rectangle 22"/>
+            <p:cNvSpPr>
+              <a:spLocks noChangeArrowheads="1"/>
+            </p:cNvSpPr>
+            <p:nvPr/>
+          </p:nvSpPr>
+          <p:spPr bwMode="auto">
+            <a:xfrm>
+              <a:off x="1338" y="3322"/>
+              <a:ext cx="817" cy="170"/>
+            </a:xfrm>
+            <a:prstGeom prst="rect">
+              <a:avLst/>
+            </a:prstGeom>
+            <a:grpFill/>
+            <a:ln w="9525">
+              <a:solidFill>
+                <a:schemeClr val="tx2"/>
+              </a:solidFill>
+              <a:miter lim="800000"/>
+              <a:headEnd/>
+              <a:tailEnd/>
+            </a:ln>
+            <a:effectLst/>
+            <a:extLst>
+              <a:ext uri="{AF507438-7753-43e0-B8FC-AC1667EBCBE1}">
+                <a14:hiddenEffects xmlns:a14="http://schemas.microsoft.com/office/drawing/2010/main">
+                  <a:effectLst>
+                    <a:outerShdw blurRad="63500" dist="38099" dir="2700000" algn="ctr" rotWithShape="0">
+                      <a:schemeClr val="bg2">
+                        <a:alpha val="74998"/>
+                      </a:schemeClr>
+                    </a:outerShdw>
+                  </a:effectLst>
+                </a14:hiddenEffects>
+              </a:ext>
+            </a:extLst>
+          </p:spPr>
+          <p:txBody>
+            <a:bodyPr lIns="0" tIns="0" rIns="0" bIns="0" anchor="ctr"/>
+            <a:lstStyle/>
+            <a:p>
+              <a:pPr eaLnBrk="1" hangingPunct="1">
+                <a:lnSpc>
+                  <a:spcPct val="95000"/>
+                </a:lnSpc>
+                <a:spcBef>
+                  <a:spcPct val="50000"/>
+                </a:spcBef>
+              </a:pPr>
+              <a:r>
+                <a:rPr lang="en-GB" sz="1800" dirty="0">
+                  <a:solidFill>
+                    <a:srgbClr val="FF0000"/>
+                  </a:solidFill>
+                </a:rPr>
+                <a:t>Event2</a:t>
+              </a:r>
+            </a:p>
+          </p:txBody>
+        </p:sp>
+        <p:sp>
+          <p:nvSpPr>
+            <p:cNvPr id="52" name="Rectangle 23"/>
+            <p:cNvSpPr>
+              <a:spLocks noChangeArrowheads="1"/>
+            </p:cNvSpPr>
+            <p:nvPr/>
+          </p:nvSpPr>
+          <p:spPr bwMode="auto">
+            <a:xfrm>
+              <a:off x="2160" y="3322"/>
+              <a:ext cx="817" cy="170"/>
+            </a:xfrm>
+            <a:prstGeom prst="rect">
+              <a:avLst/>
+            </a:prstGeom>
+            <a:grpFill/>
+            <a:ln w="38100">
+              <a:solidFill>
+                <a:srgbClr val="FF0000"/>
+              </a:solidFill>
+              <a:miter lim="800000"/>
+              <a:headEnd/>
+              <a:tailEnd/>
+            </a:ln>
+            <a:effectLst/>
+            <a:extLst>
+              <a:ext uri="{AF507438-7753-43e0-B8FC-AC1667EBCBE1}">
+                <a14:hiddenEffects xmlns:a14="http://schemas.microsoft.com/office/drawing/2010/main">
+                  <a:effectLst>
+                    <a:outerShdw blurRad="63500" dist="38099" dir="2700000" algn="ctr" rotWithShape="0">
+                      <a:schemeClr val="bg2">
+                        <a:alpha val="74998"/>
+                      </a:schemeClr>
+                    </a:outerShdw>
+                  </a:effectLst>
+                </a14:hiddenEffects>
+              </a:ext>
+            </a:extLst>
+          </p:spPr>
+          <p:txBody>
+            <a:bodyPr lIns="0" tIns="0" rIns="0" bIns="0" anchor="ctr"/>
+            <a:lstStyle/>
+            <a:p>
+              <a:pPr eaLnBrk="1" hangingPunct="1">
+                <a:lnSpc>
+                  <a:spcPct val="95000"/>
+                </a:lnSpc>
+                <a:spcBef>
+                  <a:spcPct val="50000"/>
+                </a:spcBef>
+              </a:pPr>
+              <a:r>
+                <a:rPr lang="en-GB" sz="1800" dirty="0">
+                  <a:solidFill>
+                    <a:srgbClr val="33CC33"/>
+                  </a:solidFill>
+                </a:rPr>
+                <a:t>Event3</a:t>
+              </a:r>
+            </a:p>
+          </p:txBody>
+        </p:sp>
+        <p:sp>
+          <p:nvSpPr>
+            <p:cNvPr id="53" name="Rectangle 24"/>
+            <p:cNvSpPr>
+              <a:spLocks noChangeArrowheads="1"/>
+            </p:cNvSpPr>
+            <p:nvPr/>
+          </p:nvSpPr>
+          <p:spPr bwMode="auto">
+            <a:xfrm>
+              <a:off x="515" y="3492"/>
+              <a:ext cx="817" cy="334"/>
+            </a:xfrm>
+            <a:prstGeom prst="rect">
+              <a:avLst/>
+            </a:prstGeom>
+            <a:grpFill/>
+            <a:ln w="9525">
+              <a:solidFill>
+                <a:schemeClr val="tx2"/>
+              </a:solidFill>
+              <a:miter lim="800000"/>
+              <a:headEnd/>
+              <a:tailEnd/>
+            </a:ln>
+            <a:effectLst/>
+            <a:extLst>
+              <a:ext uri="{AF507438-7753-43e0-B8FC-AC1667EBCBE1}">
+                <a14:hiddenEffects xmlns:a14="http://schemas.microsoft.com/office/drawing/2010/main">
+                  <a:effectLst>
+                    <a:outerShdw blurRad="63500" dist="38099" dir="2700000" algn="ctr" rotWithShape="0">
+                      <a:schemeClr val="bg2">
+                        <a:alpha val="74998"/>
+                      </a:schemeClr>
+                    </a:outerShdw>
+                  </a:effectLst>
+                </a14:hiddenEffects>
+              </a:ext>
+            </a:extLst>
+          </p:spPr>
+          <p:txBody>
+            <a:bodyPr lIns="0" tIns="0" rIns="0" bIns="0" anchor="ctr"/>
+            <a:lstStyle/>
+            <a:p>
+              <a:pPr eaLnBrk="1" hangingPunct="1">
+                <a:lnSpc>
+                  <a:spcPct val="95000"/>
+                </a:lnSpc>
+                <a:spcBef>
+                  <a:spcPct val="50000"/>
+                </a:spcBef>
+              </a:pPr>
+              <a:r>
+                <a:rPr lang="en-GB" sz="1800"/>
+                <a:t>Not detected</a:t>
+              </a:r>
+            </a:p>
+          </p:txBody>
+        </p:sp>
+        <p:sp>
+          <p:nvSpPr>
+            <p:cNvPr id="54" name="Rectangle 25"/>
+            <p:cNvSpPr>
+              <a:spLocks noChangeArrowheads="1"/>
+            </p:cNvSpPr>
+            <p:nvPr/>
+          </p:nvSpPr>
+          <p:spPr bwMode="auto">
+            <a:xfrm>
+              <a:off x="1338" y="3492"/>
+              <a:ext cx="817" cy="334"/>
+            </a:xfrm>
+            <a:prstGeom prst="rect">
+              <a:avLst/>
+            </a:prstGeom>
+            <a:grpFill/>
+            <a:ln w="9525">
+              <a:solidFill>
+                <a:schemeClr val="tx2"/>
+              </a:solidFill>
+              <a:miter lim="800000"/>
+              <a:headEnd/>
+              <a:tailEnd/>
+            </a:ln>
+            <a:effectLst/>
+            <a:extLst>
+              <a:ext uri="{AF507438-7753-43e0-B8FC-AC1667EBCBE1}">
+                <a14:hiddenEffects xmlns:a14="http://schemas.microsoft.com/office/drawing/2010/main">
+                  <a:effectLst>
+                    <a:outerShdw blurRad="63500" dist="38099" dir="2700000" algn="ctr" rotWithShape="0">
+                      <a:schemeClr val="bg2">
+                        <a:alpha val="74998"/>
+                      </a:schemeClr>
+                    </a:outerShdw>
+                  </a:effectLst>
+                </a14:hiddenEffects>
+              </a:ext>
+            </a:extLst>
+          </p:spPr>
+          <p:txBody>
+            <a:bodyPr lIns="0" tIns="0" rIns="0" bIns="0" anchor="ctr"/>
+            <a:lstStyle/>
+            <a:p>
+              <a:pPr eaLnBrk="1" hangingPunct="1">
+                <a:lnSpc>
+                  <a:spcPct val="95000"/>
+                </a:lnSpc>
+                <a:spcBef>
+                  <a:spcPct val="50000"/>
+                </a:spcBef>
+              </a:pPr>
+              <a:r>
+                <a:rPr lang="en-GB" sz="1800">
+                  <a:solidFill>
+                    <a:srgbClr val="FF0000"/>
+                  </a:solidFill>
+                </a:rPr>
+                <a:t>Not detected</a:t>
+              </a:r>
+            </a:p>
+          </p:txBody>
+        </p:sp>
+        <p:sp>
+          <p:nvSpPr>
+            <p:cNvPr id="55" name="Rectangle 26"/>
+            <p:cNvSpPr>
+              <a:spLocks noChangeArrowheads="1"/>
+            </p:cNvSpPr>
+            <p:nvPr/>
+          </p:nvSpPr>
+          <p:spPr bwMode="auto">
+            <a:xfrm>
+              <a:off x="2160" y="3492"/>
+              <a:ext cx="817" cy="334"/>
+            </a:xfrm>
+            <a:prstGeom prst="rect">
+              <a:avLst/>
+            </a:prstGeom>
+            <a:grpFill/>
+            <a:ln w="9525">
+              <a:solidFill>
+                <a:schemeClr val="tx2"/>
+              </a:solidFill>
+              <a:miter lim="800000"/>
+              <a:headEnd/>
+              <a:tailEnd/>
+            </a:ln>
+            <a:effectLst/>
+            <a:extLst>
+              <a:ext uri="{AF507438-7753-43e0-B8FC-AC1667EBCBE1}">
+                <a14:hiddenEffects xmlns:a14="http://schemas.microsoft.com/office/drawing/2010/main">
+                  <a:effectLst>
+                    <a:outerShdw blurRad="63500" dist="38099" dir="2700000" algn="ctr" rotWithShape="0">
+                      <a:schemeClr val="bg2">
+                        <a:alpha val="74998"/>
+                      </a:schemeClr>
+                    </a:outerShdw>
+                  </a:effectLst>
+                </a14:hiddenEffects>
+              </a:ext>
+            </a:extLst>
+          </p:spPr>
+          <p:txBody>
+            <a:bodyPr lIns="0" tIns="0" rIns="0" bIns="0" anchor="ctr"/>
+            <a:lstStyle/>
+            <a:p>
+              <a:pPr eaLnBrk="1" hangingPunct="1">
+                <a:lnSpc>
+                  <a:spcPct val="95000"/>
+                </a:lnSpc>
+                <a:spcBef>
+                  <a:spcPct val="50000"/>
+                </a:spcBef>
+              </a:pPr>
+              <a:r>
+                <a:rPr lang="en-GB" sz="1800"/>
+                <a:t>Detected</a:t>
+              </a:r>
+            </a:p>
+          </p:txBody>
+        </p:sp>
+      </p:grpSp>
+      <p:grpSp>
+        <p:nvGrpSpPr>
+          <p:cNvPr id="56" name="Group 27"/>
+          <p:cNvGrpSpPr>
+            <a:grpSpLocks/>
+          </p:cNvGrpSpPr>
+          <p:nvPr/>
+        </p:nvGrpSpPr>
+        <p:grpSpPr bwMode="auto">
+          <a:xfrm>
+            <a:off x="2319759" y="5445224"/>
+            <a:ext cx="3908425" cy="800100"/>
+            <a:chOff x="515" y="3322"/>
+            <a:chExt cx="2462" cy="504"/>
+          </a:xfrm>
+          <a:solidFill>
+            <a:schemeClr val="bg2"/>
+          </a:solidFill>
+        </p:grpSpPr>
+        <p:sp>
+          <p:nvSpPr>
+            <p:cNvPr id="57" name="Rectangle 28"/>
+            <p:cNvSpPr>
+              <a:spLocks noChangeArrowheads="1"/>
+            </p:cNvSpPr>
+            <p:nvPr/>
+          </p:nvSpPr>
+          <p:spPr bwMode="auto">
+            <a:xfrm>
+              <a:off x="515" y="3322"/>
+              <a:ext cx="817" cy="170"/>
+            </a:xfrm>
+            <a:prstGeom prst="rect">
+              <a:avLst/>
+            </a:prstGeom>
+            <a:grpFill/>
+            <a:ln w="38100">
+              <a:solidFill>
+                <a:srgbClr val="FF0000"/>
+              </a:solidFill>
+              <a:miter lim="800000"/>
+              <a:headEnd/>
+              <a:tailEnd/>
+            </a:ln>
+            <a:effectLst/>
+            <a:extLst>
+              <a:ext uri="{AF507438-7753-43e0-B8FC-AC1667EBCBE1}">
+                <a14:hiddenEffects xmlns:a14="http://schemas.microsoft.com/office/drawing/2010/main">
+                  <a:effectLst>
+                    <a:outerShdw blurRad="63500" dist="38099" dir="2700000" algn="ctr" rotWithShape="0">
+                      <a:schemeClr val="bg2">
+                        <a:alpha val="74998"/>
+                      </a:schemeClr>
+                    </a:outerShdw>
+                  </a:effectLst>
+                </a14:hiddenEffects>
+              </a:ext>
+            </a:extLst>
+          </p:spPr>
+          <p:txBody>
+            <a:bodyPr lIns="0" tIns="0" rIns="0" bIns="0" anchor="ctr"/>
+            <a:lstStyle/>
+            <a:p>
+              <a:pPr eaLnBrk="1" hangingPunct="1">
+                <a:lnSpc>
+                  <a:spcPct val="95000"/>
+                </a:lnSpc>
+                <a:spcBef>
+                  <a:spcPct val="50000"/>
+                </a:spcBef>
+              </a:pPr>
+              <a:r>
+                <a:rPr lang="en-GB" sz="1800" dirty="0">
+                  <a:solidFill>
+                    <a:srgbClr val="33CC33"/>
+                  </a:solidFill>
+                </a:rPr>
+                <a:t>Event1</a:t>
+              </a:r>
+            </a:p>
+          </p:txBody>
+        </p:sp>
+        <p:sp>
+          <p:nvSpPr>
+            <p:cNvPr id="58" name="Rectangle 29"/>
+            <p:cNvSpPr>
+              <a:spLocks noChangeArrowheads="1"/>
+            </p:cNvSpPr>
+            <p:nvPr/>
+          </p:nvSpPr>
+          <p:spPr bwMode="auto">
+            <a:xfrm>
+              <a:off x="1338" y="3322"/>
+              <a:ext cx="817" cy="170"/>
+            </a:xfrm>
+            <a:prstGeom prst="rect">
+              <a:avLst/>
+            </a:prstGeom>
+            <a:grpFill/>
+            <a:ln w="9525">
+              <a:solidFill>
+                <a:schemeClr val="tx2"/>
+              </a:solidFill>
+              <a:miter lim="800000"/>
+              <a:headEnd/>
+              <a:tailEnd/>
+            </a:ln>
+            <a:effectLst/>
+            <a:extLst>
+              <a:ext uri="{AF507438-7753-43e0-B8FC-AC1667EBCBE1}">
+                <a14:hiddenEffects xmlns:a14="http://schemas.microsoft.com/office/drawing/2010/main">
+                  <a:effectLst>
+                    <a:outerShdw blurRad="63500" dist="38099" dir="2700000" algn="ctr" rotWithShape="0">
+                      <a:schemeClr val="bg2">
+                        <a:alpha val="74998"/>
+                      </a:schemeClr>
+                    </a:outerShdw>
+                  </a:effectLst>
+                </a14:hiddenEffects>
+              </a:ext>
+            </a:extLst>
+          </p:spPr>
+          <p:txBody>
+            <a:bodyPr lIns="0" tIns="0" rIns="0" bIns="0" anchor="ctr"/>
+            <a:lstStyle/>
+            <a:p>
+              <a:pPr eaLnBrk="1" hangingPunct="1">
+                <a:lnSpc>
+                  <a:spcPct val="95000"/>
+                </a:lnSpc>
+                <a:spcBef>
+                  <a:spcPct val="50000"/>
+                </a:spcBef>
+              </a:pPr>
+              <a:r>
+                <a:rPr lang="en-GB" sz="1800" dirty="0">
+                  <a:solidFill>
+                    <a:srgbClr val="FF0000"/>
+                  </a:solidFill>
+                </a:rPr>
+                <a:t>Event2</a:t>
+              </a:r>
+            </a:p>
+          </p:txBody>
+        </p:sp>
+        <p:sp>
+          <p:nvSpPr>
+            <p:cNvPr id="59" name="Rectangle 30"/>
+            <p:cNvSpPr>
+              <a:spLocks noChangeArrowheads="1"/>
+            </p:cNvSpPr>
+            <p:nvPr/>
+          </p:nvSpPr>
+          <p:spPr bwMode="auto">
+            <a:xfrm>
+              <a:off x="2160" y="3322"/>
+              <a:ext cx="817" cy="170"/>
+            </a:xfrm>
+            <a:prstGeom prst="rect">
+              <a:avLst/>
+            </a:prstGeom>
+            <a:grpFill/>
+            <a:ln w="38100">
+              <a:solidFill>
+                <a:srgbClr val="FF0000"/>
+              </a:solidFill>
+              <a:miter lim="800000"/>
+              <a:headEnd/>
+              <a:tailEnd/>
+            </a:ln>
+            <a:effectLst/>
+            <a:extLst>
+              <a:ext uri="{AF507438-7753-43e0-B8FC-AC1667EBCBE1}">
+                <a14:hiddenEffects xmlns:a14="http://schemas.microsoft.com/office/drawing/2010/main">
+                  <a:effectLst>
+                    <a:outerShdw blurRad="63500" dist="38099" dir="2700000" algn="ctr" rotWithShape="0">
+                      <a:schemeClr val="bg2">
+                        <a:alpha val="74998"/>
+                      </a:schemeClr>
+                    </a:outerShdw>
+                  </a:effectLst>
+                </a14:hiddenEffects>
+              </a:ext>
+            </a:extLst>
+          </p:spPr>
+          <p:txBody>
+            <a:bodyPr lIns="0" tIns="0" rIns="0" bIns="0" anchor="ctr"/>
+            <a:lstStyle/>
+            <a:p>
+              <a:pPr eaLnBrk="1" hangingPunct="1">
+                <a:lnSpc>
+                  <a:spcPct val="95000"/>
+                </a:lnSpc>
+                <a:spcBef>
+                  <a:spcPct val="50000"/>
+                </a:spcBef>
+              </a:pPr>
+              <a:r>
+                <a:rPr lang="en-GB" sz="1800">
+                  <a:solidFill>
+                    <a:srgbClr val="33CC33"/>
+                  </a:solidFill>
+                </a:rPr>
+                <a:t>Event3</a:t>
+              </a:r>
+            </a:p>
+          </p:txBody>
+        </p:sp>
+        <p:sp>
+          <p:nvSpPr>
+            <p:cNvPr id="60" name="Rectangle 31"/>
+            <p:cNvSpPr>
+              <a:spLocks noChangeArrowheads="1"/>
+            </p:cNvSpPr>
+            <p:nvPr/>
+          </p:nvSpPr>
+          <p:spPr bwMode="auto">
+            <a:xfrm>
+              <a:off x="515" y="3492"/>
+              <a:ext cx="817" cy="334"/>
+            </a:xfrm>
+            <a:prstGeom prst="rect">
+              <a:avLst/>
+            </a:prstGeom>
+            <a:grpFill/>
+            <a:ln w="38100">
+              <a:solidFill>
+                <a:srgbClr val="FF0000"/>
+              </a:solidFill>
+              <a:miter lim="800000"/>
+              <a:headEnd/>
+              <a:tailEnd/>
+            </a:ln>
+            <a:effectLst/>
+            <a:extLst>
+              <a:ext uri="{AF507438-7753-43e0-B8FC-AC1667EBCBE1}">
+                <a14:hiddenEffects xmlns:a14="http://schemas.microsoft.com/office/drawing/2010/main">
+                  <a:effectLst>
+                    <a:outerShdw blurRad="63500" dist="38099" dir="2700000" algn="ctr" rotWithShape="0">
+                      <a:schemeClr val="bg2">
+                        <a:alpha val="74998"/>
+                      </a:schemeClr>
+                    </a:outerShdw>
+                  </a:effectLst>
+                </a14:hiddenEffects>
+              </a:ext>
+            </a:extLst>
+          </p:spPr>
+          <p:txBody>
+            <a:bodyPr lIns="0" tIns="0" rIns="0" bIns="0" anchor="ctr"/>
+            <a:lstStyle/>
+            <a:p>
+              <a:pPr eaLnBrk="1" hangingPunct="1">
+                <a:lnSpc>
+                  <a:spcPct val="95000"/>
+                </a:lnSpc>
+                <a:spcBef>
+                  <a:spcPct val="50000"/>
+                </a:spcBef>
+              </a:pPr>
+              <a:r>
+                <a:rPr lang="en-GB" sz="1800">
+                  <a:solidFill>
+                    <a:srgbClr val="33CC33"/>
+                  </a:solidFill>
+                </a:rPr>
+                <a:t>Not detected</a:t>
+              </a:r>
+            </a:p>
+          </p:txBody>
+        </p:sp>
+        <p:sp>
+          <p:nvSpPr>
+            <p:cNvPr id="61" name="Rectangle 32"/>
+            <p:cNvSpPr>
+              <a:spLocks noChangeArrowheads="1"/>
+            </p:cNvSpPr>
+            <p:nvPr/>
+          </p:nvSpPr>
+          <p:spPr bwMode="auto">
+            <a:xfrm>
+              <a:off x="1338" y="3492"/>
+              <a:ext cx="817" cy="334"/>
+            </a:xfrm>
+            <a:prstGeom prst="rect">
+              <a:avLst/>
+            </a:prstGeom>
+            <a:grpFill/>
+            <a:ln w="9525">
+              <a:solidFill>
+                <a:schemeClr val="tx2"/>
+              </a:solidFill>
+              <a:miter lim="800000"/>
+              <a:headEnd/>
+              <a:tailEnd/>
+            </a:ln>
+            <a:effectLst/>
+            <a:extLst>
+              <a:ext uri="{AF507438-7753-43e0-B8FC-AC1667EBCBE1}">
+                <a14:hiddenEffects xmlns:a14="http://schemas.microsoft.com/office/drawing/2010/main">
+                  <a:effectLst>
+                    <a:outerShdw blurRad="63500" dist="38099" dir="2700000" algn="ctr" rotWithShape="0">
+                      <a:schemeClr val="bg2">
+                        <a:alpha val="74998"/>
+                      </a:schemeClr>
+                    </a:outerShdw>
+                  </a:effectLst>
+                </a14:hiddenEffects>
+              </a:ext>
+            </a:extLst>
+          </p:spPr>
+          <p:txBody>
+            <a:bodyPr lIns="0" tIns="0" rIns="0" bIns="0" anchor="ctr"/>
+            <a:lstStyle/>
+            <a:p>
+              <a:pPr eaLnBrk="1" hangingPunct="1">
+                <a:lnSpc>
+                  <a:spcPct val="95000"/>
+                </a:lnSpc>
+                <a:spcBef>
+                  <a:spcPct val="50000"/>
+                </a:spcBef>
+              </a:pPr>
+              <a:r>
+                <a:rPr lang="en-GB" sz="1800">
+                  <a:solidFill>
+                    <a:srgbClr val="FF0000"/>
+                  </a:solidFill>
+                </a:rPr>
+                <a:t>Not detected</a:t>
+              </a:r>
+            </a:p>
+          </p:txBody>
+        </p:sp>
+        <p:sp>
+          <p:nvSpPr>
+            <p:cNvPr id="62" name="Rectangle 33"/>
+            <p:cNvSpPr>
+              <a:spLocks noChangeArrowheads="1"/>
+            </p:cNvSpPr>
+            <p:nvPr/>
+          </p:nvSpPr>
+          <p:spPr bwMode="auto">
+            <a:xfrm>
+              <a:off x="2160" y="3492"/>
+              <a:ext cx="817" cy="334"/>
+            </a:xfrm>
+            <a:prstGeom prst="rect">
+              <a:avLst/>
+            </a:prstGeom>
+            <a:grpFill/>
+            <a:ln w="38100">
+              <a:solidFill>
+                <a:srgbClr val="FF0000"/>
+              </a:solidFill>
+              <a:miter lim="800000"/>
+              <a:headEnd/>
+              <a:tailEnd/>
+            </a:ln>
+            <a:effectLst/>
+            <a:extLst>
+              <a:ext uri="{AF507438-7753-43e0-B8FC-AC1667EBCBE1}">
+                <a14:hiddenEffects xmlns:a14="http://schemas.microsoft.com/office/drawing/2010/main">
+                  <a:effectLst>
+                    <a:outerShdw blurRad="63500" dist="38099" dir="2700000" algn="ctr" rotWithShape="0">
+                      <a:schemeClr val="bg2">
+                        <a:alpha val="74998"/>
+                      </a:schemeClr>
+                    </a:outerShdw>
+                  </a:effectLst>
+                </a14:hiddenEffects>
+              </a:ext>
+            </a:extLst>
+          </p:spPr>
+          <p:txBody>
+            <a:bodyPr lIns="0" tIns="0" rIns="0" bIns="0" anchor="ctr"/>
+            <a:lstStyle/>
+            <a:p>
+              <a:pPr eaLnBrk="1" hangingPunct="1">
+                <a:lnSpc>
+                  <a:spcPct val="95000"/>
+                </a:lnSpc>
+                <a:spcBef>
+                  <a:spcPct val="50000"/>
+                </a:spcBef>
+              </a:pPr>
+              <a:r>
+                <a:rPr lang="en-GB" sz="1800">
+                  <a:solidFill>
+                    <a:srgbClr val="33CC33"/>
+                  </a:solidFill>
+                </a:rPr>
+                <a:t>Detected</a:t>
+              </a:r>
+            </a:p>
+          </p:txBody>
+        </p:sp>
+      </p:grpSp>
     </p:spTree>
     <p:extLst>
       <p:ext uri="{BB962C8B-B14F-4D97-AF65-F5344CB8AC3E}">
@@ -13489,26 +14602,35 @@
                                   </p:childTnLst>
                                 </p:cTn>
                               </p:par>
-                            </p:childTnLst>
-                          </p:cTn>
-                        </p:par>
-                      </p:childTnLst>
-                    </p:cTn>
-                  </p:par>
-                  <p:par>
-                    <p:cTn id="11" fill="hold">
-                      <p:stCondLst>
-                        <p:cond delay="indefinite"/>
-                      </p:stCondLst>
-                      <p:childTnLst>
-                        <p:par>
-                          <p:cTn id="12" fill="hold">
-                            <p:stCondLst>
-                              <p:cond delay="0"/>
-                            </p:stCondLst>
-                            <p:childTnLst>
                               <p:par>
-                                <p:cTn id="13" presetID="1" presetClass="entr" presetSubtype="0" fill="hold" nodeType="clickEffect">
+                                <p:cTn id="11" presetID="1" presetClass="exit" presetSubtype="0" fill="hold" nodeType="withEffect">
+                                  <p:stCondLst>
+                                    <p:cond delay="0"/>
+                                  </p:stCondLst>
+                                  <p:childTnLst>
+                                    <p:set>
+                                      <p:cBhvr>
+                                        <p:cTn id="12" dur="1" fill="hold">
+                                          <p:stCondLst>
+                                            <p:cond delay="0"/>
+                                          </p:stCondLst>
+                                        </p:cTn>
+                                        <p:tgtEl>
+                                          <p:spTgt spid="35"/>
+                                        </p:tgtEl>
+                                        <p:attrNameLst>
+                                          <p:attrName>style.visibility</p:attrName>
+                                        </p:attrNameLst>
+                                      </p:cBhvr>
+                                      <p:to>
+                                        <p:strVal val="hidden"/>
+                                      </p:to>
+                                    </p:set>
+                                  </p:childTnLst>
+                                </p:cTn>
+                              </p:par>
+                              <p:par>
+                                <p:cTn id="13" presetID="1" presetClass="entr" presetSubtype="0" fill="hold" nodeType="withEffect">
                                   <p:stCondLst>
                                     <p:cond delay="0"/>
                                   </p:stCondLst>
@@ -13521,7 +14643,7 @@
                                           </p:stCondLst>
                                         </p:cTn>
                                         <p:tgtEl>
-                                          <p:spTgt spid="32"/>
+                                          <p:spTgt spid="42"/>
                                         </p:tgtEl>
                                         <p:attrNameLst>
                                           <p:attrName>style.visibility</p:attrName>
@@ -13553,7 +14675,7 @@
                             </p:stCondLst>
                             <p:childTnLst>
                               <p:par>
-                                <p:cTn id="17" presetID="1" presetClass="entr" presetSubtype="0" fill="hold" grpId="0" nodeType="clickEffect">
+                                <p:cTn id="17" presetID="1" presetClass="entr" presetSubtype="0" fill="hold" nodeType="clickEffect">
                                   <p:stCondLst>
                                     <p:cond delay="0"/>
                                   </p:stCondLst>
@@ -13561,6 +14683,105 @@
                                     <p:set>
                                       <p:cBhvr>
                                         <p:cTn id="18" dur="1" fill="hold">
+                                          <p:stCondLst>
+                                            <p:cond delay="0"/>
+                                          </p:stCondLst>
+                                        </p:cTn>
+                                        <p:tgtEl>
+                                          <p:spTgt spid="32"/>
+                                        </p:tgtEl>
+                                        <p:attrNameLst>
+                                          <p:attrName>style.visibility</p:attrName>
+                                        </p:attrNameLst>
+                                      </p:cBhvr>
+                                      <p:to>
+                                        <p:strVal val="visible"/>
+                                      </p:to>
+                                    </p:set>
+                                  </p:childTnLst>
+                                </p:cTn>
+                              </p:par>
+                              <p:par>
+                                <p:cTn id="19" presetID="1" presetClass="exit" presetSubtype="0" fill="hold" nodeType="withEffect">
+                                  <p:stCondLst>
+                                    <p:cond delay="0"/>
+                                  </p:stCondLst>
+                                  <p:childTnLst>
+                                    <p:set>
+                                      <p:cBhvr>
+                                        <p:cTn id="20" dur="1" fill="hold">
+                                          <p:stCondLst>
+                                            <p:cond delay="0"/>
+                                          </p:stCondLst>
+                                        </p:cTn>
+                                        <p:tgtEl>
+                                          <p:spTgt spid="42"/>
+                                        </p:tgtEl>
+                                        <p:attrNameLst>
+                                          <p:attrName>style.visibility</p:attrName>
+                                        </p:attrNameLst>
+                                      </p:cBhvr>
+                                      <p:to>
+                                        <p:strVal val="hidden"/>
+                                      </p:to>
+                                    </p:set>
+                                  </p:childTnLst>
+                                </p:cTn>
+                              </p:par>
+                              <p:par>
+                                <p:cTn id="21" presetID="1" presetClass="entr" presetSubtype="0" fill="hold" nodeType="withEffect">
+                                  <p:stCondLst>
+                                    <p:cond delay="0"/>
+                                  </p:stCondLst>
+                                  <p:childTnLst>
+                                    <p:set>
+                                      <p:cBhvr>
+                                        <p:cTn id="22" dur="1" fill="hold">
+                                          <p:stCondLst>
+                                            <p:cond delay="0"/>
+                                          </p:stCondLst>
+                                        </p:cTn>
+                                        <p:tgtEl>
+                                          <p:spTgt spid="49"/>
+                                        </p:tgtEl>
+                                        <p:attrNameLst>
+                                          <p:attrName>style.visibility</p:attrName>
+                                        </p:attrNameLst>
+                                      </p:cBhvr>
+                                      <p:to>
+                                        <p:strVal val="visible"/>
+                                      </p:to>
+                                    </p:set>
+                                  </p:childTnLst>
+                                </p:cTn>
+                              </p:par>
+                            </p:childTnLst>
+                          </p:cTn>
+                        </p:par>
+                      </p:childTnLst>
+                    </p:cTn>
+                  </p:par>
+                  <p:par>
+                    <p:cTn id="23" fill="hold">
+                      <p:stCondLst>
+                        <p:cond delay="indefinite"/>
+                      </p:stCondLst>
+                      <p:childTnLst>
+                        <p:par>
+                          <p:cTn id="24" fill="hold">
+                            <p:stCondLst>
+                              <p:cond delay="0"/>
+                            </p:stCondLst>
+                            <p:childTnLst>
+                              <p:par>
+                                <p:cTn id="25" presetID="1" presetClass="entr" presetSubtype="0" fill="hold" grpId="0" nodeType="clickEffect">
+                                  <p:stCondLst>
+                                    <p:cond delay="0"/>
+                                  </p:stCondLst>
+                                  <p:childTnLst>
+                                    <p:set>
+                                      <p:cBhvr>
+                                        <p:cTn id="26" dur="1" fill="hold">
                                           <p:stCondLst>
                                             <p:cond delay="0"/>
                                           </p:stCondLst>
@@ -13580,20 +14801,47 @@
                                 </p:cTn>
                               </p:par>
                               <p:par>
-                                <p:cTn id="19" presetID="1" presetClass="entr" presetSubtype="0" fill="hold" nodeType="withEffect">
+                                <p:cTn id="27" presetID="1" presetClass="exit" presetSubtype="0" fill="hold" nodeType="withEffect">
                                   <p:stCondLst>
                                     <p:cond delay="0"/>
                                   </p:stCondLst>
                                   <p:childTnLst>
                                     <p:set>
                                       <p:cBhvr>
-                                        <p:cTn id="20" dur="1" fill="hold">
+                                        <p:cTn id="28" dur="1" fill="hold">
                                           <p:stCondLst>
                                             <p:cond delay="0"/>
                                           </p:stCondLst>
                                         </p:cTn>
                                         <p:tgtEl>
-                                          <p:spTgt spid="16"/>
+                                          <p:spTgt spid="49"/>
+                                        </p:tgtEl>
+                                        <p:attrNameLst>
+                                          <p:attrName>style.visibility</p:attrName>
+                                        </p:attrNameLst>
+                                      </p:cBhvr>
+                                      <p:to>
+                                        <p:strVal val="hidden"/>
+                                      </p:to>
+                                    </p:set>
+                                  </p:childTnLst>
+                                </p:cTn>
+                              </p:par>
+                              <p:par>
+                                <p:cTn id="29" presetID="1" presetClass="entr" presetSubtype="0" fill="hold" nodeType="withEffect">
+                                  <p:stCondLst>
+                                    <p:cond delay="0"/>
+                                  </p:stCondLst>
+                                  <p:childTnLst>
+                                    <p:set>
+                                      <p:cBhvr>
+                                        <p:cTn id="30" dur="1" fill="hold">
+                                          <p:stCondLst>
+                                            <p:cond delay="0"/>
+                                          </p:stCondLst>
+                                        </p:cTn>
+                                        <p:tgtEl>
+                                          <p:spTgt spid="56"/>
                                         </p:tgtEl>
                                         <p:attrNameLst>
                                           <p:attrName>style.visibility</p:attrName>
@@ -15829,6 +17077,311 @@
           <a:chExt cx="0" cy="0"/>
         </a:xfrm>
       </p:grpSpPr>
+      <p:graphicFrame>
+        <p:nvGraphicFramePr>
+          <p:cNvPr id="20" name="Tableau 19"/>
+          <p:cNvGraphicFramePr>
+            <a:graphicFrameLocks noGrp="1"/>
+          </p:cNvGraphicFramePr>
+          <p:nvPr/>
+        </p:nvGraphicFramePr>
+        <p:xfrm>
+          <a:off x="323528" y="1124744"/>
+          <a:ext cx="6096000" cy="3337560"/>
+        </p:xfrm>
+        <a:graphic>
+          <a:graphicData uri="http://schemas.openxmlformats.org/drawingml/2006/table">
+            <a:tbl>
+              <a:tblPr firstRow="1" bandRow="1">
+                <a:tableStyleId>{5C22544A-7EE6-4342-B048-85BDC9FD1C3A}</a:tableStyleId>
+              </a:tblPr>
+              <a:tblGrid>
+                <a:gridCol w="3048000"/>
+                <a:gridCol w="3048000"/>
+              </a:tblGrid>
+              <a:tr h="370840">
+                <a:tc>
+                  <a:txBody>
+                    <a:bodyPr/>
+                    <a:lstStyle/>
+                    <a:p>
+                      <a:pPr algn="ctr"/>
+                      <a:r>
+                        <a:rPr lang="en-US" smtClean="0"/>
+                        <a:t>Aspect / Pragma</a:t>
+                      </a:r>
+                      <a:endParaRPr lang="en-US" dirty="0"/>
+                    </a:p>
+                  </a:txBody>
+                  <a:tcPr/>
+                </a:tc>
+                <a:tc>
+                  <a:txBody>
+                    <a:bodyPr/>
+                    <a:lstStyle/>
+                    <a:p>
+                      <a:pPr algn="ctr"/>
+                      <a:r>
+                        <a:rPr lang="en-US" dirty="0" smtClean="0"/>
+                        <a:t>Num. of occurrences</a:t>
+                      </a:r>
+                    </a:p>
+                  </a:txBody>
+                  <a:tcPr/>
+                </a:tc>
+              </a:tr>
+              <a:tr h="370840">
+                <a:tc>
+                  <a:txBody>
+                    <a:bodyPr/>
+                    <a:lstStyle/>
+                    <a:p>
+                      <a:r>
+                        <a:rPr lang="en-US" dirty="0" smtClean="0"/>
+                        <a:t>Global</a:t>
+                      </a:r>
+                      <a:endParaRPr lang="en-US" dirty="0"/>
+                    </a:p>
+                  </a:txBody>
+                  <a:tcPr/>
+                </a:tc>
+                <a:tc>
+                  <a:txBody>
+                    <a:bodyPr/>
+                    <a:lstStyle/>
+                    <a:p>
+                      <a:pPr algn="ctr"/>
+                      <a:r>
+                        <a:rPr lang="en-US" dirty="0" smtClean="0"/>
+                        <a:t>197</a:t>
+                      </a:r>
+                      <a:endParaRPr lang="en-US" dirty="0"/>
+                    </a:p>
+                  </a:txBody>
+                  <a:tcPr/>
+                </a:tc>
+              </a:tr>
+              <a:tr h="370840">
+                <a:tc>
+                  <a:txBody>
+                    <a:bodyPr/>
+                    <a:lstStyle/>
+                    <a:p>
+                      <a:r>
+                        <a:rPr lang="en-US" dirty="0" err="1" smtClean="0"/>
+                        <a:t>Refined_Global</a:t>
+                      </a:r>
+                      <a:endParaRPr lang="en-US" dirty="0"/>
+                    </a:p>
+                  </a:txBody>
+                  <a:tcPr/>
+                </a:tc>
+                <a:tc>
+                  <a:txBody>
+                    <a:bodyPr/>
+                    <a:lstStyle/>
+                    <a:p>
+                      <a:pPr algn="ctr"/>
+                      <a:r>
+                        <a:rPr lang="en-US" dirty="0" smtClean="0"/>
+                        <a:t>71</a:t>
+                      </a:r>
+                      <a:endParaRPr lang="en-US" dirty="0"/>
+                    </a:p>
+                  </a:txBody>
+                  <a:tcPr/>
+                </a:tc>
+              </a:tr>
+              <a:tr h="370840">
+                <a:tc>
+                  <a:txBody>
+                    <a:bodyPr/>
+                    <a:lstStyle/>
+                    <a:p>
+                      <a:r>
+                        <a:rPr lang="en-US" dirty="0" err="1" smtClean="0"/>
+                        <a:t>Refined_Depends</a:t>
+                      </a:r>
+                      <a:endParaRPr lang="en-US" dirty="0"/>
+                    </a:p>
+                  </a:txBody>
+                  <a:tcPr/>
+                </a:tc>
+                <a:tc>
+                  <a:txBody>
+                    <a:bodyPr/>
+                    <a:lstStyle/>
+                    <a:p>
+                      <a:pPr algn="ctr"/>
+                      <a:r>
+                        <a:rPr lang="en-US" dirty="0" smtClean="0"/>
+                        <a:t>40</a:t>
+                      </a:r>
+                      <a:endParaRPr lang="en-US" dirty="0"/>
+                    </a:p>
+                  </a:txBody>
+                  <a:tcPr/>
+                </a:tc>
+              </a:tr>
+              <a:tr h="370840">
+                <a:tc>
+                  <a:txBody>
+                    <a:bodyPr/>
+                    <a:lstStyle/>
+                    <a:p>
+                      <a:r>
+                        <a:rPr lang="en-US" dirty="0" smtClean="0"/>
+                        <a:t>Depends</a:t>
+                      </a:r>
+                      <a:endParaRPr lang="en-US" dirty="0"/>
+                    </a:p>
+                  </a:txBody>
+                  <a:tcPr/>
+                </a:tc>
+                <a:tc>
+                  <a:txBody>
+                    <a:bodyPr/>
+                    <a:lstStyle/>
+                    <a:p>
+                      <a:pPr algn="ctr"/>
+                      <a:r>
+                        <a:rPr lang="en-US" dirty="0" smtClean="0"/>
+                        <a:t>202</a:t>
+                      </a:r>
+                      <a:endParaRPr lang="en-US" dirty="0"/>
+                    </a:p>
+                  </a:txBody>
+                  <a:tcPr/>
+                </a:tc>
+              </a:tr>
+              <a:tr h="370840">
+                <a:tc>
+                  <a:txBody>
+                    <a:bodyPr/>
+                    <a:lstStyle/>
+                    <a:p>
+                      <a:r>
+                        <a:rPr lang="en-US" dirty="0" smtClean="0"/>
+                        <a:t>Pre</a:t>
+                      </a:r>
+                      <a:endParaRPr lang="en-US" dirty="0"/>
+                    </a:p>
+                  </a:txBody>
+                  <a:tcPr/>
+                </a:tc>
+                <a:tc>
+                  <a:txBody>
+                    <a:bodyPr/>
+                    <a:lstStyle/>
+                    <a:p>
+                      <a:pPr algn="ctr"/>
+                      <a:r>
+                        <a:rPr lang="en-US" dirty="0" smtClean="0"/>
+                        <a:t>28</a:t>
+                      </a:r>
+                      <a:endParaRPr lang="en-US" dirty="0"/>
+                    </a:p>
+                  </a:txBody>
+                  <a:tcPr/>
+                </a:tc>
+              </a:tr>
+              <a:tr h="370840">
+                <a:tc>
+                  <a:txBody>
+                    <a:bodyPr/>
+                    <a:lstStyle/>
+                    <a:p>
+                      <a:r>
+                        <a:rPr lang="en-US" dirty="0" smtClean="0"/>
+                        <a:t>Post</a:t>
+                      </a:r>
+                      <a:endParaRPr lang="en-US" dirty="0"/>
+                    </a:p>
+                  </a:txBody>
+                  <a:tcPr/>
+                </a:tc>
+                <a:tc>
+                  <a:txBody>
+                    <a:bodyPr/>
+                    <a:lstStyle/>
+                    <a:p>
+                      <a:pPr algn="ctr"/>
+                      <a:r>
+                        <a:rPr lang="en-US" dirty="0" smtClean="0"/>
+                        <a:t>41</a:t>
+                      </a:r>
+                      <a:endParaRPr lang="en-US" dirty="0"/>
+                    </a:p>
+                  </a:txBody>
+                  <a:tcPr/>
+                </a:tc>
+              </a:tr>
+              <a:tr h="370840">
+                <a:tc>
+                  <a:txBody>
+                    <a:bodyPr/>
+                    <a:lstStyle/>
+                    <a:p>
+                      <a:r>
+                        <a:rPr lang="en-US" dirty="0" smtClean="0"/>
+                        <a:t>Assume</a:t>
+                      </a:r>
+                      <a:endParaRPr lang="en-US" dirty="0"/>
+                    </a:p>
+                  </a:txBody>
+                  <a:tcPr/>
+                </a:tc>
+                <a:tc>
+                  <a:txBody>
+                    <a:bodyPr/>
+                    <a:lstStyle/>
+                    <a:p>
+                      <a:pPr algn="ctr"/>
+                      <a:r>
+                        <a:rPr lang="en-US" dirty="0" smtClean="0"/>
+                        <a:t>3</a:t>
+                      </a:r>
+                      <a:endParaRPr lang="en-US" dirty="0"/>
+                    </a:p>
+                  </a:txBody>
+                  <a:tcPr/>
+                </a:tc>
+              </a:tr>
+              <a:tr h="370840">
+                <a:tc>
+                  <a:txBody>
+                    <a:bodyPr/>
+                    <a:lstStyle/>
+                    <a:p>
+                      <a:r>
+                        <a:rPr lang="en-US" dirty="0" err="1" smtClean="0"/>
+                        <a:t>Loop_Invariant</a:t>
+                      </a:r>
+                      <a:endParaRPr lang="en-US" dirty="0"/>
+                    </a:p>
+                  </a:txBody>
+                  <a:tcPr/>
+                </a:tc>
+                <a:tc>
+                  <a:txBody>
+                    <a:bodyPr/>
+                    <a:lstStyle/>
+                    <a:p>
+                      <a:pPr algn="ctr"/>
+                      <a:r>
+                        <a:rPr lang="en-US" dirty="0" smtClean="0"/>
+                        <a:t>10</a:t>
+                      </a:r>
+                      <a:endParaRPr lang="en-US" dirty="0"/>
+                    </a:p>
+                  </a:txBody>
+                  <a:tcPr/>
+                </a:tc>
+              </a:tr>
+            </a:tbl>
+          </a:graphicData>
+        </a:graphic>
+      </p:graphicFrame>
       <p:sp>
         <p:nvSpPr>
           <p:cNvPr id="3" name="Title 2"/>
@@ -15852,36 +17405,6 @@
           </a:p>
         </p:txBody>
       </p:sp>
-      <p:pic>
-        <p:nvPicPr>
-          <p:cNvPr id="5" name="Image 4" descr="Capture d’écran 2014-01-20 à 18.30.06.png"/>
-          <p:cNvPicPr>
-            <a:picLocks noChangeAspect="1"/>
-          </p:cNvPicPr>
-          <p:nvPr/>
-        </p:nvPicPr>
-        <p:blipFill>
-          <a:blip r:embed="rId2">
-            <a:extLst>
-              <a:ext uri="{28A0092B-C50C-407E-A947-70E740481C1C}">
-                <a14:useLocalDpi xmlns:a14="http://schemas.microsoft.com/office/drawing/2010/main" val="0"/>
-              </a:ext>
-            </a:extLst>
-          </a:blip>
-          <a:stretch>
-            <a:fillRect/>
-          </a:stretch>
-        </p:blipFill>
-        <p:spPr>
-          <a:xfrm>
-            <a:off x="254120" y="1196752"/>
-            <a:ext cx="6190088" cy="3319730"/>
-          </a:xfrm>
-          <a:prstGeom prst="rect">
-            <a:avLst/>
-          </a:prstGeom>
-        </p:spPr>
-      </p:pic>
       <p:sp>
         <p:nvSpPr>
           <p:cNvPr id="6" name="Freeform 23"/>
@@ -15890,8 +17413,8 @@
         </p:nvSpPr>
         <p:spPr>
           <a:xfrm rot="4314670" flipV="1">
-            <a:off x="6080526" y="1411649"/>
-            <a:ext cx="511342" cy="969256"/>
+            <a:off x="6173800" y="1283060"/>
+            <a:ext cx="396802" cy="1082420"/>
           </a:xfrm>
           <a:custGeom>
             <a:avLst/>
@@ -15993,7 +17516,7 @@
         </p:nvSpPr>
         <p:spPr bwMode="auto">
           <a:xfrm>
-            <a:off x="6804248" y="1700808"/>
+            <a:off x="6876256" y="1484784"/>
             <a:ext cx="1800200" cy="792088"/>
           </a:xfrm>
           <a:prstGeom prst="rect">
@@ -16215,8 +17738,8 @@
         </p:nvSpPr>
         <p:spPr>
           <a:xfrm rot="4314670" flipV="1">
-            <a:off x="5838231" y="2611149"/>
-            <a:ext cx="1355971" cy="920628"/>
+            <a:off x="6023307" y="2666288"/>
+            <a:ext cx="769796" cy="733333"/>
           </a:xfrm>
           <a:custGeom>
             <a:avLst/>
@@ -16318,7 +17841,7 @@
         </p:nvSpPr>
         <p:spPr bwMode="auto">
           <a:xfrm>
-            <a:off x="6804248" y="3429000"/>
+            <a:off x="6804248" y="2996952"/>
             <a:ext cx="2339752" cy="1152128"/>
           </a:xfrm>
           <a:prstGeom prst="rect">
@@ -16540,8 +18063,8 @@
         </p:nvSpPr>
         <p:spPr>
           <a:xfrm rot="4314670" flipV="1">
-            <a:off x="6018103" y="1857747"/>
-            <a:ext cx="852211" cy="1085173"/>
+            <a:off x="6155001" y="1669017"/>
+            <a:ext cx="578416" cy="1174604"/>
           </a:xfrm>
           <a:custGeom>
             <a:avLst/>
@@ -16641,8 +18164,8 @@
         </p:nvSpPr>
         <p:spPr>
           <a:xfrm rot="21226419">
-            <a:off x="874575" y="3992941"/>
-            <a:ext cx="1227291" cy="2261163"/>
+            <a:off x="2170565" y="3908189"/>
+            <a:ext cx="338373" cy="2209975"/>
           </a:xfrm>
           <a:custGeom>
             <a:avLst/>
@@ -16744,7 +18267,7 @@
         </p:nvSpPr>
         <p:spPr bwMode="auto">
           <a:xfrm>
-            <a:off x="7020272" y="2420888"/>
+            <a:off x="7020272" y="2060848"/>
             <a:ext cx="2123728" cy="1008112"/>
           </a:xfrm>
           <a:prstGeom prst="rect">
@@ -16966,8 +18489,8 @@
         </p:nvSpPr>
         <p:spPr>
           <a:xfrm rot="4314670" flipV="1">
-            <a:off x="5054494" y="3808887"/>
-            <a:ext cx="1843326" cy="534184"/>
+            <a:off x="4832576" y="3647916"/>
+            <a:ext cx="1999129" cy="786303"/>
           </a:xfrm>
           <a:custGeom>
             <a:avLst/>
@@ -17067,8 +18590,8 @@
         </p:nvSpPr>
         <p:spPr>
           <a:xfrm rot="19801698">
-            <a:off x="5483538" y="3377462"/>
-            <a:ext cx="542090" cy="1820862"/>
+            <a:off x="5509281" y="3322751"/>
+            <a:ext cx="501701" cy="1868682"/>
           </a:xfrm>
           <a:custGeom>
             <a:avLst/>
@@ -17392,8 +18915,8 @@
         </p:nvSpPr>
         <p:spPr>
           <a:xfrm rot="16951298">
-            <a:off x="6387583" y="2318196"/>
-            <a:ext cx="326416" cy="1036871"/>
+            <a:off x="6435130" y="1893674"/>
+            <a:ext cx="234179" cy="1054429"/>
           </a:xfrm>
           <a:custGeom>
             <a:avLst/>
@@ -17493,8 +19016,8 @@
         </p:nvSpPr>
         <p:spPr>
           <a:xfrm rot="19999377">
-            <a:off x="2483129" y="4239175"/>
-            <a:ext cx="326416" cy="1036871"/>
+            <a:off x="2695257" y="4186345"/>
+            <a:ext cx="238747" cy="998731"/>
           </a:xfrm>
           <a:custGeom>
             <a:avLst/>
@@ -18037,7 +19560,7 @@
     </p:spTree>
     <p:extLst>
       <p:ext uri="{BB962C8B-B14F-4D97-AF65-F5344CB8AC3E}">
-        <p14:creationId xmlns:p14="http://schemas.microsoft.com/office/powerpoint/2010/main" val="651165796"/>
+        <p14:creationId xmlns:p14="http://schemas.microsoft.com/office/powerpoint/2010/main" val="2918508933"/>
       </p:ext>
     </p:extLst>
   </p:cSld>
@@ -23187,106 +24710,6 @@
       </p:sp>
       <p:sp>
         <p:nvSpPr>
-          <p:cNvPr id="34" name="Freeform 12"/>
-          <p:cNvSpPr/>
-          <p:nvPr/>
-        </p:nvSpPr>
-        <p:spPr bwMode="auto">
-          <a:xfrm>
-            <a:off x="5976257" y="4108918"/>
-            <a:ext cx="1384485" cy="2269671"/>
-          </a:xfrm>
-          <a:custGeom>
-            <a:avLst/>
-            <a:gdLst>
-              <a:gd name="connsiteX0" fmla="*/ 0 w 1384485"/>
-              <a:gd name="connsiteY0" fmla="*/ 2269671 h 2269671"/>
-              <a:gd name="connsiteX1" fmla="*/ 1322614 w 1384485"/>
-              <a:gd name="connsiteY1" fmla="*/ 1469571 h 2269671"/>
-              <a:gd name="connsiteX2" fmla="*/ 1045029 w 1384485"/>
-              <a:gd name="connsiteY2" fmla="*/ 0 h 2269671"/>
-            </a:gdLst>
-            <a:ahLst/>
-            <a:cxnLst>
-              <a:cxn ang="0">
-                <a:pos x="connsiteX0" y="connsiteY0"/>
-              </a:cxn>
-              <a:cxn ang="0">
-                <a:pos x="connsiteX1" y="connsiteY1"/>
-              </a:cxn>
-              <a:cxn ang="0">
-                <a:pos x="connsiteX2" y="connsiteY2"/>
-              </a:cxn>
-            </a:cxnLst>
-            <a:rect l="l" t="t" r="r" b="b"/>
-            <a:pathLst>
-              <a:path w="1384485" h="2269671">
-                <a:moveTo>
-                  <a:pt x="0" y="2269671"/>
-                </a:moveTo>
-                <a:cubicBezTo>
-                  <a:pt x="574221" y="2058760"/>
-                  <a:pt x="1148443" y="1847849"/>
-                  <a:pt x="1322614" y="1469571"/>
-                </a:cubicBezTo>
-                <a:cubicBezTo>
-                  <a:pt x="1496785" y="1091293"/>
-                  <a:pt x="1270907" y="545646"/>
-                  <a:pt x="1045029" y="0"/>
-                </a:cubicBezTo>
-              </a:path>
-            </a:pathLst>
-          </a:custGeom>
-          <a:noFill/>
-          <a:ln w="76200" cap="flat" cmpd="sng" algn="ctr">
-            <a:solidFill>
-              <a:srgbClr val="7030A0">
-                <a:alpha val="40000"/>
-              </a:srgbClr>
-            </a:solidFill>
-            <a:prstDash val="solid"/>
-            <a:round/>
-            <a:headEnd type="none" w="med" len="med"/>
-            <a:tailEnd type="triangle" w="med" len="med"/>
-          </a:ln>
-          <a:effectLst/>
-        </p:spPr>
-        <p:txBody>
-          <a:bodyPr vert="horz" wrap="square" lIns="91440" tIns="45720" rIns="91440" bIns="45720" numCol="1" rtlCol="0" anchor="t" anchorCtr="0" compatLnSpc="1">
-            <a:prstTxWarp prst="textNoShape">
-              <a:avLst/>
-            </a:prstTxWarp>
-          </a:bodyPr>
-          <a:lstStyle/>
-          <a:p>
-            <a:pPr marL="0" marR="0" indent="0" algn="l" defTabSz="914400" rtl="0" eaLnBrk="1" fontAlgn="base" latinLnBrk="0" hangingPunct="1">
-              <a:lnSpc>
-                <a:spcPct val="100000"/>
-              </a:lnSpc>
-              <a:spcBef>
-                <a:spcPct val="0"/>
-              </a:spcBef>
-              <a:spcAft>
-                <a:spcPct val="0"/>
-              </a:spcAft>
-              <a:buClrTx/>
-              <a:buSzTx/>
-              <a:buFontTx/>
-              <a:buNone/>
-              <a:tabLst/>
-            </a:pPr>
-            <a:endParaRPr kumimoji="0" lang="en-US" sz="1800" b="0" i="1" u="none" strike="noStrike" cap="none" normalizeH="0" baseline="0" smtClean="0">
-              <a:solidFill>
-                <a:schemeClr val="tx1"/>
-              </a:solidFill>
-              <a:effectLst/>
-              <a:latin typeface="Arial" charset="0"/>
-            </a:endParaRPr>
-          </a:p>
-        </p:txBody>
-      </p:sp>
-      <p:sp>
-        <p:nvSpPr>
           <p:cNvPr id="35" name="Freeform 17"/>
           <p:cNvSpPr/>
           <p:nvPr/>
@@ -24318,33 +25741,6 @@
                                   </p:childTnLst>
                                 </p:cTn>
                               </p:par>
-                              <p:par>
-                                <p:cTn id="29" presetID="1" presetClass="entr" presetSubtype="0" fill="hold" grpId="0" nodeType="withEffect">
-                                  <p:stCondLst>
-                                    <p:cond delay="0"/>
-                                  </p:stCondLst>
-                                  <p:childTnLst>
-                                    <p:set>
-                                      <p:cBhvr>
-                                        <p:cTn id="30" dur="1" fill="hold">
-                                          <p:stCondLst>
-                                            <p:cond delay="0"/>
-                                          </p:stCondLst>
-                                        </p:cTn>
-                                        <p:tgtEl>
-                                          <p:spTgt spid="34"/>
-                                        </p:tgtEl>
-                                        <p:attrNameLst>
-                                          <p:attrName>style.visibility</p:attrName>
-                                        </p:attrNameLst>
-                                      </p:cBhvr>
-                                      <p:to>
-                                        <p:strVal val="visible"/>
-                                      </p:to>
-                                    </p:set>
-                                  </p:childTnLst>
-                                </p:cTn>
-                              </p:par>
                             </p:childTnLst>
                           </p:cTn>
                         </p:par>
@@ -24373,7 +25769,6 @@
       </p:par>
     </p:tnLst>
     <p:bldLst>
-      <p:bldP spid="34" grpId="0" animBg="1"/>
       <p:bldP spid="35" grpId="0" animBg="1"/>
       <p:bldP spid="36" grpId="0" animBg="1"/>
       <p:bldP spid="37" grpId="0"/>

</xml_diff>

<commit_message>
M419-014 Further comments from David L.
</commit_message>
<xml_diff>
--- a/slides/ERTS_20140205/SPARK_2014_Case_Studies.pptx
+++ b/slides/ERTS_20140205/SPARK_2014_Case_Studies.pptx
@@ -24805,7 +24805,7 @@
         </p:nvSpPr>
         <p:spPr bwMode="auto">
           <a:xfrm>
-            <a:off x="5959929" y="5317232"/>
+            <a:off x="5940152" y="5445224"/>
             <a:ext cx="261684" cy="996043"/>
           </a:xfrm>
           <a:custGeom>
@@ -24852,7 +24852,7 @@
           <a:noFill/>
           <a:ln w="76200" cap="flat" cmpd="sng" algn="ctr">
             <a:solidFill>
-              <a:srgbClr val="7030A0"/>
+              <a:srgbClr val="B14BFF"/>
             </a:solidFill>
             <a:prstDash val="solid"/>
             <a:round/>
@@ -25388,7 +25388,7 @@
         </p:blipFill>
         <p:spPr>
           <a:xfrm>
-            <a:off x="6444208" y="5373216"/>
+            <a:off x="6732240" y="5265654"/>
             <a:ext cx="1872208" cy="251578"/>
           </a:xfrm>
           <a:prstGeom prst="rect">
@@ -25396,6 +25396,95 @@
           </a:prstGeom>
         </p:spPr>
       </p:pic>
+      <p:sp>
+        <p:nvSpPr>
+          <p:cNvPr id="39" name="Freeform 17"/>
+          <p:cNvSpPr/>
+          <p:nvPr/>
+        </p:nvSpPr>
+        <p:spPr>
+          <a:xfrm>
+            <a:off x="5919780" y="4077072"/>
+            <a:ext cx="1028484" cy="2376264"/>
+          </a:xfrm>
+          <a:custGeom>
+            <a:avLst/>
+            <a:gdLst>
+              <a:gd name="connsiteX0" fmla="*/ 0 w 1028484"/>
+              <a:gd name="connsiteY0" fmla="*/ 1149928 h 1149928"/>
+              <a:gd name="connsiteX1" fmla="*/ 914400 w 1028484"/>
+              <a:gd name="connsiteY1" fmla="*/ 762000 h 1149928"/>
+              <a:gd name="connsiteX2" fmla="*/ 983673 w 1028484"/>
+              <a:gd name="connsiteY2" fmla="*/ 0 h 1149928"/>
+            </a:gdLst>
+            <a:ahLst/>
+            <a:cxnLst>
+              <a:cxn ang="0">
+                <a:pos x="connsiteX0" y="connsiteY0"/>
+              </a:cxn>
+              <a:cxn ang="0">
+                <a:pos x="connsiteX1" y="connsiteY1"/>
+              </a:cxn>
+              <a:cxn ang="0">
+                <a:pos x="connsiteX2" y="connsiteY2"/>
+              </a:cxn>
+            </a:cxnLst>
+            <a:rect l="l" t="t" r="r" b="b"/>
+            <a:pathLst>
+              <a:path w="1028484" h="1149928">
+                <a:moveTo>
+                  <a:pt x="0" y="1149928"/>
+                </a:moveTo>
+                <a:cubicBezTo>
+                  <a:pt x="375227" y="1051791"/>
+                  <a:pt x="750455" y="953655"/>
+                  <a:pt x="914400" y="762000"/>
+                </a:cubicBezTo>
+                <a:cubicBezTo>
+                  <a:pt x="1078346" y="570345"/>
+                  <a:pt x="1031009" y="285172"/>
+                  <a:pt x="983673" y="0"/>
+                </a:cubicBezTo>
+              </a:path>
+            </a:pathLst>
+          </a:custGeom>
+          <a:noFill/>
+          <a:ln w="76200" cmpd="sng">
+            <a:solidFill>
+              <a:srgbClr val="7030A0"/>
+            </a:solidFill>
+            <a:tailEnd type="triangle"/>
+          </a:ln>
+        </p:spPr>
+        <p:style>
+          <a:lnRef idx="2">
+            <a:schemeClr val="accent1">
+              <a:shade val="50000"/>
+            </a:schemeClr>
+          </a:lnRef>
+          <a:fillRef idx="1">
+            <a:schemeClr val="accent1"/>
+          </a:fillRef>
+          <a:effectRef idx="0">
+            <a:schemeClr val="accent1"/>
+          </a:effectRef>
+          <a:fontRef idx="minor">
+            <a:schemeClr val="lt1"/>
+          </a:fontRef>
+        </p:style>
+        <p:txBody>
+          <a:bodyPr rtlCol="0" anchor="ctr"/>
+          <a:lstStyle/>
+          <a:p>
+            <a:pPr algn="ctr"/>
+            <a:endParaRPr lang="en-US" sz="1800">
+              <a:solidFill>
+                <a:srgbClr val="FFFFFF"/>
+              </a:solidFill>
+            </a:endParaRPr>
+          </a:p>
+        </p:txBody>
+      </p:sp>
     </p:spTree>
     <p:extLst>
       <p:ext uri="{BB962C8B-B14F-4D97-AF65-F5344CB8AC3E}">
@@ -25467,7 +25556,7 @@
                                           </p:stCondLst>
                                         </p:cTn>
                                         <p:tgtEl>
-                                          <p:spTgt spid="40"/>
+                                          <p:spTgt spid="45"/>
                                         </p:tgtEl>
                                         <p:attrNameLst>
                                           <p:attrName>style.visibility</p:attrName>
@@ -25494,7 +25583,7 @@
                                           </p:stCondLst>
                                         </p:cTn>
                                         <p:tgtEl>
-                                          <p:spTgt spid="45"/>
+                                          <p:spTgt spid="40"/>
                                         </p:tgtEl>
                                         <p:attrNameLst>
                                           <p:attrName>style.visibility</p:attrName>
@@ -25548,7 +25637,7 @@
                                           </p:stCondLst>
                                         </p:cTn>
                                         <p:tgtEl>
-                                          <p:spTgt spid="36"/>
+                                          <p:spTgt spid="39"/>
                                         </p:tgtEl>
                                         <p:attrNameLst>
                                           <p:attrName>style.visibility</p:attrName>
@@ -25575,61 +25664,7 @@
                                           </p:stCondLst>
                                         </p:cTn>
                                         <p:tgtEl>
-                                          <p:spTgt spid="35"/>
-                                        </p:tgtEl>
-                                        <p:attrNameLst>
-                                          <p:attrName>style.visibility</p:attrName>
-                                        </p:attrNameLst>
-                                      </p:cBhvr>
-                                      <p:to>
-                                        <p:strVal val="visible"/>
-                                      </p:to>
-                                    </p:set>
-                                  </p:childTnLst>
-                                </p:cTn>
-                              </p:par>
-                              <p:par>
-                                <p:cTn id="17" presetID="1" presetClass="entr" presetSubtype="0" fill="hold" grpId="0" nodeType="withEffect">
-                                  <p:stCondLst>
-                                    <p:cond delay="0"/>
-                                  </p:stCondLst>
-                                  <p:childTnLst>
-                                    <p:set>
-                                      <p:cBhvr>
-                                        <p:cTn id="18" dur="1" fill="hold">
-                                          <p:stCondLst>
-                                            <p:cond delay="0"/>
-                                          </p:stCondLst>
-                                        </p:cTn>
-                                        <p:tgtEl>
                                           <p:spTgt spid="37"/>
-                                        </p:tgtEl>
-                                        <p:attrNameLst>
-                                          <p:attrName>style.visibility</p:attrName>
-                                        </p:attrNameLst>
-                                      </p:cBhvr>
-                                      <p:to>
-                                        <p:strVal val="visible"/>
-                                      </p:to>
-                                    </p:set>
-                                  </p:childTnLst>
-                                </p:cTn>
-                              </p:par>
-                              <p:par>
-                                <p:cTn id="19" presetID="1" presetClass="entr" presetSubtype="0" fill="hold" grpId="0" nodeType="withEffect">
-                                  <p:stCondLst>
-                                    <p:cond delay="0"/>
-                                  </p:stCondLst>
-                                  <p:childTnLst>
-                                    <p:set>
-                                      <p:cBhvr>
-                                        <p:cTn id="20" dur="1" fill="hold">
-                                          <p:stCondLst>
-                                            <p:cond delay="0"/>
-                                          </p:stCondLst>
-                                        </p:cTn>
-                                        <p:tgtEl>
-                                          <p:spTgt spid="38"/>
                                         </p:tgtEl>
                                         <p:attrNameLst>
                                           <p:attrName>style.visibility</p:attrName>
@@ -25649,26 +25684,26 @@
                     </p:cTn>
                   </p:par>
                   <p:par>
-                    <p:cTn id="21" fill="hold">
+                    <p:cTn id="17" fill="hold">
                       <p:stCondLst>
                         <p:cond delay="indefinite"/>
                       </p:stCondLst>
                       <p:childTnLst>
                         <p:par>
-                          <p:cTn id="22" fill="hold">
+                          <p:cTn id="18" fill="hold">
                             <p:stCondLst>
                               <p:cond delay="0"/>
                             </p:stCondLst>
                             <p:childTnLst>
                               <p:par>
-                                <p:cTn id="23" presetID="1" presetClass="entr" presetSubtype="0" fill="hold" nodeType="clickEffect">
+                                <p:cTn id="19" presetID="1" presetClass="entr" presetSubtype="0" fill="hold" nodeType="clickEffect">
                                   <p:stCondLst>
                                     <p:cond delay="0"/>
                                   </p:stCondLst>
                                   <p:childTnLst>
                                     <p:set>
                                       <p:cBhvr>
-                                        <p:cTn id="24" dur="1" fill="hold">
+                                        <p:cTn id="20" dur="1" fill="hold">
                                           <p:stCondLst>
                                             <p:cond delay="0"/>
                                           </p:stCondLst>
@@ -25688,14 +25723,14 @@
                                 </p:cTn>
                               </p:par>
                               <p:par>
-                                <p:cTn id="25" presetID="1" presetClass="entr" presetSubtype="0" fill="hold" nodeType="withEffect">
+                                <p:cTn id="21" presetID="1" presetClass="entr" presetSubtype="0" fill="hold" nodeType="withEffect">
                                   <p:stCondLst>
                                     <p:cond delay="0"/>
                                   </p:stCondLst>
                                   <p:childTnLst>
                                     <p:set>
                                       <p:cBhvr>
-                                        <p:cTn id="26" dur="1" fill="hold">
+                                        <p:cTn id="22" dur="1" fill="hold">
                                           <p:stCondLst>
                                             <p:cond delay="0"/>
                                           </p:stCondLst>
@@ -25715,14 +25750,14 @@
                                 </p:cTn>
                               </p:par>
                               <p:par>
-                                <p:cTn id="27" presetID="1" presetClass="entr" presetSubtype="0" fill="hold" nodeType="withEffect">
+                                <p:cTn id="23" presetID="1" presetClass="entr" presetSubtype="0" fill="hold" nodeType="withEffect">
                                   <p:stCondLst>
                                     <p:cond delay="0"/>
                                   </p:stCondLst>
                                   <p:childTnLst>
                                     <p:set>
                                       <p:cBhvr>
-                                        <p:cTn id="28" dur="1" fill="hold">
+                                        <p:cTn id="24" dur="1" fill="hold">
                                           <p:stCondLst>
                                             <p:cond delay="0"/>
                                           </p:stCondLst>
@@ -25736,6 +25771,114 @@
                                       </p:cBhvr>
                                       <p:to>
                                         <p:strVal val="visible"/>
+                                      </p:to>
+                                    </p:set>
+                                  </p:childTnLst>
+                                </p:cTn>
+                              </p:par>
+                              <p:par>
+                                <p:cTn id="25" presetID="1" presetClass="entr" presetSubtype="0" fill="hold" grpId="0" nodeType="withEffect">
+                                  <p:stCondLst>
+                                    <p:cond delay="0"/>
+                                  </p:stCondLst>
+                                  <p:childTnLst>
+                                    <p:set>
+                                      <p:cBhvr>
+                                        <p:cTn id="26" dur="1" fill="hold">
+                                          <p:stCondLst>
+                                            <p:cond delay="0"/>
+                                          </p:stCondLst>
+                                        </p:cTn>
+                                        <p:tgtEl>
+                                          <p:spTgt spid="35"/>
+                                        </p:tgtEl>
+                                        <p:attrNameLst>
+                                          <p:attrName>style.visibility</p:attrName>
+                                        </p:attrNameLst>
+                                      </p:cBhvr>
+                                      <p:to>
+                                        <p:strVal val="visible"/>
+                                      </p:to>
+                                    </p:set>
+                                  </p:childTnLst>
+                                </p:cTn>
+                              </p:par>
+                              <p:par>
+                                <p:cTn id="27" presetID="1" presetClass="entr" presetSubtype="0" fill="hold" grpId="0" nodeType="withEffect">
+                                  <p:stCondLst>
+                                    <p:cond delay="0"/>
+                                  </p:stCondLst>
+                                  <p:childTnLst>
+                                    <p:set>
+                                      <p:cBhvr>
+                                        <p:cTn id="28" dur="1" fill="hold">
+                                          <p:stCondLst>
+                                            <p:cond delay="0"/>
+                                          </p:stCondLst>
+                                        </p:cTn>
+                                        <p:tgtEl>
+                                          <p:spTgt spid="36"/>
+                                        </p:tgtEl>
+                                        <p:attrNameLst>
+                                          <p:attrName>style.visibility</p:attrName>
+                                        </p:attrNameLst>
+                                      </p:cBhvr>
+                                      <p:to>
+                                        <p:strVal val="visible"/>
+                                      </p:to>
+                                    </p:set>
+                                  </p:childTnLst>
+                                </p:cTn>
+                              </p:par>
+                              <p:par>
+                                <p:cTn id="29" presetID="1" presetClass="entr" presetSubtype="0" fill="hold" grpId="0" nodeType="withEffect">
+                                  <p:stCondLst>
+                                    <p:cond delay="0"/>
+                                  </p:stCondLst>
+                                  <p:childTnLst>
+                                    <p:set>
+                                      <p:cBhvr>
+                                        <p:cTn id="30" dur="1" fill="hold">
+                                          <p:stCondLst>
+                                            <p:cond delay="0"/>
+                                          </p:stCondLst>
+                                        </p:cTn>
+                                        <p:tgtEl>
+                                          <p:spTgt spid="38"/>
+                                        </p:tgtEl>
+                                        <p:attrNameLst>
+                                          <p:attrName>style.visibility</p:attrName>
+                                        </p:attrNameLst>
+                                      </p:cBhvr>
+                                      <p:to>
+                                        <p:strVal val="visible"/>
+                                      </p:to>
+                                    </p:set>
+                                  </p:childTnLst>
+                                </p:cTn>
+                              </p:par>
+                              <p:par>
+                                <p:cTn id="31" presetID="1" presetClass="exit" presetSubtype="0" fill="hold" grpId="1" nodeType="withEffect">
+                                  <p:stCondLst>
+                                    <p:cond delay="0"/>
+                                  </p:stCondLst>
+                                  <p:childTnLst>
+                                    <p:set>
+                                      <p:cBhvr>
+                                        <p:cTn id="32" dur="1" fill="hold">
+                                          <p:stCondLst>
+                                            <p:cond delay="0"/>
+                                          </p:stCondLst>
+                                        </p:cTn>
+                                        <p:tgtEl>
+                                          <p:spTgt spid="39"/>
+                                        </p:tgtEl>
+                                        <p:attrNameLst>
+                                          <p:attrName>style.visibility</p:attrName>
+                                        </p:attrNameLst>
+                                      </p:cBhvr>
+                                      <p:to>
+                                        <p:strVal val="hidden"/>
                                       </p:to>
                                     </p:set>
                                   </p:childTnLst>
@@ -25777,6 +25920,8 @@
       <p:bldP spid="41" grpId="0" animBg="1"/>
       <p:bldP spid="44" grpId="0"/>
       <p:bldP spid="45" grpId="0"/>
+      <p:bldP spid="39" grpId="0" animBg="1"/>
+      <p:bldP spid="39" grpId="1" animBg="1"/>
     </p:bldLst>
   </p:timing>
 </p:sld>

</xml_diff>

<commit_message>
M419-014 Minor comments from Stuart
</commit_message>
<xml_diff>
--- a/slides/ERTS_20140205/SPARK_2014_Case_Studies.pptx
+++ b/slides/ERTS_20140205/SPARK_2014_Case_Studies.pptx
@@ -8062,60 +8062,6 @@
       </p:sp>
       <p:pic>
         <p:nvPicPr>
-          <p:cNvPr id="11" name="Picture 2"/>
-          <p:cNvPicPr>
-            <a:picLocks noChangeAspect="1" noChangeArrowheads="1"/>
-          </p:cNvPicPr>
-          <p:nvPr/>
-        </p:nvPicPr>
-        <p:blipFill>
-          <a:blip r:embed="rId2">
-            <a:extLst>
-              <a:ext uri="{28A0092B-C50C-407E-A947-70E740481C1C}">
-                <a14:useLocalDpi xmlns:a14="http://schemas.microsoft.com/office/drawing/2010/main" val="0"/>
-              </a:ext>
-            </a:extLst>
-          </a:blip>
-          <a:srcRect/>
-          <a:stretch>
-            <a:fillRect/>
-          </a:stretch>
-        </p:blipFill>
-        <p:spPr bwMode="auto">
-          <a:xfrm>
-            <a:off x="2483768" y="1196752"/>
-            <a:ext cx="2214562" cy="584200"/>
-          </a:xfrm>
-          <a:prstGeom prst="rect">
-            <a:avLst/>
-          </a:prstGeom>
-          <a:noFill/>
-          <a:ln>
-            <a:noFill/>
-          </a:ln>
-          <a:extLst>
-            <a:ext uri="{909E8E84-426E-40dd-AFC4-6F175D3DCCD1}">
-              <a14:hiddenFill xmlns:a14="http://schemas.microsoft.com/office/drawing/2010/main">
-                <a:solidFill>
-                  <a:srgbClr val="FFFFFF"/>
-                </a:solidFill>
-              </a14:hiddenFill>
-            </a:ext>
-            <a:ext uri="{91240B29-F687-4f45-9708-019B960494DF}">
-              <a14:hiddenLine xmlns:a14="http://schemas.microsoft.com/office/drawing/2010/main" w="12700">
-                <a:solidFill>
-                  <a:srgbClr val="000000"/>
-                </a:solidFill>
-                <a:miter lim="800000"/>
-                <a:headEnd/>
-                <a:tailEnd/>
-              </a14:hiddenLine>
-            </a:ext>
-          </a:extLst>
-        </p:spPr>
-      </p:pic>
-      <p:pic>
-        <p:nvPicPr>
           <p:cNvPr id="8" name="Image 7" descr="Mitsubishi Electric Color Logo.jpg"/>
           <p:cNvPicPr>
             <a:picLocks noChangeAspect="1"/>
@@ -8123,7 +8069,7 @@
           <p:nvPr/>
         </p:nvPicPr>
         <p:blipFill>
-          <a:blip r:embed="rId3" cstate="print"/>
+          <a:blip r:embed="rId2" cstate="print"/>
           <a:stretch>
             <a:fillRect/>
           </a:stretch>
@@ -8147,7 +8093,7 @@
           <p:nvPr/>
         </p:nvPicPr>
         <p:blipFill>
-          <a:blip r:embed="rId4" cstate="print">
+          <a:blip r:embed="rId3" cstate="print">
             <a:extLst>
               <a:ext uri="{28A0092B-C50C-407E-A947-70E740481C1C}">
                 <a14:useLocalDpi xmlns:a14="http://schemas.microsoft.com/office/drawing/2010/main" val="0"/>
@@ -8162,6 +8108,36 @@
           <a:xfrm>
             <a:off x="4606597" y="1124744"/>
             <a:ext cx="2485683" cy="864095"/>
+          </a:xfrm>
+          <a:prstGeom prst="rect">
+            <a:avLst/>
+          </a:prstGeom>
+        </p:spPr>
+      </p:pic>
+      <p:pic>
+        <p:nvPicPr>
+          <p:cNvPr id="7" name="Image 6" descr="Altran_Logo_RGB.jpg"/>
+          <p:cNvPicPr>
+            <a:picLocks noChangeAspect="1"/>
+          </p:cNvPicPr>
+          <p:nvPr/>
+        </p:nvPicPr>
+        <p:blipFill>
+          <a:blip r:embed="rId4" cstate="print">
+            <a:extLst>
+              <a:ext uri="{28A0092B-C50C-407E-A947-70E740481C1C}">
+                <a14:useLocalDpi xmlns:a14="http://schemas.microsoft.com/office/drawing/2010/main" val="0"/>
+              </a:ext>
+            </a:extLst>
+          </a:blip>
+          <a:stretch>
+            <a:fillRect/>
+          </a:stretch>
+        </p:blipFill>
+        <p:spPr>
+          <a:xfrm>
+            <a:off x="2267744" y="1052736"/>
+            <a:ext cx="2448272" cy="906768"/>
           </a:xfrm>
           <a:prstGeom prst="rect">
             <a:avLst/>
@@ -10318,7 +10294,7 @@
                 </a:solidFill>
                 <a:cs typeface="Courier New"/>
               </a:rPr>
-              <a:t>Expressing</a:t>
+              <a:t>Capturing </a:t>
             </a:r>
             <a:r>
               <a:rPr lang="en-US" b="0" dirty="0" smtClean="0">
@@ -10327,7 +10303,16 @@
                 </a:solidFill>
                 <a:cs typeface="Courier New"/>
               </a:rPr>
-              <a:t> objects of the requirements</a:t>
+              <a:t>objects in the </a:t>
+            </a:r>
+            <a:r>
+              <a:rPr lang="en-US" b="0" dirty="0" smtClean="0">
+                <a:solidFill>
+                  <a:schemeClr val="tx1"/>
+                </a:solidFill>
+                <a:cs typeface="Courier New"/>
+              </a:rPr>
+              <a:t>requirements</a:t>
             </a:r>
           </a:p>
           <a:p>
@@ -10501,7 +10486,23 @@
                   <a:schemeClr val="tx1"/>
                 </a:solidFill>
               </a:rPr>
-              <a:t>Proving automatically </a:t>
+              <a:t>Proving </a:t>
+            </a:r>
+            <a:r>
+              <a:rPr lang="en-US" dirty="0" smtClean="0">
+                <a:solidFill>
+                  <a:schemeClr val="accent1"/>
+                </a:solidFill>
+              </a:rPr>
+              <a:t>automatically</a:t>
+            </a:r>
+            <a:r>
+              <a:rPr lang="en-US" b="0" dirty="0" smtClean="0">
+                <a:solidFill>
+                  <a:schemeClr val="accent1"/>
+                </a:solidFill>
+              </a:rPr>
+              <a:t> </a:t>
             </a:r>
             <a:r>
               <a:rPr lang="en-US" dirty="0" smtClean="0">
@@ -11070,8 +11071,8 @@
         </p:blipFill>
         <p:spPr>
           <a:xfrm>
-            <a:off x="6658317" y="-31895"/>
-            <a:ext cx="2485683" cy="864095"/>
+            <a:off x="6438197" y="-31895"/>
+            <a:ext cx="2705803" cy="940615"/>
           </a:xfrm>
           <a:prstGeom prst="rect">
             <a:avLst/>
@@ -16144,18 +16145,16 @@
                 </a:solidFill>
                 <a:cs typeface="Courier New"/>
               </a:rPr>
-              <a:t>Proof of absence of run-time errors</a:t>
-            </a:r>
-          </a:p>
-          <a:p>
-            <a:r>
-              <a:rPr lang="en-US" b="0" dirty="0" smtClean="0">
-                <a:solidFill>
-                  <a:schemeClr val="tx1"/>
+              <a:t>Proof of </a:t>
+            </a:r>
+            <a:r>
+              <a:rPr lang="en-US" dirty="0" smtClean="0">
+                <a:solidFill>
+                  <a:srgbClr val="17598F"/>
                 </a:solidFill>
                 <a:cs typeface="Courier New"/>
               </a:rPr>
-              <a:t>Correct access to all global variables</a:t>
+              <a:t>absence of run-time errors</a:t>
             </a:r>
           </a:p>
           <a:p>
@@ -16166,18 +16165,16 @@
                 </a:solidFill>
                 <a:cs typeface="Courier New"/>
               </a:rPr>
-              <a:t>Absence of out-of-range values</a:t>
-            </a:r>
-          </a:p>
-          <a:p>
-            <a:r>
-              <a:rPr lang="en-US" b="0" dirty="0" smtClean="0">
-                <a:solidFill>
-                  <a:schemeClr val="tx1"/>
+              <a:t>Correct </a:t>
+            </a:r>
+            <a:r>
+              <a:rPr lang="en-US" dirty="0" smtClean="0">
+                <a:solidFill>
+                  <a:srgbClr val="17598F"/>
                 </a:solidFill>
                 <a:cs typeface="Courier New"/>
               </a:rPr>
-              <a:t>Internal consistency of software unit</a:t>
+              <a:t>access to all global variables</a:t>
             </a:r>
           </a:p>
           <a:p>
@@ -16188,18 +16185,94 @@
                 </a:solidFill>
                 <a:cs typeface="Courier New"/>
               </a:rPr>
-              <a:t>Correct numerical protection</a:t>
-            </a:r>
-          </a:p>
-          <a:p>
-            <a:r>
-              <a:rPr lang="en-US" b="0" dirty="0" smtClean="0">
-                <a:solidFill>
-                  <a:schemeClr val="tx1"/>
+              <a:t>Absence of </a:t>
+            </a:r>
+            <a:r>
+              <a:rPr lang="en-US" dirty="0" smtClean="0">
+                <a:solidFill>
+                  <a:srgbClr val="17598F"/>
                 </a:solidFill>
                 <a:cs typeface="Courier New"/>
               </a:rPr>
-              <a:t>Correctness of a generic code in a specific context</a:t>
+              <a:t>out-of-range values</a:t>
+            </a:r>
+          </a:p>
+          <a:p>
+            <a:r>
+              <a:rPr lang="en-US" b="0" dirty="0" smtClean="0">
+                <a:solidFill>
+                  <a:schemeClr val="tx1"/>
+                </a:solidFill>
+                <a:cs typeface="Courier New"/>
+              </a:rPr>
+              <a:t>Internal </a:t>
+            </a:r>
+            <a:r>
+              <a:rPr lang="en-US" dirty="0" smtClean="0">
+                <a:solidFill>
+                  <a:srgbClr val="17598F"/>
+                </a:solidFill>
+                <a:cs typeface="Courier New"/>
+              </a:rPr>
+              <a:t>consistency</a:t>
+            </a:r>
+            <a:r>
+              <a:rPr lang="en-US" b="0" dirty="0" smtClean="0">
+                <a:solidFill>
+                  <a:schemeClr val="tx1"/>
+                </a:solidFill>
+                <a:cs typeface="Courier New"/>
+              </a:rPr>
+              <a:t> of software unit</a:t>
+            </a:r>
+          </a:p>
+          <a:p>
+            <a:r>
+              <a:rPr lang="en-US" b="0" dirty="0" smtClean="0">
+                <a:solidFill>
+                  <a:schemeClr val="tx1"/>
+                </a:solidFill>
+                <a:cs typeface="Courier New"/>
+              </a:rPr>
+              <a:t>Correct </a:t>
+            </a:r>
+            <a:r>
+              <a:rPr lang="en-US" dirty="0" smtClean="0">
+                <a:solidFill>
+                  <a:srgbClr val="17598F"/>
+                </a:solidFill>
+                <a:cs typeface="Courier New"/>
+              </a:rPr>
+              <a:t>numerical protection</a:t>
+            </a:r>
+          </a:p>
+          <a:p>
+            <a:r>
+              <a:rPr lang="en-US" b="0" dirty="0" smtClean="0">
+                <a:solidFill>
+                  <a:schemeClr val="tx1"/>
+                </a:solidFill>
+                <a:cs typeface="Courier New"/>
+              </a:rPr>
+              <a:t>Correctness of a </a:t>
+            </a:r>
+            <a:r>
+              <a:rPr lang="en-US" dirty="0" smtClean="0">
+                <a:solidFill>
+                  <a:srgbClr val="17598F"/>
+                </a:solidFill>
+                <a:cs typeface="Courier New"/>
+              </a:rPr>
+              <a:t>generic code </a:t>
+            </a:r>
+            <a:r>
+              <a:rPr lang="en-US" b="0" dirty="0" smtClean="0">
+                <a:solidFill>
+                  <a:schemeClr val="tx1"/>
+                </a:solidFill>
+                <a:cs typeface="Courier New"/>
+              </a:rPr>
+              <a:t>in a specific context</a:t>
             </a:r>
           </a:p>
           <a:p>
@@ -16232,7 +16305,16 @@
                 </a:solidFill>
                 <a:cs typeface="Courier New"/>
               </a:rPr>
-              <a:t>Proof of functional properties</a:t>
+              <a:t>Proof of </a:t>
+            </a:r>
+            <a:r>
+              <a:rPr lang="en-US" dirty="0" smtClean="0">
+                <a:solidFill>
+                  <a:srgbClr val="17598F"/>
+                </a:solidFill>
+                <a:cs typeface="Courier New"/>
+              </a:rPr>
+              <a:t>functional properties</a:t>
             </a:r>
           </a:p>
           <a:p>
@@ -16265,21 +16347,17 @@
                 </a:solidFill>
                 <a:cs typeface="Courier New"/>
               </a:rPr>
-              <a:t>Sound treatment of floating-points (done)</a:t>
-            </a:r>
-          </a:p>
-          <a:p>
-            <a:r>
-              <a:rPr lang="en-US" b="0" dirty="0" smtClean="0">
-                <a:solidFill>
-                  <a:schemeClr val="tx1"/>
+              <a:t>Sound treatment of </a:t>
+            </a:r>
+            <a:r>
+              <a:rPr lang="en-US" dirty="0" smtClean="0">
+                <a:solidFill>
+                  <a:srgbClr val="17598F"/>
                 </a:solidFill>
                 <a:cs typeface="Courier New"/>
               </a:rPr>
-              <a:t>Support of tagged types (in 2014 roadmap)</a:t>
-            </a:r>
-          </a:p>
-          <a:p>
+              <a:t>floating-points </a:t>
+            </a:r>
             <a:r>
               <a:rPr lang="en-US" b="0" dirty="0" smtClean="0">
                 <a:solidFill>
@@ -16287,7 +16365,56 @@
                 </a:solidFill>
                 <a:cs typeface="Courier New"/>
               </a:rPr>
-              <a:t>Helping user with unproved checks (in 2014 roadmap)</a:t>
+              <a:t>(done)</a:t>
+            </a:r>
+          </a:p>
+          <a:p>
+            <a:r>
+              <a:rPr lang="en-US" b="0" dirty="0" smtClean="0">
+                <a:solidFill>
+                  <a:schemeClr val="tx1"/>
+                </a:solidFill>
+                <a:cs typeface="Courier New"/>
+              </a:rPr>
+              <a:t>Support of </a:t>
+            </a:r>
+            <a:r>
+              <a:rPr lang="en-US" dirty="0" smtClean="0">
+                <a:solidFill>
+                  <a:srgbClr val="17598F"/>
+                </a:solidFill>
+                <a:cs typeface="Courier New"/>
+              </a:rPr>
+              <a:t>tagged types </a:t>
+            </a:r>
+            <a:r>
+              <a:rPr lang="en-US" b="0" dirty="0" smtClean="0">
+                <a:solidFill>
+                  <a:schemeClr val="tx1"/>
+                </a:solidFill>
+                <a:cs typeface="Courier New"/>
+              </a:rPr>
+              <a:t>(in 2014 roadmap)</a:t>
+            </a:r>
+          </a:p>
+          <a:p>
+            <a:r>
+              <a:rPr lang="en-US" dirty="0" smtClean="0">
+                <a:solidFill>
+                  <a:schemeClr val="accent1"/>
+                </a:solidFill>
+                <a:cs typeface="Courier New"/>
+              </a:rPr>
+              <a:t>Helping</a:t>
+            </a:r>
+            <a:r>
+              <a:rPr lang="en-US" b="0" dirty="0" smtClean="0">
+                <a:solidFill>
+                  <a:schemeClr val="tx1"/>
+                </a:solidFill>
+                <a:cs typeface="Courier New"/>
+              </a:rPr>
+              <a:t> user with unproved checks (in 2014 roadmap)</a:t>
             </a:r>
           </a:p>
           <a:p>
@@ -16626,60 +16753,6 @@
       </p:sp>
       <p:pic>
         <p:nvPicPr>
-          <p:cNvPr id="5" name="Picture 2"/>
-          <p:cNvPicPr>
-            <a:picLocks noChangeAspect="1" noChangeArrowheads="1"/>
-          </p:cNvPicPr>
-          <p:nvPr/>
-        </p:nvPicPr>
-        <p:blipFill>
-          <a:blip r:embed="rId2">
-            <a:extLst>
-              <a:ext uri="{28A0092B-C50C-407E-A947-70E740481C1C}">
-                <a14:useLocalDpi xmlns:a14="http://schemas.microsoft.com/office/drawing/2010/main" val="0"/>
-              </a:ext>
-            </a:extLst>
-          </a:blip>
-          <a:srcRect/>
-          <a:stretch>
-            <a:fillRect/>
-          </a:stretch>
-        </p:blipFill>
-        <p:spPr bwMode="auto">
-          <a:xfrm>
-            <a:off x="6732240" y="188640"/>
-            <a:ext cx="2214562" cy="584200"/>
-          </a:xfrm>
-          <a:prstGeom prst="rect">
-            <a:avLst/>
-          </a:prstGeom>
-          <a:noFill/>
-          <a:ln>
-            <a:noFill/>
-          </a:ln>
-          <a:extLst>
-            <a:ext uri="{909E8E84-426E-40dd-AFC4-6F175D3DCCD1}">
-              <a14:hiddenFill xmlns:a14="http://schemas.microsoft.com/office/drawing/2010/main">
-                <a:solidFill>
-                  <a:srgbClr val="FFFFFF"/>
-                </a:solidFill>
-              </a14:hiddenFill>
-            </a:ext>
-            <a:ext uri="{91240B29-F687-4f45-9708-019B960494DF}">
-              <a14:hiddenLine xmlns:a14="http://schemas.microsoft.com/office/drawing/2010/main" w="12700">
-                <a:solidFill>
-                  <a:srgbClr val="000000"/>
-                </a:solidFill>
-                <a:miter lim="800000"/>
-                <a:headEnd/>
-                <a:tailEnd/>
-              </a14:hiddenLine>
-            </a:ext>
-          </a:extLst>
-        </p:spPr>
-      </p:pic>
-      <p:pic>
-        <p:nvPicPr>
           <p:cNvPr id="6" name="Image 5" descr="National_Security_Agency.svg.png"/>
           <p:cNvPicPr>
             <a:picLocks noChangeAspect="1"/>
@@ -16687,7 +16760,7 @@
           <p:nvPr/>
         </p:nvPicPr>
         <p:blipFill>
-          <a:blip r:embed="rId3">
+          <a:blip r:embed="rId2">
             <a:extLst>
               <a:ext uri="{28A0092B-C50C-407E-A947-70E740481C1C}">
                 <a14:useLocalDpi xmlns:a14="http://schemas.microsoft.com/office/drawing/2010/main" val="0"/>
@@ -16717,7 +16790,7 @@
           <p:nvPr/>
         </p:nvPicPr>
         <p:blipFill>
-          <a:blip r:embed="rId4" cstate="print">
+          <a:blip r:embed="rId3" cstate="print">
             <a:extLst>
               <a:ext uri="{28A0092B-C50C-407E-A947-70E740481C1C}">
                 <a14:useLocalDpi xmlns:a14="http://schemas.microsoft.com/office/drawing/2010/main" val="0"/>
@@ -16732,6 +16805,36 @@
           <a:xfrm>
             <a:off x="5508104" y="4077072"/>
             <a:ext cx="1440160" cy="2083565"/>
+          </a:xfrm>
+          <a:prstGeom prst="rect">
+            <a:avLst/>
+          </a:prstGeom>
+        </p:spPr>
+      </p:pic>
+      <p:pic>
+        <p:nvPicPr>
+          <p:cNvPr id="8" name="Image 7" descr="Altran_Logo_White.jpg"/>
+          <p:cNvPicPr>
+            <a:picLocks noChangeAspect="1"/>
+          </p:cNvPicPr>
+          <p:nvPr/>
+        </p:nvPicPr>
+        <p:blipFill>
+          <a:blip r:embed="rId4" cstate="print">
+            <a:extLst>
+              <a:ext uri="{28A0092B-C50C-407E-A947-70E740481C1C}">
+                <a14:useLocalDpi xmlns:a14="http://schemas.microsoft.com/office/drawing/2010/main" val="0"/>
+              </a:ext>
+            </a:extLst>
+          </a:blip>
+          <a:stretch>
+            <a:fillRect/>
+          </a:stretch>
+        </p:blipFill>
+        <p:spPr>
+          <a:xfrm>
+            <a:off x="6761584" y="0"/>
+            <a:ext cx="2382416" cy="882376"/>
           </a:xfrm>
           <a:prstGeom prst="rect">
             <a:avLst/>
@@ -20137,21 +20240,17 @@
                 </a:solidFill>
                 <a:cs typeface="Courier New"/>
               </a:rPr>
-              <a:t>Expressing specification-only code</a:t>
-            </a:r>
-          </a:p>
-          <a:p>
-            <a:r>
-              <a:rPr lang="en-US" b="0" dirty="0" smtClean="0">
-                <a:solidFill>
-                  <a:schemeClr val="tx1"/>
+              <a:t>Expressing </a:t>
+            </a:r>
+            <a:r>
+              <a:rPr lang="en-US" dirty="0" smtClean="0">
+                <a:solidFill>
+                  <a:srgbClr val="17598F"/>
                 </a:solidFill>
                 <a:cs typeface="Courier New"/>
               </a:rPr>
-              <a:t>Analysis of code that was not analyzable with SPARK 2005</a:t>
-            </a:r>
-          </a:p>
-          <a:p>
+              <a:t>specification-only </a:t>
+            </a:r>
             <a:r>
               <a:rPr lang="en-US" b="0" dirty="0" smtClean="0">
                 <a:solidFill>
@@ -20159,7 +20258,7 @@
                 </a:solidFill>
                 <a:cs typeface="Courier New"/>
               </a:rPr>
-              <a:t>Automating proofs with fewer user efforts</a:t>
+              <a:t>code</a:t>
             </a:r>
           </a:p>
           <a:p>
@@ -20170,18 +20269,16 @@
                 </a:solidFill>
                 <a:cs typeface="Courier New"/>
               </a:rPr>
-              <a:t>Expressing complete functional behavior of functions</a:t>
-            </a:r>
-          </a:p>
-          <a:p>
-            <a:r>
-              <a:rPr lang="en-US" b="0" dirty="0" smtClean="0">
-                <a:solidFill>
-                  <a:schemeClr val="tx1"/>
+              <a:t>Analysis of code that was </a:t>
+            </a:r>
+            <a:r>
+              <a:rPr lang="en-US" dirty="0" smtClean="0">
+                <a:solidFill>
+                  <a:srgbClr val="17598F"/>
                 </a:solidFill>
                 <a:cs typeface="Courier New"/>
               </a:rPr>
-              <a:t>Readability of the formal specifications</a:t>
+              <a:t>not analyzable with SPARK 2005</a:t>
             </a:r>
           </a:p>
           <a:p>
@@ -20192,7 +20289,103 @@
                 </a:solidFill>
                 <a:cs typeface="Courier New"/>
               </a:rPr>
-              <a:t>Uncovering corner cases related to run-time checks</a:t>
+              <a:t>Automating proofs with </a:t>
+            </a:r>
+            <a:r>
+              <a:rPr lang="en-US" dirty="0" smtClean="0">
+                <a:solidFill>
+                  <a:srgbClr val="17598F"/>
+                </a:solidFill>
+                <a:cs typeface="Courier New"/>
+              </a:rPr>
+              <a:t>less user </a:t>
+            </a:r>
+            <a:r>
+              <a:rPr lang="en-US" dirty="0" smtClean="0">
+                <a:solidFill>
+                  <a:srgbClr val="17598F"/>
+                </a:solidFill>
+                <a:cs typeface="Courier New"/>
+              </a:rPr>
+              <a:t>efforts</a:t>
+            </a:r>
+          </a:p>
+          <a:p>
+            <a:r>
+              <a:rPr lang="en-US" b="0" dirty="0" smtClean="0">
+                <a:solidFill>
+                  <a:schemeClr val="tx1"/>
+                </a:solidFill>
+                <a:cs typeface="Courier New"/>
+              </a:rPr>
+              <a:t>Expressing </a:t>
+            </a:r>
+            <a:r>
+              <a:rPr lang="en-US" dirty="0" smtClean="0">
+                <a:solidFill>
+                  <a:srgbClr val="17598F"/>
+                </a:solidFill>
+                <a:cs typeface="Courier New"/>
+              </a:rPr>
+              <a:t>complete functional behavior </a:t>
+            </a:r>
+            <a:r>
+              <a:rPr lang="en-US" b="0" dirty="0" smtClean="0">
+                <a:solidFill>
+                  <a:schemeClr val="tx1"/>
+                </a:solidFill>
+                <a:cs typeface="Courier New"/>
+              </a:rPr>
+              <a:t>of functions</a:t>
+            </a:r>
+          </a:p>
+          <a:p>
+            <a:r>
+              <a:rPr lang="en-US" dirty="0" smtClean="0">
+                <a:solidFill>
+                  <a:srgbClr val="17598F"/>
+                </a:solidFill>
+                <a:cs typeface="Courier New"/>
+              </a:rPr>
+              <a:t>Readability</a:t>
+            </a:r>
+            <a:r>
+              <a:rPr lang="en-US" b="0" dirty="0" smtClean="0">
+                <a:solidFill>
+                  <a:schemeClr val="tx1"/>
+                </a:solidFill>
+                <a:cs typeface="Courier New"/>
+              </a:rPr>
+              <a:t> of the formal specifications</a:t>
+            </a:r>
+          </a:p>
+          <a:p>
+            <a:r>
+              <a:rPr lang="en-US" b="0" dirty="0" smtClean="0">
+                <a:solidFill>
+                  <a:schemeClr val="tx1"/>
+                </a:solidFill>
+                <a:cs typeface="Courier New"/>
+              </a:rPr>
+              <a:t>Uncovering </a:t>
+            </a:r>
+            <a:r>
+              <a:rPr lang="en-US" dirty="0" smtClean="0">
+                <a:solidFill>
+                  <a:srgbClr val="17598F"/>
+                </a:solidFill>
+                <a:cs typeface="Courier New"/>
+              </a:rPr>
+              <a:t>corner cases </a:t>
+            </a:r>
+            <a:r>
+              <a:rPr lang="en-US" b="0" dirty="0" smtClean="0">
+                <a:solidFill>
+                  <a:schemeClr val="tx1"/>
+                </a:solidFill>
+                <a:cs typeface="Courier New"/>
+              </a:rPr>
+              <a:t>related to run-time checks</a:t>
             </a:r>
           </a:p>
           <a:p>
@@ -20222,13 +20415,22 @@
           </a:p>
           <a:p>
             <a:r>
-              <a:rPr lang="en-US" b="0" dirty="0" smtClean="0">
-                <a:solidFill>
-                  <a:schemeClr val="tx1"/>
+              <a:rPr lang="en-US" dirty="0" smtClean="0">
+                <a:solidFill>
+                  <a:srgbClr val="17598F"/>
                 </a:solidFill>
                 <a:cs typeface="Courier New"/>
               </a:rPr>
-              <a:t>Summary of proof results (done)</a:t>
+              <a:t>Summary</a:t>
+            </a:r>
+            <a:r>
+              <a:rPr lang="en-US" b="0" dirty="0" smtClean="0">
+                <a:solidFill>
+                  <a:schemeClr val="tx1"/>
+                </a:solidFill>
+                <a:cs typeface="Courier New"/>
+              </a:rPr>
+              <a:t> of proof results (done)</a:t>
             </a:r>
           </a:p>
           <a:p>

</xml_diff>

<commit_message>
Minor change of slides
</commit_message>
<xml_diff>
--- a/slides/ERTS_20140205/SPARK_2014_Case_Studies.pptx
+++ b/slides/ERTS_20140205/SPARK_2014_Case_Studies.pptx
@@ -286,7 +286,7 @@
             <a:fld id="{28C7CF07-8AE4-48B4-9716-7DADFEA16C26}" type="datetime1">
               <a:rPr lang="en-US"/>
               <a:pPr/>
-              <a:t>24/01/2014</a:t>
+              <a:t>08/02/2014</a:t>
             </a:fld>
             <a:endParaRPr lang="en-US"/>
           </a:p>
@@ -14079,10 +14079,7 @@
               <a:rPr lang="en-US" sz="2400" i="0" dirty="0" err="1" smtClean="0"/>
               <a:t>Restrictive_Merge</a:t>
             </a:r>
-            <a:r>
-              <a:rPr lang="en-US" sz="2400" i="0" dirty="0" smtClean="0"/>
-              <a:t>?</a:t>
-            </a:r>
+            <a:endParaRPr lang="en-US" sz="2400" i="0" dirty="0" smtClean="0"/>
           </a:p>
         </p:txBody>
       </p:sp>
@@ -15611,7 +15608,7 @@
                 </a:solidFill>
                 <a:cs typeface="Courier New"/>
               </a:rPr>
-              <a:t>Proving existing code </a:t>
+              <a:t>Proving existing code automatically </a:t>
             </a:r>
             <a:r>
               <a:rPr lang="en-US" dirty="0" smtClean="0">
@@ -21529,16 +21526,7 @@
                 </a:solidFill>
                 <a:cs typeface="Courier New"/>
               </a:rPr>
-              <a:t>object oriented features</a:t>
-            </a:r>
-            <a:r>
-              <a:rPr lang="en-US" dirty="0" smtClean="0">
-                <a:solidFill>
-                  <a:srgbClr val="17598F"/>
-                </a:solidFill>
-                <a:cs typeface="Courier New"/>
-              </a:rPr>
-              <a:t> </a:t>
+              <a:t>object oriented features </a:t>
             </a:r>
             <a:r>
               <a:rPr lang="en-US" b="0" dirty="0" smtClean="0">
@@ -25384,6 +25372,32 @@
               </a:rPr>
               <a:t>SPARK 2014 very good for:</a:t>
             </a:r>
+            <a:endParaRPr lang="en-US" b="0" dirty="0">
+              <a:solidFill>
+                <a:schemeClr val="tx1"/>
+              </a:solidFill>
+              <a:cs typeface="Courier New"/>
+            </a:endParaRPr>
+          </a:p>
+          <a:p>
+            <a:r>
+              <a:rPr lang="en-US" dirty="0">
+                <a:solidFill>
+                  <a:srgbClr val="17598F"/>
+                </a:solidFill>
+                <a:cs typeface="Courier New"/>
+              </a:rPr>
+              <a:t>Readability</a:t>
+            </a:r>
+            <a:r>
+              <a:rPr lang="en-US" b="0" dirty="0">
+                <a:solidFill>
+                  <a:schemeClr val="tx1"/>
+                </a:solidFill>
+                <a:cs typeface="Courier New"/>
+              </a:rPr>
+              <a:t> of the formal specifications</a:t>
+            </a:r>
           </a:p>
           <a:p>
             <a:r>
@@ -25415,6 +25429,28 @@
             </a:r>
           </a:p>
           <a:p>
+            <a:endParaRPr lang="en-US" b="0" dirty="0">
+              <a:solidFill>
+                <a:schemeClr val="tx1"/>
+              </a:solidFill>
+              <a:cs typeface="Courier New"/>
+            </a:endParaRPr>
+          </a:p>
+          <a:p>
+            <a:pPr marL="0" indent="0">
+              <a:buNone/>
+            </a:pPr>
+            <a:r>
+              <a:rPr lang="en-US" dirty="0" smtClean="0">
+                <a:solidFill>
+                  <a:schemeClr val="tx1"/>
+                </a:solidFill>
+                <a:cs typeface="Courier New"/>
+              </a:rPr>
+              <a:t>SPARK 2014 is better than SPARK 2005 for:</a:t>
+            </a:r>
+          </a:p>
+          <a:p>
             <a:r>
               <a:rPr lang="en-US" b="0" dirty="0" smtClean="0">
                 <a:solidFill>
@@ -25462,7 +25498,7 @@
                 </a:solidFill>
                 <a:cs typeface="Courier New"/>
               </a:rPr>
-              <a:t>Expressing </a:t>
+              <a:t>Proving </a:t>
             </a:r>
             <a:r>
               <a:rPr lang="en-US" dirty="0" smtClean="0">
@@ -25485,26 +25521,6 @@
           </a:p>
           <a:p>
             <a:r>
-              <a:rPr lang="en-US" dirty="0" smtClean="0">
-                <a:solidFill>
-                  <a:srgbClr val="17598F"/>
-                </a:solidFill>
-                <a:cs typeface="Courier New"/>
-              </a:rPr>
-              <a:t>Readability</a:t>
-            </a:r>
-            <a:r>
-              <a:rPr lang="en-US" b="0" dirty="0" smtClean="0">
-                <a:solidFill>
-                  <a:schemeClr val="tx1"/>
-                </a:solidFill>
-                <a:cs typeface="Courier New"/>
-              </a:rPr>
-              <a:t> of the formal specifications</a:t>
-            </a:r>
-          </a:p>
-          <a:p>
-            <a:r>
               <a:rPr lang="en-US" b="0" dirty="0" smtClean="0">
                 <a:solidFill>
                   <a:schemeClr val="tx1"/>
@@ -25529,7 +25545,7 @@
                 </a:solidFill>
                 <a:cs typeface="Courier New"/>
               </a:rPr>
-              <a:t>related to run-time checks</a:t>
+              <a:t>in specifications related to run-time checks</a:t>
             </a:r>
           </a:p>
           <a:p>
@@ -28119,7 +28135,7 @@
         <p:spPr>
           <a:xfrm>
             <a:off x="685800" y="1143000"/>
-            <a:ext cx="7846640" cy="5334000"/>
+            <a:ext cx="7990656" cy="5334000"/>
           </a:xfrm>
         </p:spPr>
         <p:txBody>
@@ -28131,6 +28147,115 @@
             <a:pPr marL="0" indent="0">
               <a:buNone/>
             </a:pPr>
+            <a:r>
+              <a:rPr lang="en-US" sz="2800" b="0" dirty="0" smtClean="0">
+                <a:solidFill>
+                  <a:schemeClr val="tx1"/>
+                </a:solidFill>
+                <a:cs typeface="Courier New"/>
+              </a:rPr>
+              <a:t>Tomorrow Thursday:</a:t>
+            </a:r>
+          </a:p>
+          <a:p>
+            <a:pPr marL="0" indent="0">
+              <a:buNone/>
+            </a:pPr>
+            <a:endParaRPr lang="en-US" sz="2800" b="0" dirty="0" smtClean="0">
+              <a:solidFill>
+                <a:schemeClr val="tx1"/>
+              </a:solidFill>
+              <a:cs typeface="Courier New"/>
+            </a:endParaRPr>
+          </a:p>
+          <a:p>
+            <a:pPr marL="0" indent="0">
+              <a:buNone/>
+            </a:pPr>
+            <a:r>
+              <a:rPr lang="en-US" sz="2800" b="0" dirty="0" smtClean="0">
+                <a:solidFill>
+                  <a:schemeClr val="tx1"/>
+                </a:solidFill>
+                <a:cs typeface="Courier New"/>
+              </a:rPr>
+              <a:t>8:00 – 8:50 (room </a:t>
+            </a:r>
+            <a:r>
+              <a:rPr lang="en-US" sz="2800" b="0" dirty="0" err="1" smtClean="0">
+                <a:solidFill>
+                  <a:schemeClr val="tx1"/>
+                </a:solidFill>
+                <a:cs typeface="Courier New"/>
+              </a:rPr>
+              <a:t>Daurat</a:t>
+            </a:r>
+            <a:r>
+              <a:rPr lang="en-US" sz="2800" b="0" dirty="0" smtClean="0">
+                <a:solidFill>
+                  <a:schemeClr val="tx1"/>
+                </a:solidFill>
+                <a:cs typeface="Courier New"/>
+              </a:rPr>
+              <a:t>) </a:t>
+            </a:r>
+            <a:r>
+              <a:rPr lang="en-US" sz="2800" dirty="0" smtClean="0">
+                <a:solidFill>
+                  <a:schemeClr val="tx1"/>
+                </a:solidFill>
+                <a:cs typeface="Courier New"/>
+              </a:rPr>
+              <a:t>Information session on the working group on “Theorem Proving in Certification”</a:t>
+            </a:r>
+          </a:p>
+          <a:p>
+            <a:pPr marL="0" indent="0">
+              <a:buNone/>
+            </a:pPr>
+            <a:r>
+              <a:rPr lang="en-US" sz="2800" b="0" dirty="0" smtClean="0">
+                <a:solidFill>
+                  <a:schemeClr val="tx1"/>
+                </a:solidFill>
+                <a:cs typeface="Courier New"/>
+              </a:rPr>
+              <a:t>10</a:t>
+            </a:r>
+            <a:r>
+              <a:rPr lang="en-US" sz="2800" b="0" smtClean="0">
+                <a:solidFill>
+                  <a:schemeClr val="tx1"/>
+                </a:solidFill>
+                <a:cs typeface="Courier New"/>
+              </a:rPr>
+              <a:t>:30 – </a:t>
+            </a:r>
+            <a:r>
+              <a:rPr lang="en-US" sz="2800" b="0" dirty="0" smtClean="0">
+                <a:solidFill>
+                  <a:schemeClr val="tx1"/>
+                </a:solidFill>
+                <a:cs typeface="Courier New"/>
+              </a:rPr>
+              <a:t>12:30 </a:t>
+            </a:r>
+            <a:r>
+              <a:rPr lang="en-US" sz="2800" dirty="0">
+                <a:solidFill>
+                  <a:schemeClr val="tx1"/>
+                </a:solidFill>
+              </a:rPr>
+              <a:t>New Trends in Certification </a:t>
+            </a:r>
+            <a:r>
+              <a:rPr lang="en-US" sz="2800" dirty="0" smtClean="0">
+                <a:solidFill>
+                  <a:schemeClr val="tx1"/>
+                </a:solidFill>
+              </a:rPr>
+              <a:t>I</a:t>
+            </a:r>
             <a:endParaRPr lang="en-US" sz="2800" dirty="0" smtClean="0">
               <a:solidFill>
                 <a:schemeClr val="tx1"/>
@@ -28143,51 +28268,29 @@
               <a:buNone/>
             </a:pPr>
             <a:r>
-              <a:rPr lang="en-US" sz="2800" dirty="0" smtClean="0">
+              <a:rPr lang="en-US" sz="2800" b="0" dirty="0" smtClean="0">
                 <a:solidFill>
                   <a:schemeClr val="tx1"/>
                 </a:solidFill>
                 <a:cs typeface="Courier New"/>
               </a:rPr>
-              <a:t>Information session on the working group on “Theorem Proving in Certification”</a:t>
-            </a:r>
-          </a:p>
-          <a:p>
-            <a:pPr marL="0" indent="0">
-              <a:buNone/>
-            </a:pPr>
-            <a:r>
-              <a:rPr lang="en-US" sz="2800" b="0" dirty="0" smtClean="0">
+              <a:t>16:40 – 18:40 </a:t>
+            </a:r>
+            <a:r>
+              <a:rPr lang="en-US" sz="2800" dirty="0" smtClean="0">
                 <a:solidFill>
                   <a:schemeClr val="tx1"/>
                 </a:solidFill>
-                <a:cs typeface="Courier New"/>
               </a:rPr>
-              <a:t>tomorrow Thursday, 8:00 – 8:50, room Dora</a:t>
-            </a:r>
-          </a:p>
-          <a:p>
-            <a:pPr marL="0" indent="0">
-              <a:buNone/>
-            </a:pPr>
-            <a:endParaRPr lang="en-US" sz="2800" dirty="0" smtClean="0">
-              <a:solidFill>
-                <a:schemeClr val="tx1"/>
-              </a:solidFill>
-              <a:cs typeface="Courier New"/>
-            </a:endParaRPr>
-          </a:p>
-          <a:p>
-            <a:pPr marL="0" indent="0">
-              <a:buNone/>
-            </a:pPr>
+              <a:t>New </a:t>
+            </a:r>
             <a:r>
               <a:rPr lang="en-US" sz="2800" dirty="0">
                 <a:solidFill>
                   <a:schemeClr val="tx1"/>
                 </a:solidFill>
               </a:rPr>
-              <a:t>Session 6D – New Trends in Certification </a:t>
+              <a:t>Trends in Certification </a:t>
             </a:r>
             <a:r>
               <a:rPr lang="en-US" sz="2800" dirty="0" smtClean="0">
@@ -28196,65 +28299,6 @@
                 </a:solidFill>
               </a:rPr>
               <a:t>II</a:t>
-            </a:r>
-          </a:p>
-          <a:p>
-            <a:pPr marL="0" indent="0">
-              <a:buNone/>
-            </a:pPr>
-            <a:r>
-              <a:rPr lang="en-US" sz="2800" b="0" dirty="0">
-                <a:solidFill>
-                  <a:schemeClr val="tx1"/>
-                </a:solidFill>
-                <a:cs typeface="Courier New"/>
-              </a:rPr>
-              <a:t>t</a:t>
-            </a:r>
-            <a:r>
-              <a:rPr lang="en-US" sz="2800" b="0" dirty="0" smtClean="0">
-                <a:solidFill>
-                  <a:schemeClr val="tx1"/>
-                </a:solidFill>
-                <a:cs typeface="Courier New"/>
-              </a:rPr>
-              <a:t>omorrow </a:t>
-            </a:r>
-            <a:r>
-              <a:rPr lang="en-US" sz="2800" b="0" dirty="0" err="1" smtClean="0">
-                <a:solidFill>
-                  <a:schemeClr val="tx1"/>
-                </a:solidFill>
-                <a:cs typeface="Courier New"/>
-              </a:rPr>
-              <a:t>Thursay</a:t>
-            </a:r>
-            <a:r>
-              <a:rPr lang="en-US" sz="2800" b="0" dirty="0" smtClean="0">
-                <a:solidFill>
-                  <a:schemeClr val="tx1"/>
-                </a:solidFill>
-                <a:cs typeface="Courier New"/>
-              </a:rPr>
-              <a:t>, 16:40 – 18:40, room </a:t>
-            </a:r>
-            <a:r>
-              <a:rPr lang="en-US" sz="2800" b="0" dirty="0" err="1" smtClean="0">
-                <a:solidFill>
-                  <a:schemeClr val="tx1"/>
-                </a:solidFill>
-                <a:cs typeface="Courier New"/>
-              </a:rPr>
-              <a:t>Ariane</a:t>
-            </a:r>
-            <a:r>
-              <a:rPr lang="en-US" sz="2800" b="0" dirty="0" smtClean="0">
-                <a:solidFill>
-                  <a:schemeClr val="tx1"/>
-                </a:solidFill>
-                <a:cs typeface="Courier New"/>
-              </a:rPr>
-              <a:t> 2</a:t>
             </a:r>
           </a:p>
         </p:txBody>

</xml_diff>